<commit_message>
Added Mind the Gap
</commit_message>
<xml_diff>
--- a/Presentation/SEMANTIC WEB MINING.pptx
+++ b/Presentation/SEMANTIC WEB MINING.pptx
@@ -5,24 +5,25 @@
     <p:sldMasterId id="2147483648" r:id="rId2"/>
   </p:sldMasterIdLst>
   <p:notesMasterIdLst>
-    <p:notesMasterId r:id="rId15"/>
+    <p:notesMasterId r:id="rId16"/>
   </p:notesMasterIdLst>
   <p:handoutMasterIdLst>
-    <p:handoutMasterId r:id="rId16"/>
+    <p:handoutMasterId r:id="rId17"/>
   </p:handoutMasterIdLst>
   <p:sldIdLst>
     <p:sldId id="256" r:id="rId3"/>
     <p:sldId id="267" r:id="rId4"/>
-    <p:sldId id="257" r:id="rId5"/>
-    <p:sldId id="258" r:id="rId6"/>
-    <p:sldId id="259" r:id="rId7"/>
-    <p:sldId id="260" r:id="rId8"/>
-    <p:sldId id="261" r:id="rId9"/>
-    <p:sldId id="262" r:id="rId10"/>
-    <p:sldId id="263" r:id="rId11"/>
-    <p:sldId id="264" r:id="rId12"/>
-    <p:sldId id="265" r:id="rId13"/>
-    <p:sldId id="266" r:id="rId14"/>
+    <p:sldId id="268" r:id="rId5"/>
+    <p:sldId id="257" r:id="rId6"/>
+    <p:sldId id="258" r:id="rId7"/>
+    <p:sldId id="259" r:id="rId8"/>
+    <p:sldId id="260" r:id="rId9"/>
+    <p:sldId id="261" r:id="rId10"/>
+    <p:sldId id="262" r:id="rId11"/>
+    <p:sldId id="263" r:id="rId12"/>
+    <p:sldId id="264" r:id="rId13"/>
+    <p:sldId id="265" r:id="rId14"/>
+    <p:sldId id="266" r:id="rId15"/>
   </p:sldIdLst>
   <p:sldSz cx="9144000" cy="6858000" type="screen4x3"/>
   <p:notesSz cx="6946900" cy="9283700"/>
@@ -5675,7 +5676,7 @@
       </p:grpSpPr>
       <p:sp>
         <p:nvSpPr>
-          <p:cNvPr id="28674" name="Rectangle 2"/>
+          <p:cNvPr id="27650" name="Rectangle 2"/>
           <p:cNvSpPr>
             <a:spLocks noGrp="1" noChangeArrowheads="1"/>
           </p:cNvSpPr>
@@ -5690,14 +5691,14 @@
           <a:p>
             <a:r>
               <a:rPr lang="en-US"/>
-              <a:t>Schedule</a:t>
-            </a:r>
-          </a:p>
-        </p:txBody>
-      </p:sp>
-      <p:sp>
-        <p:nvSpPr>
-          <p:cNvPr id="28675" name="Rectangle 3"/>
+              <a:t>Procedures</a:t>
+            </a:r>
+          </a:p>
+        </p:txBody>
+      </p:sp>
+      <p:sp>
+        <p:nvSpPr>
+          <p:cNvPr id="27651" name="Rectangle 3"/>
           <p:cNvSpPr>
             <a:spLocks noGrp="1" noChangeArrowheads="1"/>
           </p:cNvSpPr>
@@ -5712,14 +5713,20 @@
           <a:p>
             <a:r>
               <a:rPr lang="en-US"/>
-              <a:t>Review high-level schedule</a:t>
-            </a:r>
-          </a:p>
-        </p:txBody>
-      </p:sp>
-      <p:sp>
-        <p:nvSpPr>
-          <p:cNvPr id="28676" name="Text Box 4"/>
+              <a:t>Highlight any procedural differences from usual projects of this type</a:t>
+            </a:r>
+          </a:p>
+          <a:p>
+            <a:r>
+              <a:rPr lang="en-US"/>
+              <a:t>Discuss requirements, benefits, and issues of using new procedures</a:t>
+            </a:r>
+          </a:p>
+        </p:txBody>
+      </p:sp>
+      <p:sp>
+        <p:nvSpPr>
+          <p:cNvPr id="27652" name="Text Box 4"/>
           <p:cNvSpPr txBox="1">
             <a:spLocks noChangeArrowheads="1"/>
           </p:cNvSpPr>
@@ -5785,7 +5792,7 @@
               <a:rPr lang="en-US" sz="1400">
                 <a:latin typeface="Trebuchet MS" pitchFamily="34" charset="0"/>
               </a:rPr>
-              <a:t>List location or contact for detailed schedule (or other related documents)</a:t>
+              <a:t>List location or contact for procedures document (or other related documents)</a:t>
             </a:r>
           </a:p>
         </p:txBody>
@@ -5817,7 +5824,7 @@
       </p:grpSpPr>
       <p:sp>
         <p:nvSpPr>
-          <p:cNvPr id="29698" name="Rectangle 2"/>
+          <p:cNvPr id="28674" name="Rectangle 2"/>
           <p:cNvSpPr>
             <a:spLocks noGrp="1" noChangeArrowheads="1"/>
           </p:cNvSpPr>
@@ -5832,14 +5839,14 @@
           <a:p>
             <a:r>
               <a:rPr lang="en-US"/>
-              <a:t>Current Status</a:t>
-            </a:r>
-          </a:p>
-        </p:txBody>
-      </p:sp>
-      <p:sp>
-        <p:nvSpPr>
-          <p:cNvPr id="29699" name="Rectangle 3"/>
+              <a:t>Schedule</a:t>
+            </a:r>
+          </a:p>
+        </p:txBody>
+      </p:sp>
+      <p:sp>
+        <p:nvSpPr>
+          <p:cNvPr id="28675" name="Rectangle 3"/>
           <p:cNvSpPr>
             <a:spLocks noGrp="1" noChangeArrowheads="1"/>
           </p:cNvSpPr>
@@ -5854,34 +5861,80 @@
           <a:p>
             <a:r>
               <a:rPr lang="en-US"/>
-              <a:t>High-level overview of progress against schedule</a:t>
-            </a:r>
-          </a:p>
-          <a:p>
-            <a:pPr lvl="1"/>
-            <a:r>
-              <a:rPr lang="en-US"/>
-              <a:t>On-track in what areas</a:t>
-            </a:r>
-          </a:p>
-          <a:p>
-            <a:pPr lvl="1"/>
-            <a:r>
-              <a:rPr lang="en-US"/>
-              <a:t>Behind in what areas</a:t>
-            </a:r>
-          </a:p>
-          <a:p>
-            <a:pPr lvl="1"/>
-            <a:r>
-              <a:rPr lang="en-US"/>
-              <a:t>Ahead in what areas</a:t>
-            </a:r>
-          </a:p>
-          <a:p>
-            <a:r>
-              <a:rPr lang="en-US"/>
-              <a:t>Unexpected delays or issues</a:t>
+              <a:t>Review high-level schedule</a:t>
+            </a:r>
+          </a:p>
+        </p:txBody>
+      </p:sp>
+      <p:sp>
+        <p:nvSpPr>
+          <p:cNvPr id="28676" name="Text Box 4"/>
+          <p:cNvSpPr txBox="1">
+            <a:spLocks noChangeArrowheads="1"/>
+          </p:cNvSpPr>
+          <p:nvPr/>
+        </p:nvSpPr>
+        <p:spPr bwMode="auto">
+          <a:xfrm>
+            <a:off x="1905000" y="5943600"/>
+            <a:ext cx="6553200" cy="517525"/>
+          </a:xfrm>
+          <a:prstGeom prst="rect">
+            <a:avLst/>
+          </a:prstGeom>
+          <a:noFill/>
+          <a:ln>
+            <a:noFill/>
+          </a:ln>
+          <a:effectLst/>
+          <a:extLst>
+            <a:ext uri="{909E8E84-426E-40DD-AFC4-6F175D3DCCD1}">
+              <a14:hiddenFill xmlns:a14="http://schemas.microsoft.com/office/drawing/2010/main">
+                <a:solidFill>
+                  <a:schemeClr val="accent1"/>
+                </a:solidFill>
+              </a14:hiddenFill>
+            </a:ext>
+            <a:ext uri="{91240B29-F687-4F45-9708-019B960494DF}">
+              <a14:hiddenLine xmlns:a14="http://schemas.microsoft.com/office/drawing/2010/main" w="12700" cap="sq">
+                <a:solidFill>
+                  <a:schemeClr val="tx1"/>
+                </a:solidFill>
+                <a:miter lim="800000"/>
+                <a:headEnd type="none" w="sm" len="sm"/>
+                <a:tailEnd type="none" w="sm" len="sm"/>
+              </a14:hiddenLine>
+            </a:ext>
+            <a:ext uri="{AF507438-7753-43E0-B8FC-AC1667EBCBE1}">
+              <a14:hiddenEffects xmlns:a14="http://schemas.microsoft.com/office/drawing/2010/main">
+                <a:effectLst>
+                  <a:outerShdw dist="35921" dir="2700000" algn="ctr" rotWithShape="0">
+                    <a:schemeClr val="bg2"/>
+                  </a:outerShdw>
+                </a:effectLst>
+              </a14:hiddenEffects>
+            </a:ext>
+          </a:extLst>
+        </p:spPr>
+        <p:txBody>
+          <a:bodyPr>
+            <a:spAutoFit/>
+          </a:bodyPr>
+          <a:lstStyle/>
+          <a:p>
+            <a:r>
+              <a:rPr lang="en-US" sz="1400" b="1">
+                <a:latin typeface="Trebuchet MS" pitchFamily="34" charset="0"/>
+              </a:rPr>
+              <a:t>-for more info…</a:t>
+            </a:r>
+          </a:p>
+          <a:p>
+            <a:r>
+              <a:rPr lang="en-US" sz="1400">
+                <a:latin typeface="Trebuchet MS" pitchFamily="34" charset="0"/>
+              </a:rPr>
+              <a:t>List location or contact for detailed schedule (or other related documents)</a:t>
             </a:r>
           </a:p>
         </p:txBody>
@@ -5895,6 +5948,102 @@
 </file>
 
 <file path=ppt/slides/slide12.xml><?xml version="1.0" encoding="utf-8"?>
+<p:sld xmlns:a="http://schemas.openxmlformats.org/drawingml/2006/main" xmlns:r="http://schemas.openxmlformats.org/officeDocument/2006/relationships" xmlns:p="http://schemas.openxmlformats.org/presentationml/2006/main">
+  <p:cSld>
+    <p:spTree>
+      <p:nvGrpSpPr>
+        <p:cNvPr id="1" name=""/>
+        <p:cNvGrpSpPr/>
+        <p:nvPr/>
+      </p:nvGrpSpPr>
+      <p:grpSpPr>
+        <a:xfrm>
+          <a:off x="0" y="0"/>
+          <a:ext cx="0" cy="0"/>
+          <a:chOff x="0" y="0"/>
+          <a:chExt cx="0" cy="0"/>
+        </a:xfrm>
+      </p:grpSpPr>
+      <p:sp>
+        <p:nvSpPr>
+          <p:cNvPr id="29698" name="Rectangle 2"/>
+          <p:cNvSpPr>
+            <a:spLocks noGrp="1" noChangeArrowheads="1"/>
+          </p:cNvSpPr>
+          <p:nvPr>
+            <p:ph type="title"/>
+          </p:nvPr>
+        </p:nvSpPr>
+        <p:spPr/>
+        <p:txBody>
+          <a:bodyPr/>
+          <a:lstStyle/>
+          <a:p>
+            <a:r>
+              <a:rPr lang="en-US"/>
+              <a:t>Current Status</a:t>
+            </a:r>
+          </a:p>
+        </p:txBody>
+      </p:sp>
+      <p:sp>
+        <p:nvSpPr>
+          <p:cNvPr id="29699" name="Rectangle 3"/>
+          <p:cNvSpPr>
+            <a:spLocks noGrp="1" noChangeArrowheads="1"/>
+          </p:cNvSpPr>
+          <p:nvPr>
+            <p:ph type="body" idx="1"/>
+          </p:nvPr>
+        </p:nvSpPr>
+        <p:spPr/>
+        <p:txBody>
+          <a:bodyPr/>
+          <a:lstStyle/>
+          <a:p>
+            <a:r>
+              <a:rPr lang="en-US"/>
+              <a:t>High-level overview of progress against schedule</a:t>
+            </a:r>
+          </a:p>
+          <a:p>
+            <a:pPr lvl="1"/>
+            <a:r>
+              <a:rPr lang="en-US"/>
+              <a:t>On-track in what areas</a:t>
+            </a:r>
+          </a:p>
+          <a:p>
+            <a:pPr lvl="1"/>
+            <a:r>
+              <a:rPr lang="en-US"/>
+              <a:t>Behind in what areas</a:t>
+            </a:r>
+          </a:p>
+          <a:p>
+            <a:pPr lvl="1"/>
+            <a:r>
+              <a:rPr lang="en-US"/>
+              <a:t>Ahead in what areas</a:t>
+            </a:r>
+          </a:p>
+          <a:p>
+            <a:r>
+              <a:rPr lang="en-US"/>
+              <a:t>Unexpected delays or issues</a:t>
+            </a:r>
+          </a:p>
+        </p:txBody>
+      </p:sp>
+    </p:spTree>
+  </p:cSld>
+  <p:clrMapOvr>
+    <a:masterClrMapping/>
+  </p:clrMapOvr>
+</p:sld>
+</file>
+
+<file path=ppt/slides/slide13.xml><?xml version="1.0" encoding="utf-8"?>
 <p:sld xmlns:a="http://schemas.openxmlformats.org/drawingml/2006/main" xmlns:r="http://schemas.openxmlformats.org/officeDocument/2006/relationships" xmlns:p="http://schemas.openxmlformats.org/presentationml/2006/main">
   <p:cSld>
     <p:spTree>
@@ -6174,6 +6323,85 @@
       </p:grpSpPr>
       <p:sp>
         <p:nvSpPr>
+          <p:cNvPr id="2" name="Title 1"/>
+          <p:cNvSpPr>
+            <a:spLocks noGrp="1"/>
+          </p:cNvSpPr>
+          <p:nvPr>
+            <p:ph type="title"/>
+          </p:nvPr>
+        </p:nvSpPr>
+        <p:spPr/>
+        <p:txBody>
+          <a:bodyPr/>
+          <a:lstStyle/>
+          <a:p>
+            <a:r>
+              <a:rPr lang="en-IN" dirty="0" smtClean="0"/>
+              <a:t>MIND THE GAP!</a:t>
+            </a:r>
+            <a:endParaRPr lang="en-IN" dirty="0"/>
+          </a:p>
+        </p:txBody>
+      </p:sp>
+      <p:pic>
+        <p:nvPicPr>
+          <p:cNvPr id="4" name="Content Placeholder 3"/>
+          <p:cNvPicPr>
+            <a:picLocks noGrp="1" noChangeAspect="1"/>
+          </p:cNvPicPr>
+          <p:nvPr>
+            <p:ph idx="1"/>
+          </p:nvPr>
+        </p:nvPicPr>
+        <p:blipFill>
+          <a:blip r:embed="rId2"/>
+          <a:stretch>
+            <a:fillRect/>
+          </a:stretch>
+        </p:blipFill>
+        <p:spPr>
+          <a:xfrm>
+            <a:off x="567956" y="1905001"/>
+            <a:ext cx="7890244" cy="3560664"/>
+          </a:xfrm>
+          <a:prstGeom prst="rect">
+            <a:avLst/>
+          </a:prstGeom>
+        </p:spPr>
+      </p:pic>
+    </p:spTree>
+    <p:extLst>
+      <p:ext uri="{BB962C8B-B14F-4D97-AF65-F5344CB8AC3E}">
+        <p14:creationId xmlns:p14="http://schemas.microsoft.com/office/powerpoint/2010/main" val="691042930"/>
+      </p:ext>
+    </p:extLst>
+  </p:cSld>
+  <p:clrMapOvr>
+    <a:masterClrMapping/>
+  </p:clrMapOvr>
+</p:sld>
+</file>
+
+<file path=ppt/slides/slide4.xml><?xml version="1.0" encoding="utf-8"?>
+<p:sld xmlns:a="http://schemas.openxmlformats.org/drawingml/2006/main" xmlns:r="http://schemas.openxmlformats.org/officeDocument/2006/relationships" xmlns:p="http://schemas.openxmlformats.org/presentationml/2006/main">
+  <p:cSld>
+    <p:spTree>
+      <p:nvGrpSpPr>
+        <p:cNvPr id="1" name=""/>
+        <p:cNvGrpSpPr/>
+        <p:nvPr/>
+      </p:nvGrpSpPr>
+      <p:grpSpPr>
+        <a:xfrm>
+          <a:off x="0" y="0"/>
+          <a:ext cx="0" cy="0"/>
+          <a:chOff x="0" y="0"/>
+          <a:chExt cx="0" cy="0"/>
+        </a:xfrm>
+      </p:grpSpPr>
+      <p:sp>
+        <p:nvSpPr>
           <p:cNvPr id="5126" name="Rectangle 6"/>
           <p:cNvSpPr>
             <a:spLocks noGrp="1" noChangeArrowheads="1"/>
@@ -6241,7 +6469,7 @@
 </p:sld>
 </file>
 
-<file path=ppt/slides/slide4.xml><?xml version="1.0" encoding="utf-8"?>
+<file path=ppt/slides/slide5.xml><?xml version="1.0" encoding="utf-8"?>
 <p:sld xmlns:a="http://schemas.openxmlformats.org/drawingml/2006/main" xmlns:r="http://schemas.openxmlformats.org/officeDocument/2006/relationships" xmlns:p="http://schemas.openxmlformats.org/presentationml/2006/main">
   <p:cSld>
     <p:spTree>
@@ -6386,7 +6614,7 @@
 </p:sld>
 </file>
 
-<file path=ppt/slides/slide5.xml><?xml version="1.0" encoding="utf-8"?>
+<file path=ppt/slides/slide6.xml><?xml version="1.0" encoding="utf-8"?>
 <p:sld xmlns:a="http://schemas.openxmlformats.org/drawingml/2006/main" xmlns:r="http://schemas.openxmlformats.org/officeDocument/2006/relationships" xmlns:p="http://schemas.openxmlformats.org/presentationml/2006/main">
   <p:cSld>
     <p:spTree>
@@ -6488,7 +6716,7 @@
 </p:sld>
 </file>
 
-<file path=ppt/slides/slide6.xml><?xml version="1.0" encoding="utf-8"?>
+<file path=ppt/slides/slide7.xml><?xml version="1.0" encoding="utf-8"?>
 <p:sld xmlns:a="http://schemas.openxmlformats.org/drawingml/2006/main" xmlns:r="http://schemas.openxmlformats.org/officeDocument/2006/relationships" xmlns:p="http://schemas.openxmlformats.org/presentationml/2006/main">
   <p:cSld>
     <p:spTree>
@@ -6644,7 +6872,7 @@
 </p:sld>
 </file>
 
-<file path=ppt/slides/slide7.xml><?xml version="1.0" encoding="utf-8"?>
+<file path=ppt/slides/slide8.xml><?xml version="1.0" encoding="utf-8"?>
 <p:sld xmlns:a="http://schemas.openxmlformats.org/drawingml/2006/main" xmlns:r="http://schemas.openxmlformats.org/officeDocument/2006/relationships" xmlns:p="http://schemas.openxmlformats.org/presentationml/2006/main">
   <p:cSld>
     <p:spTree>
@@ -6746,117 +6974,6 @@
 </p:sld>
 </file>
 
-<file path=ppt/slides/slide8.xml><?xml version="1.0" encoding="utf-8"?>
-<p:sld xmlns:a="http://schemas.openxmlformats.org/drawingml/2006/main" xmlns:r="http://schemas.openxmlformats.org/officeDocument/2006/relationships" xmlns:p="http://schemas.openxmlformats.org/presentationml/2006/main">
-  <p:cSld>
-    <p:spTree>
-      <p:nvGrpSpPr>
-        <p:cNvPr id="1" name=""/>
-        <p:cNvGrpSpPr/>
-        <p:nvPr/>
-      </p:nvGrpSpPr>
-      <p:grpSpPr>
-        <a:xfrm>
-          <a:off x="0" y="0"/>
-          <a:ext cx="0" cy="0"/>
-          <a:chOff x="0" y="0"/>
-          <a:chExt cx="0" cy="0"/>
-        </a:xfrm>
-      </p:grpSpPr>
-      <p:sp>
-        <p:nvSpPr>
-          <p:cNvPr id="26626" name="Rectangle 2"/>
-          <p:cNvSpPr>
-            <a:spLocks noGrp="1" noChangeArrowheads="1"/>
-          </p:cNvSpPr>
-          <p:nvPr>
-            <p:ph type="title"/>
-          </p:nvPr>
-        </p:nvSpPr>
-        <p:spPr/>
-        <p:txBody>
-          <a:bodyPr/>
-          <a:lstStyle/>
-          <a:p>
-            <a:r>
-              <a:rPr lang="en-US"/>
-              <a:t>Team Resources</a:t>
-            </a:r>
-          </a:p>
-        </p:txBody>
-      </p:sp>
-      <p:sp>
-        <p:nvSpPr>
-          <p:cNvPr id="26627" name="Rectangle 3"/>
-          <p:cNvSpPr>
-            <a:spLocks noGrp="1" noChangeArrowheads="1"/>
-          </p:cNvSpPr>
-          <p:nvPr>
-            <p:ph type="body" idx="1"/>
-          </p:nvPr>
-        </p:nvSpPr>
-        <p:spPr/>
-        <p:txBody>
-          <a:bodyPr/>
-          <a:lstStyle/>
-          <a:p>
-            <a:r>
-              <a:rPr lang="en-US"/>
-              <a:t>State assumptions about resources allocated to this project</a:t>
-            </a:r>
-          </a:p>
-          <a:p>
-            <a:pPr lvl="1"/>
-            <a:r>
-              <a:rPr lang="en-US"/>
-              <a:t>People</a:t>
-            </a:r>
-          </a:p>
-          <a:p>
-            <a:pPr lvl="1"/>
-            <a:r>
-              <a:rPr lang="en-US"/>
-              <a:t>Equipment</a:t>
-            </a:r>
-          </a:p>
-          <a:p>
-            <a:pPr lvl="1"/>
-            <a:r>
-              <a:rPr lang="en-US"/>
-              <a:t>Locations</a:t>
-            </a:r>
-          </a:p>
-          <a:p>
-            <a:pPr lvl="1"/>
-            <a:r>
-              <a:rPr lang="en-US"/>
-              <a:t>Support &amp; outside services</a:t>
-            </a:r>
-          </a:p>
-          <a:p>
-            <a:pPr lvl="1"/>
-            <a:r>
-              <a:rPr lang="en-US"/>
-              <a:t>Manufacturing</a:t>
-            </a:r>
-          </a:p>
-          <a:p>
-            <a:pPr lvl="1"/>
-            <a:r>
-              <a:rPr lang="en-US"/>
-              <a:t>Sales</a:t>
-            </a:r>
-          </a:p>
-        </p:txBody>
-      </p:sp>
-    </p:spTree>
-  </p:cSld>
-  <p:clrMapOvr>
-    <a:masterClrMapping/>
-  </p:clrMapOvr>
-</p:sld>
-</file>
-
 <file path=ppt/slides/slide9.xml><?xml version="1.0" encoding="utf-8"?>
 <p:sld xmlns:a="http://schemas.openxmlformats.org/drawingml/2006/main" xmlns:r="http://schemas.openxmlformats.org/officeDocument/2006/relationships" xmlns:p="http://schemas.openxmlformats.org/presentationml/2006/main">
   <p:cSld>
@@ -6876,7 +6993,7 @@
       </p:grpSpPr>
       <p:sp>
         <p:nvSpPr>
-          <p:cNvPr id="27650" name="Rectangle 2"/>
+          <p:cNvPr id="26626" name="Rectangle 2"/>
           <p:cNvSpPr>
             <a:spLocks noGrp="1" noChangeArrowheads="1"/>
           </p:cNvSpPr>
@@ -6891,14 +7008,14 @@
           <a:p>
             <a:r>
               <a:rPr lang="en-US"/>
-              <a:t>Procedures</a:t>
-            </a:r>
-          </a:p>
-        </p:txBody>
-      </p:sp>
-      <p:sp>
-        <p:nvSpPr>
-          <p:cNvPr id="27651" name="Rectangle 3"/>
+              <a:t>Team Resources</a:t>
+            </a:r>
+          </a:p>
+        </p:txBody>
+      </p:sp>
+      <p:sp>
+        <p:nvSpPr>
+          <p:cNvPr id="26627" name="Rectangle 3"/>
           <p:cNvSpPr>
             <a:spLocks noGrp="1" noChangeArrowheads="1"/>
           </p:cNvSpPr>
@@ -6913,86 +7030,49 @@
           <a:p>
             <a:r>
               <a:rPr lang="en-US"/>
-              <a:t>Highlight any procedural differences from usual projects of this type</a:t>
-            </a:r>
-          </a:p>
-          <a:p>
+              <a:t>State assumptions about resources allocated to this project</a:t>
+            </a:r>
+          </a:p>
+          <a:p>
+            <a:pPr lvl="1"/>
             <a:r>
               <a:rPr lang="en-US"/>
-              <a:t>Discuss requirements, benefits, and issues of using new procedures</a:t>
-            </a:r>
-          </a:p>
-        </p:txBody>
-      </p:sp>
-      <p:sp>
-        <p:nvSpPr>
-          <p:cNvPr id="27652" name="Text Box 4"/>
-          <p:cNvSpPr txBox="1">
-            <a:spLocks noChangeArrowheads="1"/>
-          </p:cNvSpPr>
-          <p:nvPr/>
-        </p:nvSpPr>
-        <p:spPr bwMode="auto">
-          <a:xfrm>
-            <a:off x="1905000" y="5943600"/>
-            <a:ext cx="6553200" cy="517525"/>
-          </a:xfrm>
-          <a:prstGeom prst="rect">
-            <a:avLst/>
-          </a:prstGeom>
-          <a:noFill/>
-          <a:ln>
-            <a:noFill/>
-          </a:ln>
-          <a:effectLst/>
-          <a:extLst>
-            <a:ext uri="{909E8E84-426E-40DD-AFC4-6F175D3DCCD1}">
-              <a14:hiddenFill xmlns:a14="http://schemas.microsoft.com/office/drawing/2010/main">
-                <a:solidFill>
-                  <a:schemeClr val="accent1"/>
-                </a:solidFill>
-              </a14:hiddenFill>
-            </a:ext>
-            <a:ext uri="{91240B29-F687-4F45-9708-019B960494DF}">
-              <a14:hiddenLine xmlns:a14="http://schemas.microsoft.com/office/drawing/2010/main" w="12700" cap="sq">
-                <a:solidFill>
-                  <a:schemeClr val="tx1"/>
-                </a:solidFill>
-                <a:miter lim="800000"/>
-                <a:headEnd type="none" w="sm" len="sm"/>
-                <a:tailEnd type="none" w="sm" len="sm"/>
-              </a14:hiddenLine>
-            </a:ext>
-            <a:ext uri="{AF507438-7753-43E0-B8FC-AC1667EBCBE1}">
-              <a14:hiddenEffects xmlns:a14="http://schemas.microsoft.com/office/drawing/2010/main">
-                <a:effectLst>
-                  <a:outerShdw dist="35921" dir="2700000" algn="ctr" rotWithShape="0">
-                    <a:schemeClr val="bg2"/>
-                  </a:outerShdw>
-                </a:effectLst>
-              </a14:hiddenEffects>
-            </a:ext>
-          </a:extLst>
-        </p:spPr>
-        <p:txBody>
-          <a:bodyPr>
-            <a:spAutoFit/>
-          </a:bodyPr>
-          <a:lstStyle/>
-          <a:p>
-            <a:r>
-              <a:rPr lang="en-US" sz="1400" b="1">
-                <a:latin typeface="Trebuchet MS" pitchFamily="34" charset="0"/>
-              </a:rPr>
-              <a:t>-for more info…</a:t>
-            </a:r>
-          </a:p>
-          <a:p>
-            <a:r>
-              <a:rPr lang="en-US" sz="1400">
-                <a:latin typeface="Trebuchet MS" pitchFamily="34" charset="0"/>
-              </a:rPr>
-              <a:t>List location or contact for procedures document (or other related documents)</a:t>
+              <a:t>People</a:t>
+            </a:r>
+          </a:p>
+          <a:p>
+            <a:pPr lvl="1"/>
+            <a:r>
+              <a:rPr lang="en-US"/>
+              <a:t>Equipment</a:t>
+            </a:r>
+          </a:p>
+          <a:p>
+            <a:pPr lvl="1"/>
+            <a:r>
+              <a:rPr lang="en-US"/>
+              <a:t>Locations</a:t>
+            </a:r>
+          </a:p>
+          <a:p>
+            <a:pPr lvl="1"/>
+            <a:r>
+              <a:rPr lang="en-US"/>
+              <a:t>Support &amp; outside services</a:t>
+            </a:r>
+          </a:p>
+          <a:p>
+            <a:pPr lvl="1"/>
+            <a:r>
+              <a:rPr lang="en-US"/>
+              <a:t>Manufacturing</a:t>
+            </a:r>
+          </a:p>
+          <a:p>
+            <a:pPr lvl="1"/>
+            <a:r>
+              <a:rPr lang="en-US"/>
+              <a:t>Sales</a:t>
             </a:r>
           </a:p>
         </p:txBody>

</xml_diff>

<commit_message>
Presentation me + Leen
</commit_message>
<xml_diff>
--- a/Presentation/SEMANTIC WEB MINING.pptx
+++ b/Presentation/SEMANTIC WEB MINING.pptx
@@ -5,25 +5,27 @@
     <p:sldMasterId id="2147483648" r:id="rId2"/>
   </p:sldMasterIdLst>
   <p:notesMasterIdLst>
-    <p:notesMasterId r:id="rId16"/>
+    <p:notesMasterId r:id="rId18"/>
   </p:notesMasterIdLst>
   <p:handoutMasterIdLst>
-    <p:handoutMasterId r:id="rId17"/>
+    <p:handoutMasterId r:id="rId19"/>
   </p:handoutMasterIdLst>
   <p:sldIdLst>
     <p:sldId id="256" r:id="rId3"/>
-    <p:sldId id="267" r:id="rId4"/>
-    <p:sldId id="268" r:id="rId5"/>
-    <p:sldId id="257" r:id="rId6"/>
-    <p:sldId id="258" r:id="rId7"/>
-    <p:sldId id="259" r:id="rId8"/>
-    <p:sldId id="260" r:id="rId9"/>
-    <p:sldId id="261" r:id="rId10"/>
-    <p:sldId id="262" r:id="rId11"/>
-    <p:sldId id="263" r:id="rId12"/>
-    <p:sldId id="264" r:id="rId13"/>
-    <p:sldId id="265" r:id="rId14"/>
-    <p:sldId id="266" r:id="rId15"/>
+    <p:sldId id="271" r:id="rId4"/>
+    <p:sldId id="267" r:id="rId5"/>
+    <p:sldId id="268" r:id="rId6"/>
+    <p:sldId id="257" r:id="rId7"/>
+    <p:sldId id="273" r:id="rId8"/>
+    <p:sldId id="274" r:id="rId9"/>
+    <p:sldId id="275" r:id="rId10"/>
+    <p:sldId id="276" r:id="rId11"/>
+    <p:sldId id="259" r:id="rId12"/>
+    <p:sldId id="280" r:id="rId13"/>
+    <p:sldId id="260" r:id="rId14"/>
+    <p:sldId id="278" r:id="rId15"/>
+    <p:sldId id="261" r:id="rId16"/>
+    <p:sldId id="279" r:id="rId17"/>
   </p:sldIdLst>
   <p:sldSz cx="9144000" cy="6858000" type="screen4x3"/>
   <p:notesSz cx="6946900" cy="9283700"/>
@@ -484,6 +486,151 @@
 </p:handoutMaster>
 </file>
 
+<file path=ppt/ink/ink1.xml><?xml version="1.0" encoding="utf-8"?>
+<inkml:ink xmlns:inkml="http://www.w3.org/2003/InkML">
+  <inkml:definitions>
+    <inkml:context xml:id="ctx0">
+      <inkml:inkSource xml:id="inkSrc0">
+        <inkml:traceFormat>
+          <inkml:channel name="X" type="integer" max="1366" units="cm"/>
+          <inkml:channel name="Y" type="integer" max="768" units="cm"/>
+          <inkml:channel name="T" type="integer" max="2.14748E9" units="dev"/>
+        </inkml:traceFormat>
+        <inkml:channelProperties>
+          <inkml:channelProperty channel="X" name="resolution" value="39.7093" units="1/cm"/>
+          <inkml:channelProperty channel="Y" name="resolution" value="39.58763" units="1/cm"/>
+          <inkml:channelProperty channel="T" name="resolution" value="1" units="1/dev"/>
+        </inkml:channelProperties>
+      </inkml:inkSource>
+      <inkml:timestamp xml:id="ts0" timeString="2016-11-03T18:29:27.121"/>
+    </inkml:context>
+    <inkml:brush xml:id="br0">
+      <inkml:brushProperty name="width" value="0.06667" units="cm"/>
+      <inkml:brushProperty name="height" value="0.06667" units="cm"/>
+      <inkml:brushProperty name="color" value="#ED1C24"/>
+      <inkml:brushProperty name="fitToCurve" value="1"/>
+    </inkml:brush>
+  </inkml:definitions>
+  <inkml:trace contextRef="#ctx0" brushRef="#br0">0 0 0</inkml:trace>
+</inkml:ink>
+</file>
+
+<file path=ppt/ink/ink2.xml><?xml version="1.0" encoding="utf-8"?>
+<inkml:ink xmlns:inkml="http://www.w3.org/2003/InkML">
+  <inkml:definitions>
+    <inkml:context xml:id="ctx0">
+      <inkml:inkSource xml:id="inkSrc0">
+        <inkml:traceFormat>
+          <inkml:channel name="X" type="integer" max="1366" units="cm"/>
+          <inkml:channel name="Y" type="integer" max="768" units="cm"/>
+          <inkml:channel name="T" type="integer" max="2.14748E9" units="dev"/>
+        </inkml:traceFormat>
+        <inkml:channelProperties>
+          <inkml:channelProperty channel="X" name="resolution" value="39.7093" units="1/cm"/>
+          <inkml:channelProperty channel="Y" name="resolution" value="39.58763" units="1/cm"/>
+          <inkml:channelProperty channel="T" name="resolution" value="1" units="1/dev"/>
+        </inkml:channelProperties>
+      </inkml:inkSource>
+      <inkml:timestamp xml:id="ts0" timeString="2016-11-03T18:29:26.652"/>
+    </inkml:context>
+    <inkml:brush xml:id="br0">
+      <inkml:brushProperty name="width" value="0.06667" units="cm"/>
+      <inkml:brushProperty name="height" value="0.06667" units="cm"/>
+      <inkml:brushProperty name="color" value="#ED1C24"/>
+      <inkml:brushProperty name="fitToCurve" value="1"/>
+    </inkml:brush>
+  </inkml:definitions>
+  <inkml:trace contextRef="#ctx0" brushRef="#br0">0 0 0</inkml:trace>
+</inkml:ink>
+</file>
+
+<file path=ppt/ink/ink3.xml><?xml version="1.0" encoding="utf-8"?>
+<inkml:ink xmlns:inkml="http://www.w3.org/2003/InkML">
+  <inkml:definitions>
+    <inkml:context xml:id="ctx0">
+      <inkml:inkSource xml:id="inkSrc0">
+        <inkml:traceFormat>
+          <inkml:channel name="X" type="integer" max="1366" units="cm"/>
+          <inkml:channel name="Y" type="integer" max="768" units="cm"/>
+          <inkml:channel name="T" type="integer" max="2.14748E9" units="dev"/>
+        </inkml:traceFormat>
+        <inkml:channelProperties>
+          <inkml:channelProperty channel="X" name="resolution" value="39.7093" units="1/cm"/>
+          <inkml:channelProperty channel="Y" name="resolution" value="39.58763" units="1/cm"/>
+          <inkml:channelProperty channel="T" name="resolution" value="1" units="1/dev"/>
+        </inkml:channelProperties>
+      </inkml:inkSource>
+      <inkml:timestamp xml:id="ts0" timeString="2016-11-03T18:30:07.929"/>
+    </inkml:context>
+    <inkml:brush xml:id="br0">
+      <inkml:brushProperty name="width" value="0.06667" units="cm"/>
+      <inkml:brushProperty name="height" value="0.06667" units="cm"/>
+      <inkml:brushProperty name="color" value="#ED1C24"/>
+      <inkml:brushProperty name="fitToCurve" value="1"/>
+    </inkml:brush>
+  </inkml:definitions>
+  <inkml:trace contextRef="#ctx0" brushRef="#br0">0 0 0</inkml:trace>
+</inkml:ink>
+</file>
+
+<file path=ppt/ink/ink4.xml><?xml version="1.0" encoding="utf-8"?>
+<inkml:ink xmlns:inkml="http://www.w3.org/2003/InkML">
+  <inkml:definitions>
+    <inkml:context xml:id="ctx0">
+      <inkml:inkSource xml:id="inkSrc0">
+        <inkml:traceFormat>
+          <inkml:channel name="X" type="integer" max="1366" units="cm"/>
+          <inkml:channel name="Y" type="integer" max="768" units="cm"/>
+          <inkml:channel name="T" type="integer" max="2.14748E9" units="dev"/>
+        </inkml:traceFormat>
+        <inkml:channelProperties>
+          <inkml:channelProperty channel="X" name="resolution" value="39.7093" units="1/cm"/>
+          <inkml:channelProperty channel="Y" name="resolution" value="39.58763" units="1/cm"/>
+          <inkml:channelProperty channel="T" name="resolution" value="1" units="1/dev"/>
+        </inkml:channelProperties>
+      </inkml:inkSource>
+      <inkml:timestamp xml:id="ts0" timeString="2016-11-03T18:30:48.318"/>
+    </inkml:context>
+    <inkml:brush xml:id="br0">
+      <inkml:brushProperty name="width" value="0.06667" units="cm"/>
+      <inkml:brushProperty name="height" value="0.06667" units="cm"/>
+      <inkml:brushProperty name="color" value="#ED1C24"/>
+      <inkml:brushProperty name="fitToCurve" value="1"/>
+    </inkml:brush>
+  </inkml:definitions>
+  <inkml:trace contextRef="#ctx0" brushRef="#br0">0 0 0</inkml:trace>
+</inkml:ink>
+</file>
+
+<file path=ppt/ink/ink5.xml><?xml version="1.0" encoding="utf-8"?>
+<inkml:ink xmlns:inkml="http://www.w3.org/2003/InkML">
+  <inkml:definitions>
+    <inkml:context xml:id="ctx0">
+      <inkml:inkSource xml:id="inkSrc0">
+        <inkml:traceFormat>
+          <inkml:channel name="X" type="integer" max="1366" units="cm"/>
+          <inkml:channel name="Y" type="integer" max="768" units="cm"/>
+          <inkml:channel name="T" type="integer" max="2.14748E9" units="dev"/>
+        </inkml:traceFormat>
+        <inkml:channelProperties>
+          <inkml:channelProperty channel="X" name="resolution" value="39.7093" units="1/cm"/>
+          <inkml:channelProperty channel="Y" name="resolution" value="39.58763" units="1/cm"/>
+          <inkml:channelProperty channel="T" name="resolution" value="1" units="1/dev"/>
+        </inkml:channelProperties>
+      </inkml:inkSource>
+      <inkml:timestamp xml:id="ts0" timeString="2016-11-03T18:30:48.131"/>
+    </inkml:context>
+    <inkml:brush xml:id="br0">
+      <inkml:brushProperty name="width" value="0.06667" units="cm"/>
+      <inkml:brushProperty name="height" value="0.06667" units="cm"/>
+      <inkml:brushProperty name="color" value="#ED1C24"/>
+      <inkml:brushProperty name="fitToCurve" value="1"/>
+    </inkml:brush>
+  </inkml:definitions>
+  <inkml:trace contextRef="#ctx0" brushRef="#br0">0 0 0</inkml:trace>
+</inkml:ink>
+</file>
+
 <file path=ppt/notesMasters/notesMaster1.xml><?xml version="1.0" encoding="utf-8"?>
 <p:notesMaster xmlns:a="http://schemas.openxmlformats.org/drawingml/2006/main" xmlns:r="http://schemas.openxmlformats.org/officeDocument/2006/relationships" xmlns:p="http://schemas.openxmlformats.org/presentationml/2006/main">
   <p:cSld>
@@ -1042,6 +1189,91 @@
     </a:lvl9pPr>
   </p:notesStyle>
 </p:notesMaster>
+</file>
+
+<file path=ppt/notesSlides/notesSlide1.xml><?xml version="1.0" encoding="utf-8"?>
+<p:notes xmlns:a="http://schemas.openxmlformats.org/drawingml/2006/main" xmlns:r="http://schemas.openxmlformats.org/officeDocument/2006/relationships" xmlns:p="http://schemas.openxmlformats.org/presentationml/2006/main">
+  <p:cSld>
+    <p:spTree>
+      <p:nvGrpSpPr>
+        <p:cNvPr id="1" name=""/>
+        <p:cNvGrpSpPr/>
+        <p:nvPr/>
+      </p:nvGrpSpPr>
+      <p:grpSpPr>
+        <a:xfrm>
+          <a:off x="0" y="0"/>
+          <a:ext cx="0" cy="0"/>
+          <a:chOff x="0" y="0"/>
+          <a:chExt cx="0" cy="0"/>
+        </a:xfrm>
+      </p:grpSpPr>
+      <p:sp>
+        <p:nvSpPr>
+          <p:cNvPr id="2" name="Slide Image Placeholder 1"/>
+          <p:cNvSpPr>
+            <a:spLocks noGrp="1" noRot="1" noChangeAspect="1"/>
+          </p:cNvSpPr>
+          <p:nvPr>
+            <p:ph type="sldImg"/>
+          </p:nvPr>
+        </p:nvSpPr>
+        <p:spPr/>
+      </p:sp>
+      <p:sp>
+        <p:nvSpPr>
+          <p:cNvPr id="3" name="Notes Placeholder 2"/>
+          <p:cNvSpPr>
+            <a:spLocks noGrp="1"/>
+          </p:cNvSpPr>
+          <p:nvPr>
+            <p:ph type="body" idx="1"/>
+          </p:nvPr>
+        </p:nvSpPr>
+        <p:spPr/>
+        <p:txBody>
+          <a:bodyPr/>
+          <a:lstStyle/>
+          <a:p>
+            <a:endParaRPr lang="en-IN" dirty="0"/>
+          </a:p>
+        </p:txBody>
+      </p:sp>
+      <p:sp>
+        <p:nvSpPr>
+          <p:cNvPr id="4" name="Slide Number Placeholder 3"/>
+          <p:cNvSpPr>
+            <a:spLocks noGrp="1"/>
+          </p:cNvSpPr>
+          <p:nvPr>
+            <p:ph type="sldNum" sz="quarter" idx="10"/>
+          </p:nvPr>
+        </p:nvSpPr>
+        <p:spPr/>
+        <p:txBody>
+          <a:bodyPr/>
+          <a:lstStyle/>
+          <a:p>
+            <a:fld id="{C7324988-157E-48A4-8BD0-4BF7D9FE9192}" type="slidenum">
+              <a:rPr lang="en-US" smtClean="0"/>
+              <a:pPr/>
+              <a:t>3</a:t>
+            </a:fld>
+            <a:endParaRPr lang="en-US"/>
+          </a:p>
+        </p:txBody>
+      </p:sp>
+    </p:spTree>
+    <p:extLst>
+      <p:ext uri="{BB962C8B-B14F-4D97-AF65-F5344CB8AC3E}">
+        <p14:creationId xmlns:p14="http://schemas.microsoft.com/office/powerpoint/2010/main" val="2516127037"/>
+      </p:ext>
+    </p:extLst>
+  </p:cSld>
+  <p:clrMapOvr>
+    <a:masterClrMapping/>
+  </p:clrMapOvr>
+</p:notes>
 </file>
 
 <file path=ppt/slideLayouts/slideLayout1.xml><?xml version="1.0" encoding="utf-8"?>
@@ -5676,7 +5908,7 @@
       </p:grpSpPr>
       <p:sp>
         <p:nvSpPr>
-          <p:cNvPr id="27650" name="Rectangle 2"/>
+          <p:cNvPr id="23554" name="Rectangle 2"/>
           <p:cNvSpPr>
             <a:spLocks noGrp="1" noChangeArrowheads="1"/>
           </p:cNvSpPr>
@@ -5690,15 +5922,20 @@
           <a:lstStyle/>
           <a:p>
             <a:r>
-              <a:rPr lang="en-US"/>
-              <a:t>Procedures</a:t>
-            </a:r>
-          </a:p>
-        </p:txBody>
-      </p:sp>
-      <p:sp>
-        <p:nvSpPr>
-          <p:cNvPr id="27651" name="Rectangle 3"/>
+              <a:rPr lang="en-US" dirty="0"/>
+              <a:t>Competitive </a:t>
+            </a:r>
+            <a:r>
+              <a:rPr lang="en-US" dirty="0" smtClean="0"/>
+              <a:t>Analysis/Similar System</a:t>
+            </a:r>
+            <a:endParaRPr lang="en-US" dirty="0"/>
+          </a:p>
+        </p:txBody>
+      </p:sp>
+      <p:sp>
+        <p:nvSpPr>
+          <p:cNvPr id="23555" name="Rectangle 3"/>
           <p:cNvSpPr>
             <a:spLocks noGrp="1" noChangeArrowheads="1"/>
           </p:cNvSpPr>
@@ -5711,89 +5948,41 @@
           <a:bodyPr/>
           <a:lstStyle/>
           <a:p>
-            <a:r>
-              <a:rPr lang="en-US"/>
-              <a:t>Highlight any procedural differences from usual projects of this type</a:t>
-            </a:r>
-          </a:p>
-          <a:p>
-            <a:r>
-              <a:rPr lang="en-US"/>
-              <a:t>Discuss requirements, benefits, and issues of using new procedures</a:t>
-            </a:r>
-          </a:p>
-        </p:txBody>
-      </p:sp>
-      <p:sp>
-        <p:nvSpPr>
-          <p:cNvPr id="27652" name="Text Box 4"/>
-          <p:cNvSpPr txBox="1">
-            <a:spLocks noChangeArrowheads="1"/>
-          </p:cNvSpPr>
-          <p:nvPr/>
-        </p:nvSpPr>
-        <p:spPr bwMode="auto">
-          <a:xfrm>
-            <a:off x="1905000" y="5943600"/>
-            <a:ext cx="6553200" cy="517525"/>
-          </a:xfrm>
-          <a:prstGeom prst="rect">
-            <a:avLst/>
-          </a:prstGeom>
-          <a:noFill/>
-          <a:ln>
-            <a:noFill/>
-          </a:ln>
-          <a:effectLst/>
-          <a:extLst>
-            <a:ext uri="{909E8E84-426E-40DD-AFC4-6F175D3DCCD1}">
-              <a14:hiddenFill xmlns:a14="http://schemas.microsoft.com/office/drawing/2010/main">
-                <a:solidFill>
-                  <a:schemeClr val="accent1"/>
-                </a:solidFill>
-              </a14:hiddenFill>
-            </a:ext>
-            <a:ext uri="{91240B29-F687-4F45-9708-019B960494DF}">
-              <a14:hiddenLine xmlns:a14="http://schemas.microsoft.com/office/drawing/2010/main" w="12700" cap="sq">
-                <a:solidFill>
-                  <a:schemeClr val="tx1"/>
-                </a:solidFill>
-                <a:miter lim="800000"/>
-                <a:headEnd type="none" w="sm" len="sm"/>
-                <a:tailEnd type="none" w="sm" len="sm"/>
-              </a14:hiddenLine>
-            </a:ext>
-            <a:ext uri="{AF507438-7753-43E0-B8FC-AC1667EBCBE1}">
-              <a14:hiddenEffects xmlns:a14="http://schemas.microsoft.com/office/drawing/2010/main">
-                <a:effectLst>
-                  <a:outerShdw dist="35921" dir="2700000" algn="ctr" rotWithShape="0">
-                    <a:schemeClr val="bg2"/>
-                  </a:outerShdw>
-                </a:effectLst>
-              </a14:hiddenEffects>
-            </a:ext>
-          </a:extLst>
-        </p:spPr>
-        <p:txBody>
-          <a:bodyPr>
-            <a:spAutoFit/>
-          </a:bodyPr>
-          <a:lstStyle/>
-          <a:p>
-            <a:r>
-              <a:rPr lang="en-US" sz="1400" b="1">
-                <a:latin typeface="Trebuchet MS" pitchFamily="34" charset="0"/>
-              </a:rPr>
-              <a:t>-for more info…</a:t>
-            </a:r>
-          </a:p>
-          <a:p>
-            <a:r>
-              <a:rPr lang="en-US" sz="1400">
-                <a:latin typeface="Trebuchet MS" pitchFamily="34" charset="0"/>
-              </a:rPr>
-              <a:t>List location or contact for procedures document (or other related documents)</a:t>
-            </a:r>
+            <a:pPr marL="0" indent="0">
+              <a:buNone/>
+            </a:pPr>
+            <a:r>
+              <a:rPr lang="en-US" dirty="0" smtClean="0"/>
+              <a:t>			1.</a:t>
+            </a:r>
+            <a:r>
+              <a:rPr lang="en-US" u="sng" dirty="0" smtClean="0"/>
+              <a:t> </a:t>
+            </a:r>
+            <a:r>
+              <a:rPr lang="en-US" u="sng" dirty="0" err="1" smtClean="0"/>
+              <a:t>LiDDMT</a:t>
+            </a:r>
+            <a:endParaRPr lang="en-US" u="sng" dirty="0"/>
+          </a:p>
+          <a:p>
+            <a:r>
+              <a:rPr lang="en-US" dirty="0" smtClean="0"/>
+              <a:t>Comes Close by mining data from SW using WEKA</a:t>
+            </a:r>
+          </a:p>
+          <a:p>
+            <a:r>
+              <a:rPr lang="en-US" dirty="0" smtClean="0"/>
+              <a:t>Developed as a Research Project for Ph.D. by a group of university professors</a:t>
+            </a:r>
+          </a:p>
+          <a:p>
+            <a:r>
+              <a:rPr lang="en-US" dirty="0" smtClean="0"/>
+              <a:t>Doesn’t mine Association Rules, Does clustering only</a:t>
+            </a:r>
+            <a:endParaRPr lang="en-US" dirty="0"/>
           </a:p>
         </p:txBody>
       </p:sp>
@@ -5802,6 +5991,13 @@
   <p:clrMapOvr>
     <a:masterClrMapping/>
   </p:clrMapOvr>
+  <p:timing>
+    <p:tnLst>
+      <p:par>
+        <p:cTn id="1" dur="indefinite" restart="never" nodeType="tmRoot"/>
+      </p:par>
+    </p:tnLst>
+  </p:timing>
 </p:sld>
 </file>
 
@@ -5824,126 +6020,194 @@
       </p:grpSpPr>
       <p:sp>
         <p:nvSpPr>
-          <p:cNvPr id="28674" name="Rectangle 2"/>
-          <p:cNvSpPr>
-            <a:spLocks noGrp="1" noChangeArrowheads="1"/>
-          </p:cNvSpPr>
-          <p:nvPr>
-            <p:ph type="title"/>
-          </p:nvPr>
-        </p:nvSpPr>
-        <p:spPr/>
+          <p:cNvPr id="2" name="Title 1"/>
+          <p:cNvSpPr>
+            <a:spLocks noGrp="1"/>
+          </p:cNvSpPr>
+          <p:nvPr>
+            <p:ph type="ctrTitle" sz="quarter"/>
+          </p:nvPr>
+        </p:nvSpPr>
+        <p:spPr>
+          <a:xfrm>
+            <a:off x="1403648" y="1124744"/>
+            <a:ext cx="6705600" cy="1447800"/>
+          </a:xfrm>
+        </p:spPr>
         <p:txBody>
           <a:bodyPr/>
           <a:lstStyle/>
           <a:p>
-            <a:r>
-              <a:rPr lang="en-US"/>
-              <a:t>Schedule</a:t>
-            </a:r>
-          </a:p>
-        </p:txBody>
-      </p:sp>
-      <p:sp>
-        <p:nvSpPr>
-          <p:cNvPr id="28675" name="Rectangle 3"/>
-          <p:cNvSpPr>
-            <a:spLocks noGrp="1" noChangeArrowheads="1"/>
-          </p:cNvSpPr>
-          <p:nvPr>
-            <p:ph type="body" idx="1"/>
-          </p:nvPr>
-        </p:nvSpPr>
-        <p:spPr/>
+            <a:pPr algn="ctr"/>
+            <a:r>
+              <a:rPr lang="en-IN" dirty="0" smtClean="0"/>
+              <a:t>Where’s the Dataset?</a:t>
+            </a:r>
+            <a:endParaRPr lang="en-IN" dirty="0"/>
+          </a:p>
+        </p:txBody>
+      </p:sp>
+      <p:sp>
+        <p:nvSpPr>
+          <p:cNvPr id="3" name="Subtitle 2"/>
+          <p:cNvSpPr>
+            <a:spLocks noGrp="1"/>
+          </p:cNvSpPr>
+          <p:nvPr>
+            <p:ph type="subTitle" sz="quarter" idx="1"/>
+          </p:nvPr>
+        </p:nvSpPr>
+        <p:spPr>
+          <a:xfrm>
+            <a:off x="1907704" y="2924944"/>
+            <a:ext cx="6400800" cy="1752600"/>
+          </a:xfrm>
+        </p:spPr>
         <p:txBody>
           <a:bodyPr/>
           <a:lstStyle/>
           <a:p>
-            <a:r>
-              <a:rPr lang="en-US"/>
-              <a:t>Review high-level schedule</a:t>
-            </a:r>
-          </a:p>
-        </p:txBody>
-      </p:sp>
-      <p:sp>
-        <p:nvSpPr>
-          <p:cNvPr id="28676" name="Text Box 4"/>
-          <p:cNvSpPr txBox="1">
-            <a:spLocks noChangeArrowheads="1"/>
-          </p:cNvSpPr>
+            <a:pPr marL="457200" indent="-457200">
+              <a:buFont typeface="+mj-lt"/>
+              <a:buAutoNum type="arabicPeriod"/>
+            </a:pPr>
+            <a:r>
+              <a:rPr lang="en-IN" dirty="0" err="1" smtClean="0"/>
+              <a:t>Dbpedia</a:t>
+            </a:r>
+            <a:endParaRPr lang="en-IN" dirty="0" smtClean="0"/>
+          </a:p>
+          <a:p>
+            <a:pPr marL="457200" indent="-457200">
+              <a:buFont typeface="+mj-lt"/>
+              <a:buAutoNum type="arabicPeriod"/>
+            </a:pPr>
+            <a:r>
+              <a:rPr lang="en-IN" dirty="0" err="1" smtClean="0"/>
+              <a:t>Factbook</a:t>
+            </a:r>
+            <a:endParaRPr lang="en-IN" dirty="0" smtClean="0"/>
+          </a:p>
+          <a:p>
+            <a:pPr marL="457200" indent="-457200">
+              <a:buFont typeface="+mj-lt"/>
+              <a:buAutoNum type="arabicPeriod"/>
+            </a:pPr>
+            <a:r>
+              <a:rPr lang="en-IN" dirty="0" smtClean="0"/>
+              <a:t>Eurostat</a:t>
+            </a:r>
+            <a:endParaRPr lang="en-IN" dirty="0"/>
+          </a:p>
+        </p:txBody>
+      </p:sp>
+      <p:pic>
+        <p:nvPicPr>
+          <p:cNvPr id="4" name="Picture 3"/>
+          <p:cNvPicPr>
+            <a:picLocks noChangeAspect="1"/>
+          </p:cNvPicPr>
           <p:nvPr/>
-        </p:nvSpPr>
-        <p:spPr bwMode="auto">
+        </p:nvPicPr>
+        <p:blipFill>
+          <a:blip r:embed="rId2">
+            <a:extLst>
+              <a:ext uri="{28A0092B-C50C-407E-A947-70E740481C1C}">
+                <a14:useLocalDpi xmlns:a14="http://schemas.microsoft.com/office/drawing/2010/main" val="0"/>
+              </a:ext>
+            </a:extLst>
+          </a:blip>
+          <a:stretch>
+            <a:fillRect/>
+          </a:stretch>
+        </p:blipFill>
+        <p:spPr>
           <a:xfrm>
-            <a:off x="1905000" y="5943600"/>
-            <a:ext cx="6553200" cy="517525"/>
+            <a:off x="6084168" y="2546581"/>
+            <a:ext cx="2722336" cy="1923504"/>
           </a:xfrm>
           <a:prstGeom prst="rect">
             <a:avLst/>
           </a:prstGeom>
-          <a:noFill/>
-          <a:ln>
-            <a:noFill/>
-          </a:ln>
-          <a:effectLst/>
-          <a:extLst>
-            <a:ext uri="{909E8E84-426E-40DD-AFC4-6F175D3DCCD1}">
-              <a14:hiddenFill xmlns:a14="http://schemas.microsoft.com/office/drawing/2010/main">
-                <a:solidFill>
-                  <a:schemeClr val="accent1"/>
-                </a:solidFill>
-              </a14:hiddenFill>
-            </a:ext>
-            <a:ext uri="{91240B29-F687-4F45-9708-019B960494DF}">
-              <a14:hiddenLine xmlns:a14="http://schemas.microsoft.com/office/drawing/2010/main" w="12700" cap="sq">
-                <a:solidFill>
-                  <a:schemeClr val="tx1"/>
-                </a:solidFill>
-                <a:miter lim="800000"/>
-                <a:headEnd type="none" w="sm" len="sm"/>
-                <a:tailEnd type="none" w="sm" len="sm"/>
-              </a14:hiddenLine>
-            </a:ext>
-            <a:ext uri="{AF507438-7753-43E0-B8FC-AC1667EBCBE1}">
-              <a14:hiddenEffects xmlns:a14="http://schemas.microsoft.com/office/drawing/2010/main">
-                <a:effectLst>
-                  <a:outerShdw dist="35921" dir="2700000" algn="ctr" rotWithShape="0">
-                    <a:schemeClr val="bg2"/>
-                  </a:outerShdw>
-                </a:effectLst>
-              </a14:hiddenEffects>
-            </a:ext>
-          </a:extLst>
         </p:spPr>
-        <p:txBody>
-          <a:bodyPr>
-            <a:spAutoFit/>
-          </a:bodyPr>
-          <a:lstStyle/>
-          <a:p>
-            <a:r>
-              <a:rPr lang="en-US" sz="1400" b="1">
-                <a:latin typeface="Trebuchet MS" pitchFamily="34" charset="0"/>
-              </a:rPr>
-              <a:t>-for more info…</a:t>
-            </a:r>
-          </a:p>
-          <a:p>
-            <a:r>
-              <a:rPr lang="en-US" sz="1400">
-                <a:latin typeface="Trebuchet MS" pitchFamily="34" charset="0"/>
-              </a:rPr>
-              <a:t>List location or contact for detailed schedule (or other related documents)</a:t>
-            </a:r>
-          </a:p>
-        </p:txBody>
-      </p:sp>
+      </p:pic>
+      <p:pic>
+        <p:nvPicPr>
+          <p:cNvPr id="5" name="Picture 4"/>
+          <p:cNvPicPr>
+            <a:picLocks noChangeAspect="1"/>
+          </p:cNvPicPr>
+          <p:nvPr/>
+        </p:nvPicPr>
+        <p:blipFill>
+          <a:blip r:embed="rId3" cstate="print">
+            <a:extLst>
+              <a:ext uri="{28A0092B-C50C-407E-A947-70E740481C1C}">
+                <a14:useLocalDpi xmlns:a14="http://schemas.microsoft.com/office/drawing/2010/main" val="0"/>
+              </a:ext>
+            </a:extLst>
+          </a:blip>
+          <a:stretch>
+            <a:fillRect/>
+          </a:stretch>
+        </p:blipFill>
+        <p:spPr>
+          <a:xfrm>
+            <a:off x="6392252" y="4708376"/>
+            <a:ext cx="2106168" cy="819912"/>
+          </a:xfrm>
+          <a:prstGeom prst="rect">
+            <a:avLst/>
+          </a:prstGeom>
+        </p:spPr>
+      </p:pic>
+      <p:pic>
+        <p:nvPicPr>
+          <p:cNvPr id="6" name="Picture 5"/>
+          <p:cNvPicPr>
+            <a:picLocks noChangeAspect="1"/>
+          </p:cNvPicPr>
+          <p:nvPr/>
+        </p:nvPicPr>
+        <p:blipFill>
+          <a:blip r:embed="rId4">
+            <a:extLst>
+              <a:ext uri="{28A0092B-C50C-407E-A947-70E740481C1C}">
+                <a14:useLocalDpi xmlns:a14="http://schemas.microsoft.com/office/drawing/2010/main" val="0"/>
+              </a:ext>
+            </a:extLst>
+          </a:blip>
+          <a:stretch>
+            <a:fillRect/>
+          </a:stretch>
+        </p:blipFill>
+        <p:spPr>
+          <a:xfrm>
+            <a:off x="3131840" y="4737283"/>
+            <a:ext cx="2095500" cy="952500"/>
+          </a:xfrm>
+          <a:prstGeom prst="rect">
+            <a:avLst/>
+          </a:prstGeom>
+        </p:spPr>
+      </p:pic>
     </p:spTree>
+    <p:extLst>
+      <p:ext uri="{BB962C8B-B14F-4D97-AF65-F5344CB8AC3E}">
+        <p14:creationId xmlns:p14="http://schemas.microsoft.com/office/powerpoint/2010/main" val="669828626"/>
+      </p:ext>
+    </p:extLst>
   </p:cSld>
   <p:clrMapOvr>
     <a:masterClrMapping/>
   </p:clrMapOvr>
+  <p:timing>
+    <p:tnLst>
+      <p:par>
+        <p:cTn id="1" dur="indefinite" restart="never" nodeType="tmRoot"/>
+      </p:par>
+    </p:tnLst>
+  </p:timing>
 </p:sld>
 </file>
 
@@ -5966,7 +6230,7 @@
       </p:grpSpPr>
       <p:sp>
         <p:nvSpPr>
-          <p:cNvPr id="29698" name="Rectangle 2"/>
+          <p:cNvPr id="24578" name="Rectangle 2"/>
           <p:cNvSpPr>
             <a:spLocks noGrp="1" noChangeArrowheads="1"/>
           </p:cNvSpPr>
@@ -5980,15 +6244,16 @@
           <a:lstStyle/>
           <a:p>
             <a:r>
-              <a:rPr lang="en-US"/>
-              <a:t>Current Status</a:t>
-            </a:r>
-          </a:p>
-        </p:txBody>
-      </p:sp>
-      <p:sp>
-        <p:nvSpPr>
-          <p:cNvPr id="29699" name="Rectangle 3"/>
+              <a:rPr lang="en-US" dirty="0" smtClean="0"/>
+              <a:t>Data Structure To Be Used</a:t>
+            </a:r>
+            <a:endParaRPr lang="en-US" dirty="0"/>
+          </a:p>
+        </p:txBody>
+      </p:sp>
+      <p:sp>
+        <p:nvSpPr>
+          <p:cNvPr id="24579" name="Rectangle 3"/>
           <p:cNvSpPr>
             <a:spLocks noGrp="1" noChangeArrowheads="1"/>
           </p:cNvSpPr>
@@ -6002,36 +6267,62 @@
           <a:lstStyle/>
           <a:p>
             <a:r>
-              <a:rPr lang="en-US"/>
-              <a:t>High-level overview of progress against schedule</a:t>
-            </a:r>
-          </a:p>
-          <a:p>
-            <a:pPr lvl="1"/>
-            <a:r>
-              <a:rPr lang="en-US"/>
-              <a:t>On-track in what areas</a:t>
-            </a:r>
-          </a:p>
-          <a:p>
-            <a:pPr lvl="1"/>
-            <a:r>
-              <a:rPr lang="en-US"/>
-              <a:t>Behind in what areas</a:t>
-            </a:r>
-          </a:p>
-          <a:p>
-            <a:pPr lvl="1"/>
-            <a:r>
-              <a:rPr lang="en-US"/>
-              <a:t>Ahead in what areas</a:t>
-            </a:r>
-          </a:p>
-          <a:p>
-            <a:r>
-              <a:rPr lang="en-US"/>
-              <a:t>Unexpected delays or issues</a:t>
-            </a:r>
+              <a:rPr lang="en-US" dirty="0" smtClean="0"/>
+              <a:t>Data Stored as triples </a:t>
+            </a:r>
+            <a:r>
+              <a:rPr lang="en-US" dirty="0" smtClean="0">
+                <a:sym typeface="Wingdings" panose="05000000000000000000" pitchFamily="2" charset="2"/>
+              </a:rPr>
+              <a:t> </a:t>
+            </a:r>
+            <a:r>
+              <a:rPr lang="en-US" dirty="0" smtClean="0"/>
+              <a:t>requires three entities </a:t>
+            </a:r>
+            <a:r>
+              <a:rPr lang="en-US" dirty="0" smtClean="0">
+                <a:sym typeface="Wingdings" panose="05000000000000000000" pitchFamily="2" charset="2"/>
+              </a:rPr>
+              <a:t> 3D Cube (3D Array)!</a:t>
+            </a:r>
+          </a:p>
+          <a:p>
+            <a:r>
+              <a:rPr lang="en-US" dirty="0" smtClean="0">
+                <a:sym typeface="Wingdings" panose="05000000000000000000" pitchFamily="2" charset="2"/>
+              </a:rPr>
+              <a:t>Strength : Faster Traversal</a:t>
+            </a:r>
+          </a:p>
+          <a:p>
+            <a:r>
+              <a:rPr lang="en-US" dirty="0" smtClean="0">
+                <a:sym typeface="Wingdings" panose="05000000000000000000" pitchFamily="2" charset="2"/>
+              </a:rPr>
+              <a:t>Weakness : Memory Wastage, Can’t represent </a:t>
+            </a:r>
+            <a:r>
+              <a:rPr lang="en-US" dirty="0">
+                <a:sym typeface="Wingdings" panose="05000000000000000000" pitchFamily="2" charset="2"/>
+              </a:rPr>
+              <a:t>all triples (</a:t>
+            </a:r>
+            <a:r>
+              <a:rPr lang="en-US" dirty="0" smtClean="0">
+                <a:sym typeface="Wingdings" panose="05000000000000000000" pitchFamily="2" charset="2"/>
+              </a:rPr>
+              <a:t>203953773 * 3), Can’t easily trace possible relationships if any exist already</a:t>
+            </a:r>
+          </a:p>
+          <a:p>
+            <a:r>
+              <a:rPr lang="en-US" dirty="0" smtClean="0">
+                <a:sym typeface="Wingdings" panose="05000000000000000000" pitchFamily="2" charset="2"/>
+              </a:rPr>
+              <a:t>Weaknesses &gt; Strengths! Boo!</a:t>
+            </a:r>
+            <a:endParaRPr lang="en-US" dirty="0"/>
           </a:p>
         </p:txBody>
       </p:sp>
@@ -6040,6 +6331,13 @@
   <p:clrMapOvr>
     <a:masterClrMapping/>
   </p:clrMapOvr>
+  <p:timing>
+    <p:tnLst>
+      <p:par>
+        <p:cTn id="1" dur="indefinite" restart="never" nodeType="tmRoot"/>
+      </p:par>
+    </p:tnLst>
+  </p:timing>
 </p:sld>
 </file>
 
@@ -6062,9 +6360,9 @@
       </p:grpSpPr>
       <p:sp>
         <p:nvSpPr>
-          <p:cNvPr id="30722" name="Rectangle 2"/>
-          <p:cNvSpPr>
-            <a:spLocks noGrp="1" noChangeArrowheads="1"/>
+          <p:cNvPr id="2" name="Title 1"/>
+          <p:cNvSpPr>
+            <a:spLocks noGrp="1"/>
           </p:cNvSpPr>
           <p:nvPr>
             <p:ph type="title"/>
@@ -6076,85 +6374,921 @@
           <a:lstStyle/>
           <a:p>
             <a:r>
-              <a:rPr lang="en-US"/>
-              <a:t>Related Documents</a:t>
-            </a:r>
-          </a:p>
-        </p:txBody>
-      </p:sp>
-      <p:sp>
-        <p:nvSpPr>
-          <p:cNvPr id="30723" name="Rectangle 3"/>
-          <p:cNvSpPr>
-            <a:spLocks noGrp="1" noChangeArrowheads="1"/>
-          </p:cNvSpPr>
-          <p:nvPr>
-            <p:ph type="body" idx="1"/>
-          </p:nvPr>
-        </p:nvSpPr>
-        <p:spPr/>
+              <a:rPr lang="en-IN" dirty="0" smtClean="0"/>
+              <a:t>Data Structure We will use!</a:t>
+            </a:r>
+            <a:endParaRPr lang="en-IN" dirty="0"/>
+          </a:p>
+        </p:txBody>
+      </p:sp>
+      <p:sp>
+        <p:nvSpPr>
+          <p:cNvPr id="3" name="Content Placeholder 2"/>
+          <p:cNvSpPr>
+            <a:spLocks noGrp="1"/>
+          </p:cNvSpPr>
+          <p:nvPr>
+            <p:ph idx="1"/>
+          </p:nvPr>
+        </p:nvSpPr>
+        <p:spPr>
+          <a:xfrm>
+            <a:off x="1835696" y="1891898"/>
+            <a:ext cx="6324600" cy="633754"/>
+          </a:xfrm>
+        </p:spPr>
         <p:txBody>
           <a:bodyPr/>
           <a:lstStyle/>
           <a:p>
+            <a:pPr>
+              <a:buFont typeface="Wingdings" panose="05000000000000000000" pitchFamily="2" charset="2"/>
+              <a:buChar char="§"/>
+            </a:pPr>
+            <a:r>
+              <a:rPr lang="en-IN" dirty="0" smtClean="0"/>
+              <a:t> </a:t>
+            </a:r>
+            <a:r>
+              <a:rPr lang="en-IN" dirty="0" err="1" smtClean="0"/>
+              <a:t>LinkedList</a:t>
+            </a:r>
+            <a:r>
+              <a:rPr lang="en-IN" dirty="0" smtClean="0"/>
+              <a:t> like Data Structure</a:t>
+            </a:r>
+          </a:p>
+          <a:p>
+            <a:pPr marL="0" indent="0">
+              <a:buNone/>
+            </a:pPr>
+            <a:endParaRPr lang="en-IN" dirty="0"/>
+          </a:p>
+        </p:txBody>
+      </p:sp>
+      <p:sp>
+        <p:nvSpPr>
+          <p:cNvPr id="4" name="Rectangle 3"/>
+          <p:cNvSpPr/>
+          <p:nvPr/>
+        </p:nvSpPr>
+        <p:spPr bwMode="auto">
+          <a:xfrm>
+            <a:off x="1199551" y="3717032"/>
+            <a:ext cx="1440160" cy="504056"/>
+          </a:xfrm>
+          <a:prstGeom prst="rect">
+            <a:avLst/>
+          </a:prstGeom>
+          <a:ln>
+            <a:headEnd type="none" w="sm" len="sm"/>
+            <a:tailEnd type="none" w="sm" len="sm"/>
+          </a:ln>
+          <a:extLst/>
+        </p:spPr>
+        <p:style>
+          <a:lnRef idx="2">
+            <a:schemeClr val="accent6">
+              <a:shade val="50000"/>
+            </a:schemeClr>
+          </a:lnRef>
+          <a:fillRef idx="1">
+            <a:schemeClr val="accent6"/>
+          </a:fillRef>
+          <a:effectRef idx="0">
+            <a:schemeClr val="accent6"/>
+          </a:effectRef>
+          <a:fontRef idx="minor">
+            <a:schemeClr val="lt1"/>
+          </a:fontRef>
+        </p:style>
+        <p:txBody>
+          <a:bodyPr vert="horz" wrap="square" lIns="91440" tIns="45720" rIns="91440" bIns="45720" numCol="1" rtlCol="0" anchor="t" anchorCtr="0" compatLnSpc="1">
+            <a:prstTxWarp prst="textNoShape">
+              <a:avLst/>
+            </a:prstTxWarp>
+          </a:bodyPr>
+          <a:lstStyle/>
+          <a:p>
+            <a:pPr marL="0" marR="0" indent="0" algn="l" defTabSz="914400" rtl="0" eaLnBrk="1" fontAlgn="base" latinLnBrk="0" hangingPunct="1">
+              <a:lnSpc>
+                <a:spcPct val="100000"/>
+              </a:lnSpc>
+              <a:spcBef>
+                <a:spcPct val="0"/>
+              </a:spcBef>
+              <a:spcAft>
+                <a:spcPct val="0"/>
+              </a:spcAft>
+              <a:buClrTx/>
+              <a:buSzTx/>
+              <a:buFontTx/>
+              <a:buNone/>
+              <a:tabLst/>
+            </a:pPr>
+            <a:r>
+              <a:rPr kumimoji="0" lang="en-IN" sz="2400" b="0" i="0" u="none" strike="noStrike" cap="none" normalizeH="0" baseline="0" dirty="0" smtClean="0">
+                <a:ln>
+                  <a:noFill/>
+                </a:ln>
+                <a:solidFill>
+                  <a:schemeClr val="tx1"/>
+                </a:solidFill>
+                <a:effectLst/>
+                <a:latin typeface="Times New Roman" pitchFamily="18" charset="0"/>
+              </a:rPr>
+              <a:t>Object ID</a:t>
+            </a:r>
+          </a:p>
+        </p:txBody>
+      </p:sp>
+      <p:graphicFrame>
+        <p:nvGraphicFramePr>
+          <p:cNvPr id="6" name="Table 5"/>
+          <p:cNvGraphicFramePr>
+            <a:graphicFrameLocks noGrp="1"/>
+          </p:cNvGraphicFramePr>
+          <p:nvPr>
+            <p:extLst/>
+          </p:nvPr>
+        </p:nvGraphicFramePr>
+        <p:xfrm>
+          <a:off x="3347864" y="3645025"/>
+          <a:ext cx="3934135" cy="1405879"/>
+        </p:xfrm>
+        <a:graphic>
+          <a:graphicData uri="http://schemas.openxmlformats.org/drawingml/2006/table">
+            <a:tbl>
+              <a:tblPr firstRow="1" bandRow="1">
+                <a:tableStyleId>{7DF18680-E054-41AD-8BC1-D1AEF772440D}</a:tableStyleId>
+              </a:tblPr>
+              <a:tblGrid>
+                <a:gridCol w="1473412">
+                  <a:extLst>
+                    <a:ext uri="{9D8B030D-6E8A-4147-A177-3AD203B41FA5}">
+                      <a16:colId xmlns:a16="http://schemas.microsoft.com/office/drawing/2014/main" val="2724991554"/>
+                    </a:ext>
+                  </a:extLst>
+                </a:gridCol>
+                <a:gridCol w="2460723">
+                  <a:extLst>
+                    <a:ext uri="{9D8B030D-6E8A-4147-A177-3AD203B41FA5}">
+                      <a16:colId xmlns:a16="http://schemas.microsoft.com/office/drawing/2014/main" val="1368784380"/>
+                    </a:ext>
+                  </a:extLst>
+                </a:gridCol>
+              </a:tblGrid>
+              <a:tr h="656077">
+                <a:tc>
+                  <a:txBody>
+                    <a:bodyPr/>
+                    <a:lstStyle/>
+                    <a:p>
+                      <a:r>
+                        <a:rPr lang="en-IN" dirty="0" smtClean="0"/>
+                        <a:t>Predicate ID</a:t>
+                      </a:r>
+                      <a:endParaRPr lang="en-IN" dirty="0"/>
+                    </a:p>
+                  </a:txBody>
+                  <a:tcPr/>
+                </a:tc>
+                <a:tc>
+                  <a:txBody>
+                    <a:bodyPr/>
+                    <a:lstStyle/>
+                    <a:p>
+                      <a:r>
+                        <a:rPr lang="en-IN" dirty="0" smtClean="0"/>
+                        <a:t>Subject List</a:t>
+                      </a:r>
+                      <a:endParaRPr lang="en-IN" dirty="0"/>
+                    </a:p>
+                  </a:txBody>
+                  <a:tcPr/>
+                </a:tc>
+                <a:extLst>
+                  <a:ext uri="{0D108BD9-81ED-4DB2-BD59-A6C34878D82A}">
+                    <a16:rowId xmlns:a16="http://schemas.microsoft.com/office/drawing/2014/main" val="1453611570"/>
+                  </a:ext>
+                </a:extLst>
+              </a:tr>
+              <a:tr h="374901">
+                <a:tc>
+                  <a:txBody>
+                    <a:bodyPr/>
+                    <a:lstStyle/>
+                    <a:p>
+                      <a:endParaRPr lang="en-IN" dirty="0"/>
+                    </a:p>
+                  </a:txBody>
+                  <a:tcPr/>
+                </a:tc>
+                <a:tc>
+                  <a:txBody>
+                    <a:bodyPr/>
+                    <a:lstStyle/>
+                    <a:p>
+                      <a:r>
+                        <a:rPr lang="en-IN" sz="1400" dirty="0" smtClean="0"/>
+                        <a:t>(Essentially</a:t>
+                      </a:r>
+                      <a:r>
+                        <a:rPr lang="en-IN" sz="1400" baseline="0" dirty="0" smtClean="0"/>
+                        <a:t> Pointers to List</a:t>
+                      </a:r>
+                      <a:r>
+                        <a:rPr lang="en-IN" sz="1400" dirty="0" smtClean="0"/>
+                        <a:t>)</a:t>
+                      </a:r>
+                      <a:endParaRPr lang="en-IN" sz="1400" dirty="0"/>
+                    </a:p>
+                  </a:txBody>
+                  <a:tcPr/>
+                </a:tc>
+                <a:extLst>
+                  <a:ext uri="{0D108BD9-81ED-4DB2-BD59-A6C34878D82A}">
+                    <a16:rowId xmlns:a16="http://schemas.microsoft.com/office/drawing/2014/main" val="685058534"/>
+                  </a:ext>
+                </a:extLst>
+              </a:tr>
+              <a:tr h="374901">
+                <a:tc>
+                  <a:txBody>
+                    <a:bodyPr/>
+                    <a:lstStyle/>
+                    <a:p>
+                      <a:endParaRPr lang="en-IN"/>
+                    </a:p>
+                  </a:txBody>
+                  <a:tcPr/>
+                </a:tc>
+                <a:tc>
+                  <a:txBody>
+                    <a:bodyPr/>
+                    <a:lstStyle/>
+                    <a:p>
+                      <a:endParaRPr lang="en-IN" dirty="0"/>
+                    </a:p>
+                  </a:txBody>
+                  <a:tcPr/>
+                </a:tc>
+                <a:extLst>
+                  <a:ext uri="{0D108BD9-81ED-4DB2-BD59-A6C34878D82A}">
+                    <a16:rowId xmlns:a16="http://schemas.microsoft.com/office/drawing/2014/main" val="1613271540"/>
+                  </a:ext>
+                </a:extLst>
+              </a:tr>
+            </a:tbl>
+          </a:graphicData>
+        </a:graphic>
+      </p:graphicFrame>
+      <p:cxnSp>
+        <p:nvCxnSpPr>
+          <p:cNvPr id="8" name="Straight Arrow Connector 7"/>
+          <p:cNvCxnSpPr/>
+          <p:nvPr/>
+        </p:nvCxnSpPr>
+        <p:spPr bwMode="auto">
+          <a:xfrm flipH="1">
+            <a:off x="2639711" y="4125256"/>
+            <a:ext cx="708153" cy="0"/>
+          </a:xfrm>
+          <a:prstGeom prst="straightConnector1">
+            <a:avLst/>
+          </a:prstGeom>
+          <a:solidFill>
+            <a:schemeClr val="accent1"/>
+          </a:solidFill>
+          <a:ln w="12700" cap="sq" cmpd="sng" algn="ctr">
+            <a:solidFill>
+              <a:schemeClr val="tx1"/>
+            </a:solidFill>
+            <a:prstDash val="solid"/>
+            <a:round/>
+            <a:headEnd type="none" w="sm" len="sm"/>
+            <a:tailEnd type="triangle"/>
+          </a:ln>
+          <a:effectLst/>
+          <a:extLst>
+            <a:ext uri="{AF507438-7753-43E0-B8FC-AC1667EBCBE1}">
+              <a14:hiddenEffects xmlns:a14="http://schemas.microsoft.com/office/drawing/2010/main">
+                <a:effectLst>
+                  <a:outerShdw dist="35921" dir="2700000" algn="ctr" rotWithShape="0">
+                    <a:schemeClr val="bg2"/>
+                  </a:outerShdw>
+                </a:effectLst>
+              </a14:hiddenEffects>
+            </a:ext>
+          </a:extLst>
+        </p:spPr>
+      </p:cxnSp>
+      <p:cxnSp>
+        <p:nvCxnSpPr>
+          <p:cNvPr id="10" name="Straight Arrow Connector 9"/>
+          <p:cNvCxnSpPr/>
+          <p:nvPr/>
+        </p:nvCxnSpPr>
+        <p:spPr bwMode="auto">
+          <a:xfrm flipH="1">
+            <a:off x="2639711" y="3993141"/>
+            <a:ext cx="708153" cy="0"/>
+          </a:xfrm>
+          <a:prstGeom prst="straightConnector1">
+            <a:avLst/>
+          </a:prstGeom>
+          <a:solidFill>
+            <a:schemeClr val="accent1"/>
+          </a:solidFill>
+          <a:ln w="12700" cap="sq" cmpd="sng" algn="ctr">
+            <a:solidFill>
+              <a:schemeClr val="tx1"/>
+            </a:solidFill>
+            <a:prstDash val="solid"/>
+            <a:round/>
+            <a:headEnd type="none" w="sm" len="sm"/>
+            <a:tailEnd type="triangle"/>
+          </a:ln>
+          <a:effectLst/>
+          <a:extLst>
+            <a:ext uri="{AF507438-7753-43E0-B8FC-AC1667EBCBE1}">
+              <a14:hiddenEffects xmlns:a14="http://schemas.microsoft.com/office/drawing/2010/main">
+                <a:effectLst>
+                  <a:outerShdw dist="35921" dir="2700000" algn="ctr" rotWithShape="0">
+                    <a:schemeClr val="bg2"/>
+                  </a:outerShdw>
+                </a:effectLst>
+              </a14:hiddenEffects>
+            </a:ext>
+          </a:extLst>
+        </p:spPr>
+      </p:cxnSp>
+      <p:cxnSp>
+        <p:nvCxnSpPr>
+          <p:cNvPr id="12" name="Straight Arrow Connector 11"/>
+          <p:cNvCxnSpPr/>
+          <p:nvPr/>
+        </p:nvCxnSpPr>
+        <p:spPr bwMode="auto">
+          <a:xfrm flipH="1">
+            <a:off x="2633513" y="3846679"/>
+            <a:ext cx="714351" cy="1"/>
+          </a:xfrm>
+          <a:prstGeom prst="straightConnector1">
+            <a:avLst/>
+          </a:prstGeom>
+          <a:solidFill>
+            <a:schemeClr val="accent1"/>
+          </a:solidFill>
+          <a:ln w="12700" cap="sq" cmpd="sng" algn="ctr">
+            <a:solidFill>
+              <a:schemeClr val="tx1"/>
+            </a:solidFill>
+            <a:prstDash val="solid"/>
+            <a:round/>
+            <a:headEnd type="none" w="sm" len="sm"/>
+            <a:tailEnd type="triangle"/>
+          </a:ln>
+          <a:effectLst/>
+          <a:extLst>
+            <a:ext uri="{AF507438-7753-43E0-B8FC-AC1667EBCBE1}">
+              <a14:hiddenEffects xmlns:a14="http://schemas.microsoft.com/office/drawing/2010/main">
+                <a:effectLst>
+                  <a:outerShdw dist="35921" dir="2700000" algn="ctr" rotWithShape="0">
+                    <a:schemeClr val="bg2"/>
+                  </a:outerShdw>
+                </a:effectLst>
+              </a14:hiddenEffects>
+            </a:ext>
+          </a:extLst>
+        </p:spPr>
+      </p:cxnSp>
+      <mc:AlternateContent xmlns:mc="http://schemas.openxmlformats.org/markup-compatibility/2006" xmlns:p14="http://schemas.microsoft.com/office/powerpoint/2010/main">
+        <mc:Choice Requires="p14">
+          <p:contentPart p14:bwMode="auto" r:id="rId2">
+            <p14:nvContentPartPr>
+              <p14:cNvPr id="26" name="Ink 25"/>
+              <p14:cNvContentPartPr/>
+              <p14:nvPr/>
+            </p14:nvContentPartPr>
+            <p14:xfrm>
+              <a:off x="4323651" y="3552994"/>
+              <a:ext cx="360" cy="360"/>
+            </p14:xfrm>
+          </p:contentPart>
+        </mc:Choice>
+        <mc:Fallback xmlns="">
+          <p:pic>
+            <p:nvPicPr>
+              <p:cNvPr id="26" name="Ink 25"/>
+              <p:cNvPicPr/>
+              <p:nvPr/>
+            </p:nvPicPr>
+            <p:blipFill>
+              <a:blip r:embed="rId5"/>
+              <a:stretch>
+                <a:fillRect/>
+              </a:stretch>
+            </p:blipFill>
+            <p:spPr>
+              <a:xfrm>
+                <a:off x="4311771" y="3541114"/>
+                <a:ext cx="24120" cy="24120"/>
+              </a:xfrm>
+              <a:prstGeom prst="rect">
+                <a:avLst/>
+              </a:prstGeom>
+            </p:spPr>
+          </p:pic>
+        </mc:Fallback>
+      </mc:AlternateContent>
+      <mc:AlternateContent xmlns:mc="http://schemas.openxmlformats.org/markup-compatibility/2006" xmlns:p14="http://schemas.microsoft.com/office/powerpoint/2010/main">
+        <mc:Choice Requires="p14">
+          <p:contentPart p14:bwMode="auto" r:id="rId6">
+            <p14:nvContentPartPr>
+              <p14:cNvPr id="27" name="Ink 26"/>
+              <p14:cNvContentPartPr/>
+              <p14:nvPr/>
+            </p14:nvContentPartPr>
+            <p14:xfrm>
+              <a:off x="4323651" y="3552994"/>
+              <a:ext cx="360" cy="360"/>
+            </p14:xfrm>
+          </p:contentPart>
+        </mc:Choice>
+        <mc:Fallback xmlns="">
+          <p:pic>
+            <p:nvPicPr>
+              <p:cNvPr id="27" name="Ink 26"/>
+              <p:cNvPicPr/>
+              <p:nvPr/>
+            </p:nvPicPr>
+            <p:blipFill>
+              <a:blip r:embed="rId5"/>
+              <a:stretch>
+                <a:fillRect/>
+              </a:stretch>
+            </p:blipFill>
+            <p:spPr>
+              <a:xfrm>
+                <a:off x="4311771" y="3541114"/>
+                <a:ext cx="24120" cy="24120"/>
+              </a:xfrm>
+              <a:prstGeom prst="rect">
+                <a:avLst/>
+              </a:prstGeom>
+            </p:spPr>
+          </p:pic>
+        </mc:Fallback>
+      </mc:AlternateContent>
+      <mc:AlternateContent xmlns:mc="http://schemas.openxmlformats.org/markup-compatibility/2006" xmlns:p14="http://schemas.microsoft.com/office/powerpoint/2010/main">
+        <mc:Choice Requires="p14">
+          <p:contentPart p14:bwMode="auto" r:id="rId7">
+            <p14:nvContentPartPr>
+              <p14:cNvPr id="29" name="Ink 28"/>
+              <p14:cNvContentPartPr/>
+              <p14:nvPr/>
+            </p14:nvContentPartPr>
+            <p14:xfrm>
+              <a:off x="9744891" y="2142154"/>
+              <a:ext cx="360" cy="360"/>
+            </p14:xfrm>
+          </p:contentPart>
+        </mc:Choice>
+        <mc:Fallback xmlns="">
+          <p:pic>
+            <p:nvPicPr>
+              <p:cNvPr id="29" name="Ink 28"/>
+              <p:cNvPicPr/>
+              <p:nvPr/>
+            </p:nvPicPr>
+            <p:blipFill>
+              <a:blip r:embed="rId8"/>
+              <a:stretch>
+                <a:fillRect/>
+              </a:stretch>
+            </p:blipFill>
+            <p:spPr>
+              <a:xfrm>
+                <a:off x="9733011" y="2130274"/>
+                <a:ext cx="24120" cy="24120"/>
+              </a:xfrm>
+              <a:prstGeom prst="rect">
+                <a:avLst/>
+              </a:prstGeom>
+            </p:spPr>
+          </p:pic>
+        </mc:Fallback>
+      </mc:AlternateContent>
+      <mc:AlternateContent xmlns:mc="http://schemas.openxmlformats.org/markup-compatibility/2006" xmlns:p14="http://schemas.microsoft.com/office/powerpoint/2010/main">
+        <mc:Choice Requires="p14">
+          <p:contentPart p14:bwMode="auto" r:id="rId9">
+            <p14:nvContentPartPr>
+              <p14:cNvPr id="38" name="Ink 37"/>
+              <p14:cNvContentPartPr/>
+              <p14:nvPr/>
+            </p14:nvContentPartPr>
+            <p14:xfrm>
+              <a:off x="9731931" y="2690794"/>
+              <a:ext cx="360" cy="360"/>
+            </p14:xfrm>
+          </p:contentPart>
+        </mc:Choice>
+        <mc:Fallback xmlns="">
+          <p:pic>
+            <p:nvPicPr>
+              <p:cNvPr id="38" name="Ink 37"/>
+              <p:cNvPicPr/>
+              <p:nvPr/>
+            </p:nvPicPr>
+            <p:blipFill>
+              <a:blip r:embed="rId8"/>
+              <a:stretch>
+                <a:fillRect/>
+              </a:stretch>
+            </p:blipFill>
+            <p:spPr>
+              <a:xfrm>
+                <a:off x="9720051" y="2678914"/>
+                <a:ext cx="24120" cy="24120"/>
+              </a:xfrm>
+              <a:prstGeom prst="rect">
+                <a:avLst/>
+              </a:prstGeom>
+            </p:spPr>
+          </p:pic>
+        </mc:Fallback>
+      </mc:AlternateContent>
+      <mc:AlternateContent xmlns:mc="http://schemas.openxmlformats.org/markup-compatibility/2006" xmlns:p14="http://schemas.microsoft.com/office/powerpoint/2010/main">
+        <mc:Choice Requires="p14">
+          <p:contentPart p14:bwMode="auto" r:id="rId10">
+            <p14:nvContentPartPr>
+              <p14:cNvPr id="39" name="Ink 38"/>
+              <p14:cNvContentPartPr/>
+              <p14:nvPr/>
+            </p14:nvContentPartPr>
+            <p14:xfrm>
+              <a:off x="9731931" y="2690794"/>
+              <a:ext cx="360" cy="360"/>
+            </p14:xfrm>
+          </p:contentPart>
+        </mc:Choice>
+        <mc:Fallback xmlns="">
+          <p:pic>
+            <p:nvPicPr>
+              <p:cNvPr id="39" name="Ink 38"/>
+              <p:cNvPicPr/>
+              <p:nvPr/>
+            </p:nvPicPr>
+            <p:blipFill>
+              <a:blip r:embed="rId8"/>
+              <a:stretch>
+                <a:fillRect/>
+              </a:stretch>
+            </p:blipFill>
+            <p:spPr>
+              <a:xfrm>
+                <a:off x="9720051" y="2678914"/>
+                <a:ext cx="24120" cy="24120"/>
+              </a:xfrm>
+              <a:prstGeom prst="rect">
+                <a:avLst/>
+              </a:prstGeom>
+            </p:spPr>
+          </p:pic>
+        </mc:Fallback>
+      </mc:AlternateContent>
+      <p:sp>
+        <p:nvSpPr>
+          <p:cNvPr id="9" name="Oval 8"/>
+          <p:cNvSpPr/>
+          <p:nvPr/>
+        </p:nvSpPr>
+        <p:spPr bwMode="auto">
+          <a:xfrm>
+            <a:off x="3059832" y="2492896"/>
+            <a:ext cx="4464496" cy="3744416"/>
+          </a:xfrm>
+          <a:prstGeom prst="ellipse">
+            <a:avLst/>
+          </a:prstGeom>
+          <a:noFill/>
+          <a:ln w="38100" cap="sq" cmpd="sng" algn="ctr">
+            <a:solidFill>
+              <a:srgbClr val="002060"/>
+            </a:solidFill>
+            <a:prstDash val="solid"/>
+            <a:round/>
+            <a:headEnd type="none" w="sm" len="sm"/>
+            <a:tailEnd type="none" w="sm" len="sm"/>
+          </a:ln>
+          <a:effectLst/>
+          <a:extLst/>
+        </p:spPr>
+        <p:txBody>
+          <a:bodyPr vert="horz" wrap="square" lIns="91440" tIns="45720" rIns="91440" bIns="45720" numCol="1" rtlCol="0" anchor="t" anchorCtr="0" compatLnSpc="1">
+            <a:prstTxWarp prst="textNoShape">
+              <a:avLst/>
+            </a:prstTxWarp>
+          </a:bodyPr>
+          <a:lstStyle/>
+          <a:p>
+            <a:pPr marL="0" marR="0" indent="0" algn="l" defTabSz="914400" rtl="0" eaLnBrk="1" fontAlgn="base" latinLnBrk="0" hangingPunct="1">
+              <a:lnSpc>
+                <a:spcPct val="100000"/>
+              </a:lnSpc>
+              <a:spcBef>
+                <a:spcPct val="0"/>
+              </a:spcBef>
+              <a:spcAft>
+                <a:spcPct val="0"/>
+              </a:spcAft>
+              <a:buClrTx/>
+              <a:buSzTx/>
+              <a:buFontTx/>
+              <a:buNone/>
+              <a:tabLst/>
+            </a:pPr>
+            <a:endParaRPr kumimoji="0" lang="en-US" sz="2400" b="0" i="0" u="none" strike="noStrike" cap="none" normalizeH="0" baseline="0" smtClean="0">
+              <a:ln>
+                <a:noFill/>
+              </a:ln>
+              <a:solidFill>
+                <a:schemeClr val="tx1"/>
+              </a:solidFill>
+              <a:effectLst/>
+              <a:latin typeface="Times New Roman" pitchFamily="18" charset="0"/>
+            </a:endParaRPr>
+          </a:p>
+        </p:txBody>
+      </p:sp>
+      <p:sp>
+        <p:nvSpPr>
+          <p:cNvPr id="19" name="Curved Up Arrow 18"/>
+          <p:cNvSpPr/>
+          <p:nvPr/>
+        </p:nvSpPr>
+        <p:spPr bwMode="auto">
+          <a:xfrm rot="15745081">
+            <a:off x="6571014" y="2116300"/>
+            <a:ext cx="3037103" cy="1938078"/>
+          </a:xfrm>
+          <a:prstGeom prst="curvedUpArrow">
+            <a:avLst>
+              <a:gd name="adj1" fmla="val 25000"/>
+              <a:gd name="adj2" fmla="val 41488"/>
+              <a:gd name="adj3" fmla="val 25000"/>
+            </a:avLst>
+          </a:prstGeom>
+          <a:solidFill>
+            <a:schemeClr val="accent1"/>
+          </a:solidFill>
+          <a:ln w="12700" cap="sq" cmpd="sng" algn="ctr">
+            <a:solidFill>
+              <a:srgbClr val="002060"/>
+            </a:solidFill>
+            <a:prstDash val="solid"/>
+            <a:round/>
+            <a:headEnd type="none" w="sm" len="sm"/>
+            <a:tailEnd type="none" w="sm" len="sm"/>
+          </a:ln>
+          <a:effectLst/>
+          <a:extLst>
+            <a:ext uri="{AF507438-7753-43E0-B8FC-AC1667EBCBE1}">
+              <a14:hiddenEffects xmlns:a14="http://schemas.microsoft.com/office/drawing/2010/main">
+                <a:effectLst>
+                  <a:outerShdw dist="35921" dir="2700000" algn="ctr" rotWithShape="0">
+                    <a:schemeClr val="bg2"/>
+                  </a:outerShdw>
+                </a:effectLst>
+              </a14:hiddenEffects>
+            </a:ext>
+          </a:extLst>
+        </p:spPr>
+        <p:txBody>
+          <a:bodyPr vert="horz" wrap="square" lIns="91440" tIns="45720" rIns="91440" bIns="45720" numCol="1" rtlCol="0" anchor="t" anchorCtr="0" compatLnSpc="1">
+            <a:prstTxWarp prst="textNoShape">
+              <a:avLst/>
+            </a:prstTxWarp>
+          </a:bodyPr>
+          <a:lstStyle/>
+          <a:p>
+            <a:pPr marL="0" marR="0" indent="0" algn="l" defTabSz="914400" rtl="0" eaLnBrk="1" fontAlgn="base" latinLnBrk="0" hangingPunct="1">
+              <a:lnSpc>
+                <a:spcPct val="100000"/>
+              </a:lnSpc>
+              <a:spcBef>
+                <a:spcPct val="0"/>
+              </a:spcBef>
+              <a:spcAft>
+                <a:spcPct val="0"/>
+              </a:spcAft>
+              <a:buClrTx/>
+              <a:buSzTx/>
+              <a:buFontTx/>
+              <a:buNone/>
+              <a:tabLst/>
+            </a:pPr>
+            <a:endParaRPr kumimoji="0" lang="en-US" sz="2400" b="0" i="0" u="none" strike="noStrike" cap="none" normalizeH="0" baseline="0" smtClean="0">
+              <a:ln>
+                <a:noFill/>
+              </a:ln>
+              <a:solidFill>
+                <a:schemeClr val="tx1"/>
+              </a:solidFill>
+              <a:effectLst/>
+              <a:latin typeface="Times New Roman" pitchFamily="18" charset="0"/>
+            </a:endParaRPr>
+          </a:p>
+        </p:txBody>
+      </p:sp>
+    </p:spTree>
+    <p:extLst>
+      <p:ext uri="{BB962C8B-B14F-4D97-AF65-F5344CB8AC3E}">
+        <p14:creationId xmlns:p14="http://schemas.microsoft.com/office/powerpoint/2010/main" val="2994521836"/>
+      </p:ext>
+    </p:extLst>
+  </p:cSld>
+  <p:clrMapOvr>
+    <a:masterClrMapping/>
+  </p:clrMapOvr>
+  <p:timing>
+    <p:tnLst>
+      <p:par>
+        <p:cTn id="1" dur="indefinite" restart="never" nodeType="tmRoot"/>
+      </p:par>
+    </p:tnLst>
+  </p:timing>
+</p:sld>
+</file>
+
+<file path=ppt/slides/slide14.xml><?xml version="1.0" encoding="utf-8"?>
+<p:sld xmlns:a="http://schemas.openxmlformats.org/drawingml/2006/main" xmlns:r="http://schemas.openxmlformats.org/officeDocument/2006/relationships" xmlns:p="http://schemas.openxmlformats.org/presentationml/2006/main">
+  <p:cSld>
+    <p:spTree>
+      <p:nvGrpSpPr>
+        <p:cNvPr id="1" name=""/>
+        <p:cNvGrpSpPr/>
+        <p:nvPr/>
+      </p:nvGrpSpPr>
+      <p:grpSpPr>
+        <a:xfrm>
+          <a:off x="0" y="0"/>
+          <a:ext cx="0" cy="0"/>
+          <a:chOff x="0" y="0"/>
+          <a:chExt cx="0" cy="0"/>
+        </a:xfrm>
+      </p:grpSpPr>
+      <p:sp>
+        <p:nvSpPr>
+          <p:cNvPr id="25602" name="Rectangle 2"/>
+          <p:cNvSpPr>
+            <a:spLocks noGrp="1" noChangeArrowheads="1"/>
+          </p:cNvSpPr>
+          <p:nvPr>
+            <p:ph type="title"/>
+          </p:nvPr>
+        </p:nvSpPr>
+        <p:spPr/>
+        <p:txBody>
+          <a:bodyPr/>
+          <a:lstStyle/>
+          <a:p>
             <a:r>
               <a:rPr lang="en-US"/>
-              <a:t>Marketing plan</a:t>
-            </a:r>
+              <a:t>Technology</a:t>
+            </a:r>
+          </a:p>
+        </p:txBody>
+      </p:sp>
+      <p:sp>
+        <p:nvSpPr>
+          <p:cNvPr id="25603" name="Rectangle 3"/>
+          <p:cNvSpPr>
+            <a:spLocks noGrp="1" noChangeArrowheads="1"/>
+          </p:cNvSpPr>
+          <p:nvPr>
+            <p:ph type="body" idx="1"/>
+          </p:nvPr>
+        </p:nvSpPr>
+        <p:spPr/>
+        <p:txBody>
+          <a:bodyPr/>
+          <a:lstStyle/>
+          <a:p>
+            <a:r>
+              <a:rPr lang="en-US" dirty="0" smtClean="0"/>
+              <a:t>SPARQL, Jena</a:t>
+            </a:r>
+            <a:endParaRPr lang="en-US" dirty="0"/>
           </a:p>
           <a:p>
             <a:pPr lvl="1"/>
             <a:r>
-              <a:rPr lang="en-US"/>
-              <a:t>Location or contact name/phone</a:t>
-            </a:r>
-          </a:p>
-          <a:p>
-            <a:r>
-              <a:rPr lang="en-US"/>
-              <a:t>Budget</a:t>
-            </a:r>
-          </a:p>
-          <a:p>
-            <a:pPr lvl="1"/>
-            <a:r>
-              <a:rPr lang="en-US"/>
-              <a:t>Location or contact name/phone</a:t>
-            </a:r>
-          </a:p>
-          <a:p>
-            <a:r>
-              <a:rPr lang="en-US"/>
-              <a:t>Post-mortem</a:t>
-            </a:r>
-          </a:p>
-          <a:p>
-            <a:pPr lvl="1"/>
-            <a:r>
-              <a:rPr lang="en-US"/>
-              <a:t>Location or contact name/phone</a:t>
-            </a:r>
-          </a:p>
-          <a:p>
-            <a:r>
-              <a:rPr lang="en-US"/>
-              <a:t>Submit questions</a:t>
-            </a:r>
-          </a:p>
-          <a:p>
-            <a:pPr lvl="1"/>
-            <a:r>
-              <a:rPr lang="en-US"/>
-              <a:t>Location or contact name/phone</a:t>
-            </a:r>
-          </a:p>
-        </p:txBody>
-      </p:sp>
+              <a:rPr lang="en-US" dirty="0" smtClean="0"/>
+              <a:t>SPARQL allows to query Ontologies, Data Sets while Jena provides the Java Powered platform independency required.</a:t>
+            </a:r>
+            <a:endParaRPr lang="en-US" dirty="0"/>
+          </a:p>
+        </p:txBody>
+      </p:sp>
+      <p:pic>
+        <p:nvPicPr>
+          <p:cNvPr id="2" name="Picture 1"/>
+          <p:cNvPicPr>
+            <a:picLocks noChangeAspect="1"/>
+          </p:cNvPicPr>
+          <p:nvPr/>
+        </p:nvPicPr>
+        <p:blipFill>
+          <a:blip r:embed="rId2"/>
+          <a:stretch>
+            <a:fillRect/>
+          </a:stretch>
+        </p:blipFill>
+        <p:spPr>
+          <a:xfrm>
+            <a:off x="2738606" y="3773685"/>
+            <a:ext cx="4809788" cy="2398515"/>
+          </a:xfrm>
+          <a:prstGeom prst="rect">
+            <a:avLst/>
+          </a:prstGeom>
+        </p:spPr>
+      </p:pic>
     </p:spTree>
   </p:cSld>
   <p:clrMapOvr>
     <a:masterClrMapping/>
   </p:clrMapOvr>
+  <p:timing>
+    <p:tnLst>
+      <p:par>
+        <p:cTn id="1" dur="indefinite" restart="never" nodeType="tmRoot"/>
+      </p:par>
+    </p:tnLst>
+  </p:timing>
+</p:sld>
+</file>
+
+<file path=ppt/slides/slide15.xml><?xml version="1.0" encoding="utf-8"?>
+<p:sld xmlns:a="http://schemas.openxmlformats.org/drawingml/2006/main" xmlns:r="http://schemas.openxmlformats.org/officeDocument/2006/relationships" xmlns:p="http://schemas.openxmlformats.org/presentationml/2006/main">
+  <p:cSld>
+    <p:spTree>
+      <p:nvGrpSpPr>
+        <p:cNvPr id="1" name=""/>
+        <p:cNvGrpSpPr/>
+        <p:nvPr/>
+      </p:nvGrpSpPr>
+      <p:grpSpPr>
+        <a:xfrm>
+          <a:off x="0" y="0"/>
+          <a:ext cx="0" cy="0"/>
+          <a:chOff x="0" y="0"/>
+          <a:chExt cx="0" cy="0"/>
+        </a:xfrm>
+      </p:grpSpPr>
+      <p:sp>
+        <p:nvSpPr>
+          <p:cNvPr id="2" name="Title 1"/>
+          <p:cNvSpPr>
+            <a:spLocks noGrp="1"/>
+          </p:cNvSpPr>
+          <p:nvPr>
+            <p:ph type="title"/>
+          </p:nvPr>
+        </p:nvSpPr>
+        <p:spPr/>
+        <p:txBody>
+          <a:bodyPr/>
+          <a:lstStyle/>
+          <a:p>
+            <a:pPr algn="ctr"/>
+            <a:r>
+              <a:rPr lang="en-IN" dirty="0" smtClean="0"/>
+              <a:t>THANK YOU!</a:t>
+            </a:r>
+            <a:endParaRPr lang="en-IN" dirty="0"/>
+          </a:p>
+        </p:txBody>
+      </p:sp>
+    </p:spTree>
+    <p:extLst>
+      <p:ext uri="{BB962C8B-B14F-4D97-AF65-F5344CB8AC3E}">
+        <p14:creationId xmlns:p14="http://schemas.microsoft.com/office/powerpoint/2010/main" val="650515929"/>
+      </p:ext>
+    </p:extLst>
+  </p:cSld>
+  <p:clrMapOvr>
+    <a:masterClrMapping/>
+  </p:clrMapOvr>
+  <p:timing>
+    <p:tnLst>
+      <p:par>
+        <p:cTn id="1" dur="indefinite" restart="never" nodeType="tmRoot"/>
+      </p:par>
+    </p:tnLst>
+  </p:timing>
 </p:sld>
 </file>
 
@@ -6192,6 +7326,114 @@
           <a:p>
             <a:pPr algn="ctr"/>
             <a:r>
+              <a:rPr lang="en-US" sz="4000" b="0" dirty="0" smtClean="0"/>
+              <a:t>INTRODUCTION</a:t>
+            </a:r>
+            <a:endParaRPr lang="en-US" sz="4000" dirty="0"/>
+          </a:p>
+        </p:txBody>
+      </p:sp>
+      <p:sp>
+        <p:nvSpPr>
+          <p:cNvPr id="3" name="Content Placeholder 2"/>
+          <p:cNvSpPr>
+            <a:spLocks noGrp="1"/>
+          </p:cNvSpPr>
+          <p:nvPr>
+            <p:ph idx="1"/>
+          </p:nvPr>
+        </p:nvSpPr>
+        <p:spPr/>
+        <p:txBody>
+          <a:bodyPr/>
+          <a:lstStyle/>
+          <a:p>
+            <a:r>
+              <a:rPr lang="en-US" sz="3600" dirty="0" smtClean="0"/>
+              <a:t>What is Semantic Web?</a:t>
+            </a:r>
+            <a:br>
+              <a:rPr lang="en-US" sz="3600" dirty="0" smtClean="0"/>
+            </a:br>
+            <a:endParaRPr lang="en-US" sz="3600" dirty="0" smtClean="0"/>
+          </a:p>
+          <a:p>
+            <a:r>
+              <a:rPr lang="en-US" sz="3600" dirty="0" smtClean="0"/>
+              <a:t>What is linked data?</a:t>
+            </a:r>
+          </a:p>
+          <a:p>
+            <a:pPr>
+              <a:buNone/>
+            </a:pPr>
+            <a:endParaRPr lang="en-US" sz="3600" dirty="0" smtClean="0"/>
+          </a:p>
+          <a:p>
+            <a:r>
+              <a:rPr lang="en-US" sz="3600" dirty="0" smtClean="0"/>
+              <a:t>What are association rules?</a:t>
+            </a:r>
+          </a:p>
+          <a:p>
+            <a:endParaRPr lang="en-US" dirty="0"/>
+          </a:p>
+        </p:txBody>
+      </p:sp>
+    </p:spTree>
+    <p:extLst>
+      <p:ext uri="{BB962C8B-B14F-4D97-AF65-F5344CB8AC3E}">
+        <p14:creationId xmlns:p14="http://schemas.microsoft.com/office/powerpoint/2010/main" val="3431511462"/>
+      </p:ext>
+    </p:extLst>
+  </p:cSld>
+  <p:clrMapOvr>
+    <a:masterClrMapping/>
+  </p:clrMapOvr>
+  <p:timing>
+    <p:tnLst>
+      <p:par>
+        <p:cTn id="1" dur="indefinite" restart="never" nodeType="tmRoot"/>
+      </p:par>
+    </p:tnLst>
+  </p:timing>
+</p:sld>
+</file>
+
+<file path=ppt/slides/slide3.xml><?xml version="1.0" encoding="utf-8"?>
+<p:sld xmlns:a="http://schemas.openxmlformats.org/drawingml/2006/main" xmlns:r="http://schemas.openxmlformats.org/officeDocument/2006/relationships" xmlns:p="http://schemas.openxmlformats.org/presentationml/2006/main">
+  <p:cSld>
+    <p:spTree>
+      <p:nvGrpSpPr>
+        <p:cNvPr id="1" name=""/>
+        <p:cNvGrpSpPr/>
+        <p:nvPr/>
+      </p:nvGrpSpPr>
+      <p:grpSpPr>
+        <a:xfrm>
+          <a:off x="0" y="0"/>
+          <a:ext cx="0" cy="0"/>
+          <a:chOff x="0" y="0"/>
+          <a:chExt cx="0" cy="0"/>
+        </a:xfrm>
+      </p:grpSpPr>
+      <p:sp>
+        <p:nvSpPr>
+          <p:cNvPr id="2" name="Title 1"/>
+          <p:cNvSpPr>
+            <a:spLocks noGrp="1"/>
+          </p:cNvSpPr>
+          <p:nvPr>
+            <p:ph type="title"/>
+          </p:nvPr>
+        </p:nvSpPr>
+        <p:spPr/>
+        <p:txBody>
+          <a:bodyPr/>
+          <a:lstStyle/>
+          <a:p>
+            <a:pPr algn="ctr"/>
+            <a:r>
               <a:rPr lang="en-IN" dirty="0" smtClean="0"/>
               <a:t>Semantic </a:t>
             </a:r>
@@ -6270,7 +7512,7 @@
           <p:nvPr/>
         </p:nvPicPr>
         <p:blipFill>
-          <a:blip r:embed="rId2" cstate="print">
+          <a:blip r:embed="rId3" cstate="print">
             <a:extLst>
               <a:ext uri="{28A0092B-C50C-407E-A947-70E740481C1C}">
                 <a14:useLocalDpi xmlns:a14="http://schemas.microsoft.com/office/drawing/2010/main" val="0"/>
@@ -6301,10 +7543,17 @@
   <p:clrMapOvr>
     <a:masterClrMapping/>
   </p:clrMapOvr>
+  <p:timing>
+    <p:tnLst>
+      <p:par>
+        <p:cTn id="1" dur="indefinite" restart="never" nodeType="tmRoot"/>
+      </p:par>
+    </p:tnLst>
+  </p:timing>
 </p:sld>
 </file>
 
-<file path=ppt/slides/slide3.xml><?xml version="1.0" encoding="utf-8"?>
+<file path=ppt/slides/slide4.xml><?xml version="1.0" encoding="utf-8"?>
 <p:sld xmlns:a="http://schemas.openxmlformats.org/drawingml/2006/main" xmlns:r="http://schemas.openxmlformats.org/officeDocument/2006/relationships" xmlns:p="http://schemas.openxmlformats.org/presentationml/2006/main">
   <p:cSld>
     <p:spTree>
@@ -6376,85 +7625,6 @@
         <p14:creationId xmlns:p14="http://schemas.microsoft.com/office/powerpoint/2010/main" val="691042930"/>
       </p:ext>
     </p:extLst>
-  </p:cSld>
-  <p:clrMapOvr>
-    <a:masterClrMapping/>
-  </p:clrMapOvr>
-</p:sld>
-</file>
-
-<file path=ppt/slides/slide4.xml><?xml version="1.0" encoding="utf-8"?>
-<p:sld xmlns:a="http://schemas.openxmlformats.org/drawingml/2006/main" xmlns:r="http://schemas.openxmlformats.org/officeDocument/2006/relationships" xmlns:p="http://schemas.openxmlformats.org/presentationml/2006/main">
-  <p:cSld>
-    <p:spTree>
-      <p:nvGrpSpPr>
-        <p:cNvPr id="1" name=""/>
-        <p:cNvGrpSpPr/>
-        <p:nvPr/>
-      </p:nvGrpSpPr>
-      <p:grpSpPr>
-        <a:xfrm>
-          <a:off x="0" y="0"/>
-          <a:ext cx="0" cy="0"/>
-          <a:chOff x="0" y="0"/>
-          <a:chExt cx="0" cy="0"/>
-        </a:xfrm>
-      </p:grpSpPr>
-      <p:sp>
-        <p:nvSpPr>
-          <p:cNvPr id="5126" name="Rectangle 6"/>
-          <p:cNvSpPr>
-            <a:spLocks noGrp="1" noChangeArrowheads="1"/>
-          </p:cNvSpPr>
-          <p:nvPr>
-            <p:ph type="title"/>
-          </p:nvPr>
-        </p:nvSpPr>
-        <p:spPr/>
-        <p:txBody>
-          <a:bodyPr/>
-          <a:lstStyle/>
-          <a:p>
-            <a:r>
-              <a:rPr lang="en-US" dirty="0" smtClean="0"/>
-              <a:t>Problem Statement</a:t>
-            </a:r>
-            <a:endParaRPr lang="en-US" dirty="0"/>
-          </a:p>
-        </p:txBody>
-      </p:sp>
-      <p:sp>
-        <p:nvSpPr>
-          <p:cNvPr id="5127" name="Rectangle 7"/>
-          <p:cNvSpPr>
-            <a:spLocks noGrp="1" noChangeArrowheads="1"/>
-          </p:cNvSpPr>
-          <p:nvPr>
-            <p:ph type="body" idx="1"/>
-          </p:nvPr>
-        </p:nvSpPr>
-        <p:spPr/>
-        <p:txBody>
-          <a:bodyPr/>
-          <a:lstStyle/>
-          <a:p>
-            <a:r>
-              <a:rPr lang="en-IN" dirty="0"/>
-              <a:t>An algorithm, named </a:t>
-            </a:r>
-            <a:r>
-              <a:rPr lang="en-IN" dirty="0" err="1"/>
-              <a:t>SWApriori</a:t>
-            </a:r>
-            <a:r>
-              <a:rPr lang="en-IN" dirty="0"/>
-              <a:t>, has been proposed which has considered the above challenges and without the end user involvement, mines ARs directly from a single semantic web dataset. The problem statement includes collecting and connecting them so that all data appear as a single and central dataset and then using existing methods to mine ARs from the generated dataset.</a:t>
-            </a:r>
-            <a:endParaRPr lang="en-US" dirty="0"/>
-          </a:p>
-        </p:txBody>
-      </p:sp>
-    </p:spTree>
   </p:cSld>
   <p:clrMapOvr>
     <a:masterClrMapping/>
@@ -6488,7 +7658,7 @@
       </p:grpSpPr>
       <p:sp>
         <p:nvSpPr>
-          <p:cNvPr id="22530" name="Rectangle 2"/>
+          <p:cNvPr id="5126" name="Rectangle 6"/>
           <p:cNvSpPr>
             <a:spLocks noGrp="1" noChangeArrowheads="1"/>
           </p:cNvSpPr>
@@ -6502,15 +7672,16 @@
           <a:lstStyle/>
           <a:p>
             <a:r>
-              <a:rPr lang="en-US"/>
-              <a:t>Description</a:t>
-            </a:r>
-          </a:p>
-        </p:txBody>
-      </p:sp>
-      <p:sp>
-        <p:nvSpPr>
-          <p:cNvPr id="22531" name="Rectangle 3"/>
+              <a:rPr lang="en-US" dirty="0" smtClean="0"/>
+              <a:t>Problem Statement</a:t>
+            </a:r>
+            <a:endParaRPr lang="en-US" dirty="0"/>
+          </a:p>
+        </p:txBody>
+      </p:sp>
+      <p:sp>
+        <p:nvSpPr>
+          <p:cNvPr id="5127" name="Rectangle 7"/>
           <p:cNvSpPr>
             <a:spLocks noGrp="1" noChangeArrowheads="1"/>
           </p:cNvSpPr>
@@ -6523,86 +7694,27 @@
           <a:bodyPr/>
           <a:lstStyle/>
           <a:p>
+            <a:r>
+              <a:rPr lang="en-IN" dirty="0"/>
+              <a:t>An algorithm, named </a:t>
+            </a:r>
+            <a:r>
+              <a:rPr lang="en-IN" dirty="0" err="1"/>
+              <a:t>SWApriori</a:t>
+            </a:r>
+            <a:r>
+              <a:rPr lang="en-IN" dirty="0"/>
+              <a:t>, has been proposed which has </a:t>
+            </a:r>
+            <a:r>
+              <a:rPr lang="en-IN" dirty="0" smtClean="0"/>
+              <a:t>considered challenges of Semantic Web Mining </a:t>
+            </a:r>
+            <a:r>
+              <a:rPr lang="en-IN" dirty="0"/>
+              <a:t>and without the end user involvement, mines ARs directly from a single semantic web dataset. The problem statement includes collecting and connecting them so that all data appear as a single and central dataset and then using existing methods to mine ARs from the generated dataset.</a:t>
+            </a:r>
             <a:endParaRPr lang="en-US" dirty="0"/>
-          </a:p>
-          <a:p>
-            <a:r>
-              <a:rPr lang="en-US" dirty="0"/>
-              <a:t>Use following slides for discussing status, schedules, budget, etc.</a:t>
-            </a:r>
-          </a:p>
-        </p:txBody>
-      </p:sp>
-      <p:sp>
-        <p:nvSpPr>
-          <p:cNvPr id="22532" name="Text Box 4"/>
-          <p:cNvSpPr txBox="1">
-            <a:spLocks noChangeArrowheads="1"/>
-          </p:cNvSpPr>
-          <p:nvPr/>
-        </p:nvSpPr>
-        <p:spPr bwMode="auto">
-          <a:xfrm>
-            <a:off x="1905000" y="5943600"/>
-            <a:ext cx="6553200" cy="517525"/>
-          </a:xfrm>
-          <a:prstGeom prst="rect">
-            <a:avLst/>
-          </a:prstGeom>
-          <a:noFill/>
-          <a:ln>
-            <a:noFill/>
-          </a:ln>
-          <a:effectLst/>
-          <a:extLst>
-            <a:ext uri="{909E8E84-426E-40DD-AFC4-6F175D3DCCD1}">
-              <a14:hiddenFill xmlns:a14="http://schemas.microsoft.com/office/drawing/2010/main">
-                <a:solidFill>
-                  <a:schemeClr val="accent1"/>
-                </a:solidFill>
-              </a14:hiddenFill>
-            </a:ext>
-            <a:ext uri="{91240B29-F687-4F45-9708-019B960494DF}">
-              <a14:hiddenLine xmlns:a14="http://schemas.microsoft.com/office/drawing/2010/main" w="12700" cap="sq">
-                <a:solidFill>
-                  <a:schemeClr val="tx1"/>
-                </a:solidFill>
-                <a:miter lim="800000"/>
-                <a:headEnd type="none" w="sm" len="sm"/>
-                <a:tailEnd type="none" w="sm" len="sm"/>
-              </a14:hiddenLine>
-            </a:ext>
-            <a:ext uri="{AF507438-7753-43E0-B8FC-AC1667EBCBE1}">
-              <a14:hiddenEffects xmlns:a14="http://schemas.microsoft.com/office/drawing/2010/main">
-                <a:effectLst>
-                  <a:outerShdw dist="35921" dir="2700000" algn="ctr" rotWithShape="0">
-                    <a:schemeClr val="bg2"/>
-                  </a:outerShdw>
-                </a:effectLst>
-              </a14:hiddenEffects>
-            </a:ext>
-          </a:extLst>
-        </p:spPr>
-        <p:txBody>
-          <a:bodyPr>
-            <a:spAutoFit/>
-          </a:bodyPr>
-          <a:lstStyle/>
-          <a:p>
-            <a:r>
-              <a:rPr lang="en-US" sz="1400" b="1">
-                <a:latin typeface="Trebuchet MS" pitchFamily="34" charset="0"/>
-              </a:rPr>
-              <a:t>-for more info…</a:t>
-            </a:r>
-          </a:p>
-          <a:p>
-            <a:r>
-              <a:rPr lang="en-US" sz="1400">
-                <a:latin typeface="Trebuchet MS" pitchFamily="34" charset="0"/>
-              </a:rPr>
-              <a:t>List location or contact for specification (or other related documents)</a:t>
-            </a:r>
           </a:p>
         </p:txBody>
       </p:sp>
@@ -6611,6 +7723,13 @@
   <p:clrMapOvr>
     <a:masterClrMapping/>
   </p:clrMapOvr>
+  <p:timing>
+    <p:tnLst>
+      <p:par>
+        <p:cTn id="1" dur="indefinite" restart="never" nodeType="tmRoot"/>
+      </p:par>
+    </p:tnLst>
+  </p:timing>
 </p:sld>
 </file>
 
@@ -6633,9 +7752,9 @@
       </p:grpSpPr>
       <p:sp>
         <p:nvSpPr>
-          <p:cNvPr id="23554" name="Rectangle 2"/>
-          <p:cNvSpPr>
-            <a:spLocks noGrp="1" noChangeArrowheads="1"/>
+          <p:cNvPr id="2" name="Title 1"/>
+          <p:cNvSpPr>
+            <a:spLocks noGrp="1"/>
           </p:cNvSpPr>
           <p:nvPr>
             <p:ph type="title"/>
@@ -6646,21 +7765,23 @@
           <a:bodyPr/>
           <a:lstStyle/>
           <a:p>
-            <a:r>
-              <a:rPr lang="en-US"/>
-              <a:t>Competitive Analysis</a:t>
-            </a:r>
-          </a:p>
-        </p:txBody>
-      </p:sp>
-      <p:sp>
-        <p:nvSpPr>
-          <p:cNvPr id="23555" name="Rectangle 3"/>
-          <p:cNvSpPr>
-            <a:spLocks noGrp="1" noChangeArrowheads="1"/>
-          </p:cNvSpPr>
-          <p:nvPr>
-            <p:ph type="body" idx="1"/>
+            <a:pPr algn="ctr"/>
+            <a:r>
+              <a:rPr lang="en-US" b="0" dirty="0" smtClean="0"/>
+              <a:t>LITERATURE SURVEY</a:t>
+            </a:r>
+            <a:endParaRPr lang="en-US" dirty="0"/>
+          </a:p>
+        </p:txBody>
+      </p:sp>
+      <p:sp>
+        <p:nvSpPr>
+          <p:cNvPr id="3" name="Content Placeholder 2"/>
+          <p:cNvSpPr>
+            <a:spLocks noGrp="1"/>
+          </p:cNvSpPr>
+          <p:nvPr>
+            <p:ph idx="1"/>
           </p:nvPr>
         </p:nvSpPr>
         <p:spPr/>
@@ -6669,50 +7790,55 @@
           <a:lstStyle/>
           <a:p>
             <a:r>
-              <a:rPr lang="en-US"/>
-              <a:t>Competitors</a:t>
-            </a:r>
-          </a:p>
-          <a:p>
-            <a:pPr lvl="1"/>
-            <a:r>
-              <a:rPr lang="en-US"/>
-              <a:t>You may want to allocate one slide per competitor</a:t>
-            </a:r>
-          </a:p>
-          <a:p>
-            <a:r>
-              <a:rPr lang="en-US"/>
-              <a:t>Strengths</a:t>
-            </a:r>
-          </a:p>
-          <a:p>
-            <a:pPr lvl="1"/>
-            <a:r>
-              <a:rPr lang="en-US"/>
-              <a:t>Your strengths relative to competitors</a:t>
-            </a:r>
-          </a:p>
-          <a:p>
-            <a:r>
-              <a:rPr lang="en-US"/>
-              <a:t>Weaknesses</a:t>
-            </a:r>
-          </a:p>
-          <a:p>
-            <a:pPr lvl="1"/>
-            <a:r>
-              <a:rPr lang="en-US"/>
-              <a:t>Your weaknesses relative to competitors</a:t>
-            </a:r>
+              <a:rPr lang="en-US" dirty="0" smtClean="0"/>
+              <a:t>Association Rule Mining (ARM) algorithms are of two types : </a:t>
+            </a:r>
+            <a:r>
+              <a:rPr lang="en-US" dirty="0" err="1" smtClean="0"/>
+              <a:t>Apriori</a:t>
+            </a:r>
+            <a:r>
+              <a:rPr lang="en-US" dirty="0" smtClean="0"/>
+              <a:t> based and FP-based.</a:t>
+            </a:r>
+          </a:p>
+          <a:p>
+            <a:r>
+              <a:rPr lang="en-US" dirty="0" smtClean="0"/>
+              <a:t>LD datasets are convertible to directed graphs but this is not suitable for ARM</a:t>
+            </a:r>
+          </a:p>
+          <a:p>
+            <a:r>
+              <a:rPr lang="en-US" dirty="0" smtClean="0"/>
+              <a:t>However, ARs are mined now from semantic web data using mining patterns the user provides based on SPARQL.</a:t>
+            </a:r>
+          </a:p>
+          <a:p>
+            <a:pPr>
+              <a:buNone/>
+            </a:pPr>
+            <a:endParaRPr lang="en-US" dirty="0"/>
           </a:p>
         </p:txBody>
       </p:sp>
     </p:spTree>
+    <p:extLst>
+      <p:ext uri="{BB962C8B-B14F-4D97-AF65-F5344CB8AC3E}">
+        <p14:creationId xmlns:p14="http://schemas.microsoft.com/office/powerpoint/2010/main" val="1361614241"/>
+      </p:ext>
+    </p:extLst>
   </p:cSld>
   <p:clrMapOvr>
     <a:masterClrMapping/>
   </p:clrMapOvr>
+  <p:timing>
+    <p:tnLst>
+      <p:par>
+        <p:cTn id="1" dur="indefinite" restart="never" nodeType="tmRoot"/>
+      </p:par>
+    </p:tnLst>
+  </p:timing>
 </p:sld>
 </file>
 
@@ -6735,9 +7861,9 @@
       </p:grpSpPr>
       <p:sp>
         <p:nvSpPr>
-          <p:cNvPr id="24578" name="Rectangle 2"/>
-          <p:cNvSpPr>
-            <a:spLocks noGrp="1" noChangeArrowheads="1"/>
+          <p:cNvPr id="2" name="Title 1"/>
+          <p:cNvSpPr>
+            <a:spLocks noGrp="1"/>
           </p:cNvSpPr>
           <p:nvPr>
             <p:ph type="title"/>
@@ -6748,21 +7874,23 @@
           <a:bodyPr/>
           <a:lstStyle/>
           <a:p>
-            <a:r>
-              <a:rPr lang="en-US"/>
-              <a:t>Competitive Analysis, Cont.</a:t>
-            </a:r>
-          </a:p>
-        </p:txBody>
-      </p:sp>
-      <p:sp>
-        <p:nvSpPr>
-          <p:cNvPr id="24579" name="Rectangle 3"/>
-          <p:cNvSpPr>
-            <a:spLocks noGrp="1" noChangeArrowheads="1"/>
-          </p:cNvSpPr>
-          <p:nvPr>
-            <p:ph type="body" idx="1"/>
+            <a:pPr algn="ctr"/>
+            <a:r>
+              <a:rPr lang="en-US" b="0" dirty="0" smtClean="0"/>
+              <a:t>LITERATURE SURVEY</a:t>
+            </a:r>
+            <a:endParaRPr lang="en-US" dirty="0"/>
+          </a:p>
+        </p:txBody>
+      </p:sp>
+      <p:sp>
+        <p:nvSpPr>
+          <p:cNvPr id="3" name="Content Placeholder 2"/>
+          <p:cNvSpPr>
+            <a:spLocks noGrp="1"/>
+          </p:cNvSpPr>
+          <p:nvPr>
+            <p:ph idx="1"/>
           </p:nvPr>
         </p:nvSpPr>
         <p:spPr/>
@@ -6771,104 +7899,38 @@
           <a:lstStyle/>
           <a:p>
             <a:r>
-              <a:rPr lang="en-US"/>
-              <a:t>Competitors</a:t>
-            </a:r>
-          </a:p>
-          <a:p>
-            <a:pPr lvl="1"/>
-            <a:r>
-              <a:rPr lang="en-US"/>
-              <a:t>Strengths</a:t>
-            </a:r>
-          </a:p>
-          <a:p>
-            <a:pPr lvl="1"/>
-            <a:r>
-              <a:rPr lang="en-US"/>
-              <a:t>Weaknesses</a:t>
-            </a:r>
-          </a:p>
-        </p:txBody>
-      </p:sp>
-      <p:sp>
-        <p:nvSpPr>
-          <p:cNvPr id="24580" name="Text Box 4"/>
-          <p:cNvSpPr txBox="1">
-            <a:spLocks noChangeArrowheads="1"/>
-          </p:cNvSpPr>
-          <p:nvPr/>
-        </p:nvSpPr>
-        <p:spPr bwMode="auto">
-          <a:xfrm>
-            <a:off x="1905000" y="5943600"/>
-            <a:ext cx="6553200" cy="517525"/>
-          </a:xfrm>
-          <a:prstGeom prst="rect">
-            <a:avLst/>
-          </a:prstGeom>
-          <a:noFill/>
-          <a:ln>
-            <a:noFill/>
-          </a:ln>
-          <a:effectLst/>
-          <a:extLst>
-            <a:ext uri="{909E8E84-426E-40DD-AFC4-6F175D3DCCD1}">
-              <a14:hiddenFill xmlns:a14="http://schemas.microsoft.com/office/drawing/2010/main">
-                <a:solidFill>
-                  <a:schemeClr val="accent1"/>
-                </a:solidFill>
-              </a14:hiddenFill>
-            </a:ext>
-            <a:ext uri="{91240B29-F687-4F45-9708-019B960494DF}">
-              <a14:hiddenLine xmlns:a14="http://schemas.microsoft.com/office/drawing/2010/main" w="12700" cap="sq">
-                <a:solidFill>
-                  <a:schemeClr val="tx1"/>
-                </a:solidFill>
-                <a:miter lim="800000"/>
-                <a:headEnd type="none" w="sm" len="sm"/>
-                <a:tailEnd type="none" w="sm" len="sm"/>
-              </a14:hiddenLine>
-            </a:ext>
-            <a:ext uri="{AF507438-7753-43E0-B8FC-AC1667EBCBE1}">
-              <a14:hiddenEffects xmlns:a14="http://schemas.microsoft.com/office/drawing/2010/main">
-                <a:effectLst>
-                  <a:outerShdw dist="35921" dir="2700000" algn="ctr" rotWithShape="0">
-                    <a:schemeClr val="bg2"/>
-                  </a:outerShdw>
-                </a:effectLst>
-              </a14:hiddenEffects>
-            </a:ext>
-          </a:extLst>
-        </p:spPr>
-        <p:txBody>
-          <a:bodyPr>
-            <a:spAutoFit/>
-          </a:bodyPr>
-          <a:lstStyle/>
-          <a:p>
-            <a:r>
-              <a:rPr lang="en-US" sz="1400" b="1">
-                <a:latin typeface="Trebuchet MS" pitchFamily="34" charset="0"/>
-              </a:rPr>
-              <a:t>-for more info…</a:t>
-            </a:r>
-          </a:p>
-          <a:p>
-            <a:r>
-              <a:rPr lang="en-US" sz="1400">
-                <a:latin typeface="Trebuchet MS" pitchFamily="34" charset="0"/>
-              </a:rPr>
-              <a:t>List location or contact for competitive analysis (or other related documents)</a:t>
-            </a:r>
+              <a:rPr lang="en-US" dirty="0" smtClean="0"/>
+              <a:t>Conversion into graphs doesn’t work because unlike traditional methods, TRANSACTIONS are not well defined entities in the Semantic Web</a:t>
+            </a:r>
+          </a:p>
+          <a:p>
+            <a:r>
+              <a:rPr lang="en-US" dirty="0" smtClean="0"/>
+              <a:t>Also Graph vertices are unique and discovering sub-graph redundancy is really not possible</a:t>
+            </a:r>
+          </a:p>
+          <a:p>
+            <a:endParaRPr lang="en-US" dirty="0"/>
           </a:p>
         </p:txBody>
       </p:sp>
     </p:spTree>
+    <p:extLst>
+      <p:ext uri="{BB962C8B-B14F-4D97-AF65-F5344CB8AC3E}">
+        <p14:creationId xmlns:p14="http://schemas.microsoft.com/office/powerpoint/2010/main" val="824624779"/>
+      </p:ext>
+    </p:extLst>
   </p:cSld>
   <p:clrMapOvr>
     <a:masterClrMapping/>
   </p:clrMapOvr>
+  <p:timing>
+    <p:tnLst>
+      <p:par>
+        <p:cTn id="1" dur="indefinite" restart="never" nodeType="tmRoot"/>
+      </p:par>
+    </p:tnLst>
+  </p:timing>
 </p:sld>
 </file>
 
@@ -6891,9 +7953,9 @@
       </p:grpSpPr>
       <p:sp>
         <p:nvSpPr>
-          <p:cNvPr id="25602" name="Rectangle 2"/>
-          <p:cNvSpPr>
-            <a:spLocks noGrp="1" noChangeArrowheads="1"/>
+          <p:cNvPr id="2" name="Title 1"/>
+          <p:cNvSpPr>
+            <a:spLocks noGrp="1"/>
           </p:cNvSpPr>
           <p:nvPr>
             <p:ph type="title"/>
@@ -6904,21 +7966,23 @@
           <a:bodyPr/>
           <a:lstStyle/>
           <a:p>
-            <a:r>
-              <a:rPr lang="en-US"/>
-              <a:t>Technology</a:t>
-            </a:r>
-          </a:p>
-        </p:txBody>
-      </p:sp>
-      <p:sp>
-        <p:nvSpPr>
-          <p:cNvPr id="25603" name="Rectangle 3"/>
-          <p:cNvSpPr>
-            <a:spLocks noGrp="1" noChangeArrowheads="1"/>
-          </p:cNvSpPr>
-          <p:nvPr>
-            <p:ph type="body" idx="1"/>
+            <a:pPr algn="ctr"/>
+            <a:r>
+              <a:rPr lang="en-US" b="0" dirty="0" smtClean="0"/>
+              <a:t>SCOPE</a:t>
+            </a:r>
+            <a:endParaRPr lang="en-US" dirty="0"/>
+          </a:p>
+        </p:txBody>
+      </p:sp>
+      <p:sp>
+        <p:nvSpPr>
+          <p:cNvPr id="3" name="Content Placeholder 2"/>
+          <p:cNvSpPr>
+            <a:spLocks noGrp="1"/>
+          </p:cNvSpPr>
+          <p:nvPr>
+            <p:ph idx="1"/>
           </p:nvPr>
         </p:nvSpPr>
         <p:spPr/>
@@ -6928,49 +7992,49 @@
           <a:p>
             <a:r>
               <a:rPr lang="en-US" dirty="0" smtClean="0"/>
-              <a:t>SPARQL, Jena</a:t>
-            </a:r>
+              <a:t>Preliminary experiments have been performed on this semantic data showing promising results and proving the efficiency, robust, and usefulness of the used approach.</a:t>
+            </a:r>
+          </a:p>
+          <a:p>
+            <a:r>
+              <a:rPr lang="en-US" dirty="0" smtClean="0"/>
+              <a:t>Knowledge representation of the web.</a:t>
+            </a:r>
+          </a:p>
+          <a:p>
+            <a:r>
+              <a:rPr lang="en-US" dirty="0" smtClean="0"/>
+              <a:t>Integration of databases in the knowledge web.</a:t>
+            </a:r>
+          </a:p>
+          <a:p>
+            <a:r>
+              <a:rPr lang="en-US" dirty="0" smtClean="0"/>
+              <a:t>Scalability of knowledge-intensive web services</a:t>
+            </a:r>
+          </a:p>
+          <a:p>
             <a:endParaRPr lang="en-US" dirty="0"/>
           </a:p>
-          <a:p>
-            <a:pPr lvl="1"/>
-            <a:r>
-              <a:rPr lang="en-US" dirty="0" smtClean="0"/>
-              <a:t>SPARQL allows to query Ontologies, Data Sets while Jena provides the Java Powered platform independency required.</a:t>
-            </a:r>
-            <a:endParaRPr lang="en-US" dirty="0"/>
-          </a:p>
-        </p:txBody>
-      </p:sp>
-      <p:pic>
-        <p:nvPicPr>
-          <p:cNvPr id="2" name="Picture 1"/>
-          <p:cNvPicPr>
-            <a:picLocks noChangeAspect="1"/>
-          </p:cNvPicPr>
-          <p:nvPr/>
-        </p:nvPicPr>
-        <p:blipFill>
-          <a:blip r:embed="rId2"/>
-          <a:stretch>
-            <a:fillRect/>
-          </a:stretch>
-        </p:blipFill>
-        <p:spPr>
-          <a:xfrm>
-            <a:off x="2738606" y="3773685"/>
-            <a:ext cx="4809788" cy="2398515"/>
-          </a:xfrm>
-          <a:prstGeom prst="rect">
-            <a:avLst/>
-          </a:prstGeom>
-        </p:spPr>
-      </p:pic>
+        </p:txBody>
+      </p:sp>
     </p:spTree>
+    <p:extLst>
+      <p:ext uri="{BB962C8B-B14F-4D97-AF65-F5344CB8AC3E}">
+        <p14:creationId xmlns:p14="http://schemas.microsoft.com/office/powerpoint/2010/main" val="4119590710"/>
+      </p:ext>
+    </p:extLst>
   </p:cSld>
   <p:clrMapOvr>
     <a:masterClrMapping/>
   </p:clrMapOvr>
+  <p:timing>
+    <p:tnLst>
+      <p:par>
+        <p:cTn id="1" dur="indefinite" restart="never" nodeType="tmRoot"/>
+      </p:par>
+    </p:tnLst>
+  </p:timing>
 </p:sld>
 </file>
 
@@ -6993,9 +8057,9 @@
       </p:grpSpPr>
       <p:sp>
         <p:nvSpPr>
-          <p:cNvPr id="26626" name="Rectangle 2"/>
-          <p:cNvSpPr>
-            <a:spLocks noGrp="1" noChangeArrowheads="1"/>
+          <p:cNvPr id="2" name="Title 1"/>
+          <p:cNvSpPr>
+            <a:spLocks noGrp="1"/>
           </p:cNvSpPr>
           <p:nvPr>
             <p:ph type="title"/>
@@ -7006,21 +8070,23 @@
           <a:bodyPr/>
           <a:lstStyle/>
           <a:p>
-            <a:r>
-              <a:rPr lang="en-US"/>
-              <a:t>Team Resources</a:t>
-            </a:r>
-          </a:p>
-        </p:txBody>
-      </p:sp>
-      <p:sp>
-        <p:nvSpPr>
-          <p:cNvPr id="26627" name="Rectangle 3"/>
-          <p:cNvSpPr>
-            <a:spLocks noGrp="1" noChangeArrowheads="1"/>
-          </p:cNvSpPr>
-          <p:nvPr>
-            <p:ph type="body" idx="1"/>
+            <a:pPr algn="ctr"/>
+            <a:r>
+              <a:rPr lang="en-IN" dirty="0" smtClean="0"/>
+              <a:t>	CHALLENGES </a:t>
+            </a:r>
+            <a:endParaRPr lang="en-IN" dirty="0"/>
+          </a:p>
+        </p:txBody>
+      </p:sp>
+      <p:sp>
+        <p:nvSpPr>
+          <p:cNvPr id="3" name="Content Placeholder 2"/>
+          <p:cNvSpPr>
+            <a:spLocks noGrp="1"/>
+          </p:cNvSpPr>
+          <p:nvPr>
+            <p:ph idx="1"/>
           </p:nvPr>
         </p:nvSpPr>
         <p:spPr/>
@@ -7029,59 +8095,48 @@
           <a:lstStyle/>
           <a:p>
             <a:r>
-              <a:rPr lang="en-US"/>
-              <a:t>State assumptions about resources allocated to this project</a:t>
-            </a:r>
-          </a:p>
-          <a:p>
-            <a:pPr lvl="1"/>
-            <a:r>
-              <a:rPr lang="en-US"/>
-              <a:t>People</a:t>
-            </a:r>
-          </a:p>
-          <a:p>
-            <a:pPr lvl="1"/>
-            <a:r>
-              <a:rPr lang="en-US"/>
-              <a:t>Equipment</a:t>
-            </a:r>
-          </a:p>
-          <a:p>
-            <a:pPr lvl="1"/>
-            <a:r>
-              <a:rPr lang="en-US"/>
-              <a:t>Locations</a:t>
-            </a:r>
-          </a:p>
-          <a:p>
-            <a:pPr lvl="1"/>
-            <a:r>
-              <a:rPr lang="en-US"/>
-              <a:t>Support &amp; outside services</a:t>
-            </a:r>
-          </a:p>
-          <a:p>
-            <a:pPr lvl="1"/>
-            <a:r>
-              <a:rPr lang="en-US"/>
-              <a:t>Manufacturing</a:t>
-            </a:r>
-          </a:p>
-          <a:p>
-            <a:pPr lvl="1"/>
-            <a:r>
-              <a:rPr lang="en-US"/>
-              <a:t>Sales</a:t>
-            </a:r>
+              <a:rPr lang="en-IN" dirty="0" smtClean="0"/>
+              <a:t>Large amount of Redundant data found.</a:t>
+            </a:r>
+          </a:p>
+          <a:p>
+            <a:r>
+              <a:rPr lang="en-IN" dirty="0" smtClean="0"/>
+              <a:t>Reliable data needs to be found.</a:t>
+            </a:r>
+          </a:p>
+          <a:p>
+            <a:r>
+              <a:rPr lang="en-IN" dirty="0" smtClean="0"/>
+              <a:t>Contrasting/Related data found.</a:t>
+            </a:r>
+          </a:p>
+          <a:p>
+            <a:r>
+              <a:rPr lang="en-IN" dirty="0" smtClean="0"/>
+              <a:t>Too much data on any topic.</a:t>
+            </a:r>
+            <a:endParaRPr lang="en-IN" dirty="0"/>
           </a:p>
         </p:txBody>
       </p:sp>
     </p:spTree>
+    <p:extLst>
+      <p:ext uri="{BB962C8B-B14F-4D97-AF65-F5344CB8AC3E}">
+        <p14:creationId xmlns:p14="http://schemas.microsoft.com/office/powerpoint/2010/main" val="2673278030"/>
+      </p:ext>
+    </p:extLst>
   </p:cSld>
   <p:clrMapOvr>
     <a:masterClrMapping/>
   </p:clrMapOvr>
+  <p:timing>
+    <p:tnLst>
+      <p:par>
+        <p:cTn id="1" dur="indefinite" restart="never" nodeType="tmRoot"/>
+      </p:par>
+    </p:tnLst>
+  </p:timing>
 </p:sld>
 </file>
 

</xml_diff>

<commit_message>
PPt on the night all 3 parts
</commit_message>
<xml_diff>
--- a/Presentation/SEMANTIC WEB MINING.pptx
+++ b/Presentation/SEMANTIC WEB MINING.pptx
@@ -5,10 +5,10 @@
     <p:sldMasterId id="2147483648" r:id="rId2"/>
   </p:sldMasterIdLst>
   <p:notesMasterIdLst>
-    <p:notesMasterId r:id="rId18"/>
+    <p:notesMasterId r:id="rId25"/>
   </p:notesMasterIdLst>
   <p:handoutMasterIdLst>
-    <p:handoutMasterId r:id="rId19"/>
+    <p:handoutMasterId r:id="rId26"/>
   </p:handoutMasterIdLst>
   <p:sldIdLst>
     <p:sldId id="256" r:id="rId3"/>
@@ -24,8 +24,15 @@
     <p:sldId id="280" r:id="rId13"/>
     <p:sldId id="260" r:id="rId14"/>
     <p:sldId id="278" r:id="rId15"/>
-    <p:sldId id="261" r:id="rId16"/>
-    <p:sldId id="279" r:id="rId17"/>
+    <p:sldId id="282" r:id="rId16"/>
+    <p:sldId id="283" r:id="rId17"/>
+    <p:sldId id="284" r:id="rId18"/>
+    <p:sldId id="285" r:id="rId19"/>
+    <p:sldId id="286" r:id="rId20"/>
+    <p:sldId id="287" r:id="rId21"/>
+    <p:sldId id="288" r:id="rId22"/>
+    <p:sldId id="261" r:id="rId23"/>
+    <p:sldId id="279" r:id="rId24"/>
   </p:sldIdLst>
   <p:sldSz cx="9144000" cy="6858000" type="screen4x3"/>
   <p:notesSz cx="6946900" cy="9283700"/>
@@ -1276,6 +1283,430 @@
 </p:notes>
 </file>
 
+<file path=ppt/notesSlides/notesSlide2.xml><?xml version="1.0" encoding="utf-8"?>
+<p:notes xmlns:a="http://schemas.openxmlformats.org/drawingml/2006/main" xmlns:r="http://schemas.openxmlformats.org/officeDocument/2006/relationships" xmlns:p="http://schemas.openxmlformats.org/presentationml/2006/main" showMasterSp="0" showMasterPhAnim="0">
+  <p:cSld>
+    <p:spTree>
+      <p:nvGrpSpPr>
+        <p:cNvPr id="1" name="Shape 149"/>
+        <p:cNvGrpSpPr/>
+        <p:nvPr/>
+      </p:nvGrpSpPr>
+      <p:grpSpPr>
+        <a:xfrm>
+          <a:off x="0" y="0"/>
+          <a:ext cx="0" cy="0"/>
+          <a:chOff x="0" y="0"/>
+          <a:chExt cx="0" cy="0"/>
+        </a:xfrm>
+      </p:grpSpPr>
+      <p:sp>
+        <p:nvSpPr>
+          <p:cNvPr id="150" name="Shape 150"/>
+          <p:cNvSpPr>
+            <a:spLocks noGrp="1" noRot="1" noChangeAspect="1"/>
+          </p:cNvSpPr>
+          <p:nvPr>
+            <p:ph type="sldImg" idx="2"/>
+          </p:nvPr>
+        </p:nvSpPr>
+        <p:spPr>
+          <a:xfrm>
+            <a:off x="381300" y="685800"/>
+            <a:ext cx="6096000" cy="3429000"/>
+          </a:xfrm>
+          <a:custGeom>
+            <a:avLst/>
+            <a:gdLst/>
+            <a:ahLst/>
+            <a:cxnLst/>
+            <a:rect l="0" t="0" r="0" b="0"/>
+            <a:pathLst>
+              <a:path w="120000" h="120000" extrusionOk="0">
+                <a:moveTo>
+                  <a:pt x="0" y="0"/>
+                </a:moveTo>
+                <a:lnTo>
+                  <a:pt x="120000" y="0"/>
+                </a:lnTo>
+                <a:lnTo>
+                  <a:pt x="120000" y="120000"/>
+                </a:lnTo>
+                <a:lnTo>
+                  <a:pt x="0" y="120000"/>
+                </a:lnTo>
+                <a:close/>
+              </a:path>
+            </a:pathLst>
+          </a:custGeom>
+        </p:spPr>
+      </p:sp>
+      <p:sp>
+        <p:nvSpPr>
+          <p:cNvPr id="151" name="Shape 151"/>
+          <p:cNvSpPr txBox="1">
+            <a:spLocks noGrp="1"/>
+          </p:cNvSpPr>
+          <p:nvPr>
+            <p:ph type="body" idx="1"/>
+          </p:nvPr>
+        </p:nvSpPr>
+        <p:spPr>
+          <a:xfrm>
+            <a:off x="685800" y="4343400"/>
+            <a:ext cx="5486400" cy="4114800"/>
+          </a:xfrm>
+          <a:prstGeom prst="rect">
+            <a:avLst/>
+          </a:prstGeom>
+        </p:spPr>
+        <p:txBody>
+          <a:bodyPr lIns="91425" tIns="91425" rIns="91425" bIns="91425" anchor="t" anchorCtr="0">
+            <a:noAutofit/>
+          </a:bodyPr>
+          <a:lstStyle/>
+          <a:p>
+            <a:pPr lvl="0" rtl="0">
+              <a:spcBef>
+                <a:spcPts val="0"/>
+              </a:spcBef>
+              <a:buNone/>
+            </a:pPr>
+            <a:endParaRPr/>
+          </a:p>
+        </p:txBody>
+      </p:sp>
+    </p:spTree>
+    <p:extLst>
+      <p:ext uri="{BB962C8B-B14F-4D97-AF65-F5344CB8AC3E}">
+        <p14:creationId xmlns:p14="http://schemas.microsoft.com/office/powerpoint/2010/main" val="3852044620"/>
+      </p:ext>
+    </p:extLst>
+  </p:cSld>
+  <p:clrMapOvr>
+    <a:masterClrMapping/>
+  </p:clrMapOvr>
+</p:notes>
+</file>
+
+<file path=ppt/notesSlides/notesSlide3.xml><?xml version="1.0" encoding="utf-8"?>
+<p:notes xmlns:a="http://schemas.openxmlformats.org/drawingml/2006/main" xmlns:r="http://schemas.openxmlformats.org/officeDocument/2006/relationships" xmlns:p="http://schemas.openxmlformats.org/presentationml/2006/main" showMasterSp="0" showMasterPhAnim="0">
+  <p:cSld>
+    <p:spTree>
+      <p:nvGrpSpPr>
+        <p:cNvPr id="1" name="Shape 160"/>
+        <p:cNvGrpSpPr/>
+        <p:nvPr/>
+      </p:nvGrpSpPr>
+      <p:grpSpPr>
+        <a:xfrm>
+          <a:off x="0" y="0"/>
+          <a:ext cx="0" cy="0"/>
+          <a:chOff x="0" y="0"/>
+          <a:chExt cx="0" cy="0"/>
+        </a:xfrm>
+      </p:grpSpPr>
+      <p:sp>
+        <p:nvSpPr>
+          <p:cNvPr id="161" name="Shape 161"/>
+          <p:cNvSpPr>
+            <a:spLocks noGrp="1" noRot="1" noChangeAspect="1"/>
+          </p:cNvSpPr>
+          <p:nvPr>
+            <p:ph type="sldImg" idx="2"/>
+          </p:nvPr>
+        </p:nvSpPr>
+        <p:spPr>
+          <a:xfrm>
+            <a:off x="1143000" y="685800"/>
+            <a:ext cx="4572000" cy="3429000"/>
+          </a:xfrm>
+          <a:custGeom>
+            <a:avLst/>
+            <a:gdLst/>
+            <a:ahLst/>
+            <a:cxnLst/>
+            <a:rect l="0" t="0" r="0" b="0"/>
+            <a:pathLst>
+              <a:path w="120000" h="120000" extrusionOk="0">
+                <a:moveTo>
+                  <a:pt x="0" y="0"/>
+                </a:moveTo>
+                <a:lnTo>
+                  <a:pt x="120000" y="0"/>
+                </a:lnTo>
+                <a:lnTo>
+                  <a:pt x="120000" y="120000"/>
+                </a:lnTo>
+                <a:lnTo>
+                  <a:pt x="0" y="120000"/>
+                </a:lnTo>
+                <a:close/>
+              </a:path>
+            </a:pathLst>
+          </a:custGeom>
+        </p:spPr>
+      </p:sp>
+      <p:sp>
+        <p:nvSpPr>
+          <p:cNvPr id="162" name="Shape 162"/>
+          <p:cNvSpPr txBox="1">
+            <a:spLocks noGrp="1"/>
+          </p:cNvSpPr>
+          <p:nvPr>
+            <p:ph type="body" idx="1"/>
+          </p:nvPr>
+        </p:nvSpPr>
+        <p:spPr>
+          <a:xfrm>
+            <a:off x="685800" y="4343400"/>
+            <a:ext cx="5486400" cy="4114800"/>
+          </a:xfrm>
+          <a:prstGeom prst="rect">
+            <a:avLst/>
+          </a:prstGeom>
+        </p:spPr>
+        <p:txBody>
+          <a:bodyPr lIns="91425" tIns="91425" rIns="91425" bIns="91425" anchor="t" anchorCtr="0">
+            <a:noAutofit/>
+          </a:bodyPr>
+          <a:lstStyle/>
+          <a:p>
+            <a:pPr lvl="0">
+              <a:spcBef>
+                <a:spcPts val="0"/>
+              </a:spcBef>
+              <a:buNone/>
+            </a:pPr>
+            <a:endParaRPr/>
+          </a:p>
+        </p:txBody>
+      </p:sp>
+    </p:spTree>
+    <p:extLst>
+      <p:ext uri="{BB962C8B-B14F-4D97-AF65-F5344CB8AC3E}">
+        <p14:creationId xmlns:p14="http://schemas.microsoft.com/office/powerpoint/2010/main" val="2036570999"/>
+      </p:ext>
+    </p:extLst>
+  </p:cSld>
+  <p:clrMapOvr>
+    <a:masterClrMapping/>
+  </p:clrMapOvr>
+</p:notes>
+</file>
+
+<file path=ppt/notesSlides/notesSlide4.xml><?xml version="1.0" encoding="utf-8"?>
+<p:notes xmlns:a="http://schemas.openxmlformats.org/drawingml/2006/main" xmlns:r="http://schemas.openxmlformats.org/officeDocument/2006/relationships" xmlns:p="http://schemas.openxmlformats.org/presentationml/2006/main" showMasterSp="0" showMasterPhAnim="0">
+  <p:cSld>
+    <p:spTree>
+      <p:nvGrpSpPr>
+        <p:cNvPr id="1" name="Shape 170"/>
+        <p:cNvGrpSpPr/>
+        <p:nvPr/>
+      </p:nvGrpSpPr>
+      <p:grpSpPr>
+        <a:xfrm>
+          <a:off x="0" y="0"/>
+          <a:ext cx="0" cy="0"/>
+          <a:chOff x="0" y="0"/>
+          <a:chExt cx="0" cy="0"/>
+        </a:xfrm>
+      </p:grpSpPr>
+      <p:sp>
+        <p:nvSpPr>
+          <p:cNvPr id="171" name="Shape 171"/>
+          <p:cNvSpPr>
+            <a:spLocks noGrp="1" noRot="1" noChangeAspect="1"/>
+          </p:cNvSpPr>
+          <p:nvPr>
+            <p:ph type="sldImg" idx="2"/>
+          </p:nvPr>
+        </p:nvSpPr>
+        <p:spPr>
+          <a:xfrm>
+            <a:off x="1143000" y="685800"/>
+            <a:ext cx="4572000" cy="3429000"/>
+          </a:xfrm>
+          <a:custGeom>
+            <a:avLst/>
+            <a:gdLst/>
+            <a:ahLst/>
+            <a:cxnLst/>
+            <a:rect l="0" t="0" r="0" b="0"/>
+            <a:pathLst>
+              <a:path w="120000" h="120000" extrusionOk="0">
+                <a:moveTo>
+                  <a:pt x="0" y="0"/>
+                </a:moveTo>
+                <a:lnTo>
+                  <a:pt x="120000" y="0"/>
+                </a:lnTo>
+                <a:lnTo>
+                  <a:pt x="120000" y="120000"/>
+                </a:lnTo>
+                <a:lnTo>
+                  <a:pt x="0" y="120000"/>
+                </a:lnTo>
+                <a:close/>
+              </a:path>
+            </a:pathLst>
+          </a:custGeom>
+        </p:spPr>
+      </p:sp>
+      <p:sp>
+        <p:nvSpPr>
+          <p:cNvPr id="172" name="Shape 172"/>
+          <p:cNvSpPr txBox="1">
+            <a:spLocks noGrp="1"/>
+          </p:cNvSpPr>
+          <p:nvPr>
+            <p:ph type="body" idx="1"/>
+          </p:nvPr>
+        </p:nvSpPr>
+        <p:spPr>
+          <a:xfrm>
+            <a:off x="685800" y="4343400"/>
+            <a:ext cx="5486400" cy="4114800"/>
+          </a:xfrm>
+          <a:prstGeom prst="rect">
+            <a:avLst/>
+          </a:prstGeom>
+        </p:spPr>
+        <p:txBody>
+          <a:bodyPr lIns="91425" tIns="91425" rIns="91425" bIns="91425" anchor="t" anchorCtr="0">
+            <a:noAutofit/>
+          </a:bodyPr>
+          <a:lstStyle/>
+          <a:p>
+            <a:pPr lvl="0">
+              <a:spcBef>
+                <a:spcPts val="0"/>
+              </a:spcBef>
+              <a:buNone/>
+            </a:pPr>
+            <a:endParaRPr/>
+          </a:p>
+        </p:txBody>
+      </p:sp>
+    </p:spTree>
+    <p:extLst>
+      <p:ext uri="{BB962C8B-B14F-4D97-AF65-F5344CB8AC3E}">
+        <p14:creationId xmlns:p14="http://schemas.microsoft.com/office/powerpoint/2010/main" val="1883309163"/>
+      </p:ext>
+    </p:extLst>
+  </p:cSld>
+  <p:clrMapOvr>
+    <a:masterClrMapping/>
+  </p:clrMapOvr>
+</p:notes>
+</file>
+
+<file path=ppt/notesSlides/notesSlide5.xml><?xml version="1.0" encoding="utf-8"?>
+<p:notes xmlns:a="http://schemas.openxmlformats.org/drawingml/2006/main" xmlns:r="http://schemas.openxmlformats.org/officeDocument/2006/relationships" xmlns:p="http://schemas.openxmlformats.org/presentationml/2006/main" showMasterSp="0" showMasterPhAnim="0">
+  <p:cSld>
+    <p:spTree>
+      <p:nvGrpSpPr>
+        <p:cNvPr id="1" name="Shape 180"/>
+        <p:cNvGrpSpPr/>
+        <p:nvPr/>
+      </p:nvGrpSpPr>
+      <p:grpSpPr>
+        <a:xfrm>
+          <a:off x="0" y="0"/>
+          <a:ext cx="0" cy="0"/>
+          <a:chOff x="0" y="0"/>
+          <a:chExt cx="0" cy="0"/>
+        </a:xfrm>
+      </p:grpSpPr>
+      <p:sp>
+        <p:nvSpPr>
+          <p:cNvPr id="181" name="Shape 181"/>
+          <p:cNvSpPr>
+            <a:spLocks noGrp="1" noRot="1" noChangeAspect="1"/>
+          </p:cNvSpPr>
+          <p:nvPr>
+            <p:ph type="sldImg" idx="2"/>
+          </p:nvPr>
+        </p:nvSpPr>
+        <p:spPr>
+          <a:xfrm>
+            <a:off x="1143000" y="685800"/>
+            <a:ext cx="4572000" cy="3429000"/>
+          </a:xfrm>
+          <a:custGeom>
+            <a:avLst/>
+            <a:gdLst/>
+            <a:ahLst/>
+            <a:cxnLst/>
+            <a:rect l="0" t="0" r="0" b="0"/>
+            <a:pathLst>
+              <a:path w="120000" h="120000" extrusionOk="0">
+                <a:moveTo>
+                  <a:pt x="0" y="0"/>
+                </a:moveTo>
+                <a:lnTo>
+                  <a:pt x="120000" y="0"/>
+                </a:lnTo>
+                <a:lnTo>
+                  <a:pt x="120000" y="120000"/>
+                </a:lnTo>
+                <a:lnTo>
+                  <a:pt x="0" y="120000"/>
+                </a:lnTo>
+                <a:close/>
+              </a:path>
+            </a:pathLst>
+          </a:custGeom>
+        </p:spPr>
+      </p:sp>
+      <p:sp>
+        <p:nvSpPr>
+          <p:cNvPr id="182" name="Shape 182"/>
+          <p:cNvSpPr txBox="1">
+            <a:spLocks noGrp="1"/>
+          </p:cNvSpPr>
+          <p:nvPr>
+            <p:ph type="body" idx="1"/>
+          </p:nvPr>
+        </p:nvSpPr>
+        <p:spPr>
+          <a:xfrm>
+            <a:off x="685800" y="4343400"/>
+            <a:ext cx="5486400" cy="4114800"/>
+          </a:xfrm>
+          <a:prstGeom prst="rect">
+            <a:avLst/>
+          </a:prstGeom>
+        </p:spPr>
+        <p:txBody>
+          <a:bodyPr lIns="91425" tIns="91425" rIns="91425" bIns="91425" anchor="t" anchorCtr="0">
+            <a:noAutofit/>
+          </a:bodyPr>
+          <a:lstStyle/>
+          <a:p>
+            <a:pPr lvl="0">
+              <a:spcBef>
+                <a:spcPts val="0"/>
+              </a:spcBef>
+              <a:buNone/>
+            </a:pPr>
+            <a:endParaRPr/>
+          </a:p>
+        </p:txBody>
+      </p:sp>
+    </p:spTree>
+    <p:extLst>
+      <p:ext uri="{BB962C8B-B14F-4D97-AF65-F5344CB8AC3E}">
+        <p14:creationId xmlns:p14="http://schemas.microsoft.com/office/powerpoint/2010/main" val="1614334014"/>
+      </p:ext>
+    </p:extLst>
+  </p:cSld>
+  <p:clrMapOvr>
+    <a:masterClrMapping/>
+  </p:clrMapOvr>
+</p:notes>
+</file>
+
 <file path=ppt/slideLayouts/slideLayout1.xml><?xml version="1.0" encoding="utf-8"?>
 <p:sldLayout xmlns:a="http://schemas.openxmlformats.org/drawingml/2006/main" xmlns:r="http://schemas.openxmlformats.org/officeDocument/2006/relationships" xmlns:p="http://schemas.openxmlformats.org/presentationml/2006/main" type="title" preserve="1">
   <p:cSld name="Title Slide">
@@ -1805,6 +2236,431 @@
     <p:extLst>
       <p:ext uri="{BB962C8B-B14F-4D97-AF65-F5344CB8AC3E}">
         <p14:creationId xmlns:p14="http://schemas.microsoft.com/office/powerpoint/2010/main" val="1564720470"/>
+      </p:ext>
+    </p:extLst>
+  </p:cSld>
+  <p:clrMapOvr>
+    <a:masterClrMapping/>
+  </p:clrMapOvr>
+</p:sldLayout>
+</file>
+
+<file path=ppt/slideLayouts/slideLayout12.xml><?xml version="1.0" encoding="utf-8"?>
+<p:sldLayout xmlns:a="http://schemas.openxmlformats.org/drawingml/2006/main" xmlns:r="http://schemas.openxmlformats.org/officeDocument/2006/relationships" xmlns:p="http://schemas.openxmlformats.org/presentationml/2006/main">
+  <p:cSld name="Custom layout 1">
+    <p:bg>
+      <p:bgPr>
+        <a:solidFill>
+          <a:srgbClr val="FFFFFF"/>
+        </a:solidFill>
+        <a:effectLst/>
+      </p:bgPr>
+    </p:bg>
+    <p:spTree>
+      <p:nvGrpSpPr>
+        <p:cNvPr id="1" name="Shape 68"/>
+        <p:cNvGrpSpPr/>
+        <p:nvPr/>
+      </p:nvGrpSpPr>
+      <p:grpSpPr>
+        <a:xfrm>
+          <a:off x="0" y="0"/>
+          <a:ext cx="0" cy="0"/>
+          <a:chOff x="0" y="0"/>
+          <a:chExt cx="0" cy="0"/>
+        </a:xfrm>
+      </p:grpSpPr>
+      <p:sp>
+        <p:nvSpPr>
+          <p:cNvPr id="69" name="Shape 69"/>
+          <p:cNvSpPr/>
+          <p:nvPr/>
+        </p:nvSpPr>
+        <p:spPr>
+          <a:xfrm>
+            <a:off x="0" y="0"/>
+            <a:ext cx="9144000" cy="6858000"/>
+          </a:xfrm>
+          <a:prstGeom prst="rect">
+            <a:avLst/>
+          </a:prstGeom>
+          <a:solidFill>
+            <a:srgbClr val="FFFFFF"/>
+          </a:solidFill>
+          <a:ln>
+            <a:noFill/>
+          </a:ln>
+        </p:spPr>
+        <p:txBody>
+          <a:bodyPr lIns="91425" tIns="91425" rIns="91425" bIns="91425" anchor="ctr" anchorCtr="0">
+            <a:noAutofit/>
+          </a:bodyPr>
+          <a:lstStyle/>
+          <a:p>
+            <a:pPr lvl="0">
+              <a:spcBef>
+                <a:spcPts val="0"/>
+              </a:spcBef>
+              <a:buNone/>
+            </a:pPr>
+            <a:endParaRPr sz="2400"/>
+          </a:p>
+        </p:txBody>
+      </p:sp>
+      <p:sp>
+        <p:nvSpPr>
+          <p:cNvPr id="70" name="Shape 70"/>
+          <p:cNvSpPr/>
+          <p:nvPr/>
+        </p:nvSpPr>
+        <p:spPr>
+          <a:xfrm>
+            <a:off x="2140800" y="5042500"/>
+            <a:ext cx="4862400" cy="165600"/>
+          </a:xfrm>
+          <a:prstGeom prst="rect">
+            <a:avLst/>
+          </a:prstGeom>
+          <a:solidFill>
+            <a:srgbClr val="0D47A1"/>
+          </a:solidFill>
+          <a:ln>
+            <a:noFill/>
+          </a:ln>
+        </p:spPr>
+        <p:txBody>
+          <a:bodyPr lIns="91425" tIns="91425" rIns="91425" bIns="91425" anchor="ctr" anchorCtr="0">
+            <a:noAutofit/>
+          </a:bodyPr>
+          <a:lstStyle/>
+          <a:p>
+            <a:pPr lvl="0">
+              <a:spcBef>
+                <a:spcPts val="0"/>
+              </a:spcBef>
+              <a:buNone/>
+            </a:pPr>
+            <a:endParaRPr sz="2400"/>
+          </a:p>
+        </p:txBody>
+      </p:sp>
+      <p:sp>
+        <p:nvSpPr>
+          <p:cNvPr id="71" name="Shape 71"/>
+          <p:cNvSpPr/>
+          <p:nvPr/>
+        </p:nvSpPr>
+        <p:spPr>
+          <a:xfrm>
+            <a:off x="2140800" y="1649883"/>
+            <a:ext cx="4862400" cy="165600"/>
+          </a:xfrm>
+          <a:prstGeom prst="rect">
+            <a:avLst/>
+          </a:prstGeom>
+          <a:solidFill>
+            <a:srgbClr val="0D47A1"/>
+          </a:solidFill>
+          <a:ln>
+            <a:noFill/>
+          </a:ln>
+        </p:spPr>
+        <p:txBody>
+          <a:bodyPr lIns="91425" tIns="91425" rIns="91425" bIns="91425" anchor="ctr" anchorCtr="0">
+            <a:noAutofit/>
+          </a:bodyPr>
+          <a:lstStyle/>
+          <a:p>
+            <a:pPr lvl="0">
+              <a:spcBef>
+                <a:spcPts val="0"/>
+              </a:spcBef>
+              <a:buNone/>
+            </a:pPr>
+            <a:endParaRPr sz="2400"/>
+          </a:p>
+        </p:txBody>
+      </p:sp>
+      <p:sp>
+        <p:nvSpPr>
+          <p:cNvPr id="72" name="Shape 72"/>
+          <p:cNvSpPr txBox="1">
+            <a:spLocks noGrp="1"/>
+          </p:cNvSpPr>
+          <p:nvPr>
+            <p:ph type="title"/>
+          </p:nvPr>
+        </p:nvSpPr>
+        <p:spPr>
+          <a:xfrm>
+            <a:off x="2140800" y="2174000"/>
+            <a:ext cx="4862400" cy="2510000"/>
+          </a:xfrm>
+          <a:prstGeom prst="rect">
+            <a:avLst/>
+          </a:prstGeom>
+          <a:noFill/>
+        </p:spPr>
+        <p:txBody>
+          <a:bodyPr lIns="91425" tIns="91425" rIns="91425" bIns="91425" anchor="ctr" anchorCtr="0"/>
+          <a:lstStyle>
+            <a:lvl1pPr lvl="0" algn="ctr">
+              <a:lnSpc>
+                <a:spcPct val="100000"/>
+              </a:lnSpc>
+              <a:spcBef>
+                <a:spcPts val="0"/>
+              </a:spcBef>
+              <a:spcAft>
+                <a:spcPts val="0"/>
+              </a:spcAft>
+              <a:buClr>
+                <a:srgbClr val="0D47A1"/>
+              </a:buClr>
+              <a:buSzPct val="100000"/>
+              <a:buNone/>
+              <a:defRPr sz="4000" b="1">
+                <a:solidFill>
+                  <a:srgbClr val="0D47A1"/>
+                </a:solidFill>
+              </a:defRPr>
+            </a:lvl1pPr>
+            <a:lvl2pPr lvl="1" algn="ctr">
+              <a:lnSpc>
+                <a:spcPct val="100000"/>
+              </a:lnSpc>
+              <a:spcBef>
+                <a:spcPts val="0"/>
+              </a:spcBef>
+              <a:spcAft>
+                <a:spcPts val="0"/>
+              </a:spcAft>
+              <a:buClr>
+                <a:srgbClr val="0D47A1"/>
+              </a:buClr>
+              <a:buSzPct val="100000"/>
+              <a:buNone/>
+              <a:defRPr sz="4000" b="1">
+                <a:solidFill>
+                  <a:srgbClr val="0D47A1"/>
+                </a:solidFill>
+              </a:defRPr>
+            </a:lvl2pPr>
+            <a:lvl3pPr lvl="2" algn="ctr">
+              <a:lnSpc>
+                <a:spcPct val="100000"/>
+              </a:lnSpc>
+              <a:spcBef>
+                <a:spcPts val="0"/>
+              </a:spcBef>
+              <a:spcAft>
+                <a:spcPts val="0"/>
+              </a:spcAft>
+              <a:buClr>
+                <a:srgbClr val="0D47A1"/>
+              </a:buClr>
+              <a:buSzPct val="100000"/>
+              <a:buNone/>
+              <a:defRPr sz="4000" b="1">
+                <a:solidFill>
+                  <a:srgbClr val="0D47A1"/>
+                </a:solidFill>
+              </a:defRPr>
+            </a:lvl3pPr>
+            <a:lvl4pPr lvl="3" algn="ctr">
+              <a:lnSpc>
+                <a:spcPct val="100000"/>
+              </a:lnSpc>
+              <a:spcBef>
+                <a:spcPts val="0"/>
+              </a:spcBef>
+              <a:spcAft>
+                <a:spcPts val="0"/>
+              </a:spcAft>
+              <a:buClr>
+                <a:srgbClr val="0D47A1"/>
+              </a:buClr>
+              <a:buSzPct val="100000"/>
+              <a:buNone/>
+              <a:defRPr sz="4000" b="1">
+                <a:solidFill>
+                  <a:srgbClr val="0D47A1"/>
+                </a:solidFill>
+              </a:defRPr>
+            </a:lvl4pPr>
+            <a:lvl5pPr lvl="4" algn="ctr">
+              <a:lnSpc>
+                <a:spcPct val="100000"/>
+              </a:lnSpc>
+              <a:spcBef>
+                <a:spcPts val="0"/>
+              </a:spcBef>
+              <a:spcAft>
+                <a:spcPts val="0"/>
+              </a:spcAft>
+              <a:buClr>
+                <a:srgbClr val="0D47A1"/>
+              </a:buClr>
+              <a:buSzPct val="100000"/>
+              <a:buNone/>
+              <a:defRPr sz="4000" b="1">
+                <a:solidFill>
+                  <a:srgbClr val="0D47A1"/>
+                </a:solidFill>
+              </a:defRPr>
+            </a:lvl5pPr>
+            <a:lvl6pPr lvl="5" algn="ctr">
+              <a:lnSpc>
+                <a:spcPct val="100000"/>
+              </a:lnSpc>
+              <a:spcBef>
+                <a:spcPts val="0"/>
+              </a:spcBef>
+              <a:spcAft>
+                <a:spcPts val="0"/>
+              </a:spcAft>
+              <a:buClr>
+                <a:srgbClr val="0D47A1"/>
+              </a:buClr>
+              <a:buSzPct val="100000"/>
+              <a:buNone/>
+              <a:defRPr sz="4000" b="1">
+                <a:solidFill>
+                  <a:srgbClr val="0D47A1"/>
+                </a:solidFill>
+              </a:defRPr>
+            </a:lvl6pPr>
+            <a:lvl7pPr lvl="6" algn="ctr">
+              <a:lnSpc>
+                <a:spcPct val="100000"/>
+              </a:lnSpc>
+              <a:spcBef>
+                <a:spcPts val="0"/>
+              </a:spcBef>
+              <a:spcAft>
+                <a:spcPts val="0"/>
+              </a:spcAft>
+              <a:buClr>
+                <a:srgbClr val="0D47A1"/>
+              </a:buClr>
+              <a:buSzPct val="100000"/>
+              <a:buNone/>
+              <a:defRPr sz="4000" b="1">
+                <a:solidFill>
+                  <a:srgbClr val="0D47A1"/>
+                </a:solidFill>
+              </a:defRPr>
+            </a:lvl7pPr>
+            <a:lvl8pPr lvl="7" algn="ctr">
+              <a:lnSpc>
+                <a:spcPct val="100000"/>
+              </a:lnSpc>
+              <a:spcBef>
+                <a:spcPts val="0"/>
+              </a:spcBef>
+              <a:spcAft>
+                <a:spcPts val="0"/>
+              </a:spcAft>
+              <a:buClr>
+                <a:srgbClr val="0D47A1"/>
+              </a:buClr>
+              <a:buSzPct val="100000"/>
+              <a:buNone/>
+              <a:defRPr sz="4000" b="1">
+                <a:solidFill>
+                  <a:srgbClr val="0D47A1"/>
+                </a:solidFill>
+              </a:defRPr>
+            </a:lvl8pPr>
+            <a:lvl9pPr lvl="8" algn="ctr">
+              <a:lnSpc>
+                <a:spcPct val="100000"/>
+              </a:lnSpc>
+              <a:spcBef>
+                <a:spcPts val="0"/>
+              </a:spcBef>
+              <a:spcAft>
+                <a:spcPts val="0"/>
+              </a:spcAft>
+              <a:buClr>
+                <a:srgbClr val="0D47A1"/>
+              </a:buClr>
+              <a:buSzPct val="100000"/>
+              <a:buNone/>
+              <a:defRPr sz="4000" b="1">
+                <a:solidFill>
+                  <a:srgbClr val="0D47A1"/>
+                </a:solidFill>
+              </a:defRPr>
+            </a:lvl9pPr>
+          </a:lstStyle>
+          <a:p>
+            <a:endParaRPr/>
+          </a:p>
+        </p:txBody>
+      </p:sp>
+      <p:sp>
+        <p:nvSpPr>
+          <p:cNvPr id="73" name="Shape 73"/>
+          <p:cNvSpPr txBox="1">
+            <a:spLocks noGrp="1"/>
+          </p:cNvSpPr>
+          <p:nvPr>
+            <p:ph type="sldNum" idx="12"/>
+          </p:nvPr>
+        </p:nvSpPr>
+        <p:spPr>
+          <a:xfrm>
+            <a:off x="8497999" y="6251677"/>
+            <a:ext cx="548700" cy="524800"/>
+          </a:xfrm>
+          <a:prstGeom prst="rect">
+            <a:avLst/>
+          </a:prstGeom>
+          <a:noFill/>
+        </p:spPr>
+        <p:txBody>
+          <a:bodyPr lIns="91425" tIns="91425" rIns="91425" bIns="91425" anchor="ctr" anchorCtr="0">
+            <a:noAutofit/>
+          </a:bodyPr>
+          <a:lstStyle/>
+          <a:p>
+            <a:pPr>
+              <a:spcBef>
+                <a:spcPts val="0"/>
+              </a:spcBef>
+              <a:spcAft>
+                <a:spcPts val="0"/>
+              </a:spcAft>
+            </a:pPr>
+            <a:fld id="{00000000-1234-1234-1234-123412341234}" type="slidenum">
+              <a:rPr lang="en" sz="1000" smtClean="0">
+                <a:solidFill>
+                  <a:srgbClr val="0D47A1"/>
+                </a:solidFill>
+              </a:rPr>
+              <a:pPr>
+                <a:spcBef>
+                  <a:spcPts val="0"/>
+                </a:spcBef>
+                <a:spcAft>
+                  <a:spcPts val="0"/>
+                </a:spcAft>
+              </a:pPr>
+              <a:t>‹#›</a:t>
+            </a:fld>
+            <a:endParaRPr lang="en" sz="1000">
+              <a:solidFill>
+                <a:srgbClr val="0D47A1"/>
+              </a:solidFill>
+            </a:endParaRPr>
+          </a:p>
+        </p:txBody>
+      </p:sp>
+    </p:spTree>
+    <p:extLst>
+      <p:ext uri="{BB962C8B-B14F-4D97-AF65-F5344CB8AC3E}">
+        <p14:creationId xmlns:p14="http://schemas.microsoft.com/office/powerpoint/2010/main" val="2845036881"/>
       </p:ext>
     </p:extLst>
   </p:cSld>
@@ -5322,6 +6178,7 @@
     <p:sldLayoutId id="2147483657" r:id="rId9"/>
     <p:sldLayoutId id="2147483658" r:id="rId10"/>
     <p:sldLayoutId id="2147483659" r:id="rId11"/>
+    <p:sldLayoutId id="2147483660" r:id="rId12"/>
   </p:sldLayoutIdLst>
   <p:txStyles>
     <p:titleStyle>
@@ -7127,7 +7984,7 @@
   <p:cSld>
     <p:spTree>
       <p:nvGrpSpPr>
-        <p:cNvPr id="1" name=""/>
+        <p:cNvPr id="1" name="Shape 152"/>
         <p:cNvGrpSpPr/>
         <p:nvPr/>
       </p:nvGrpSpPr>
@@ -7141,82 +7998,45 @@
       </p:grpSpPr>
       <p:sp>
         <p:nvSpPr>
-          <p:cNvPr id="25602" name="Rectangle 2"/>
-          <p:cNvSpPr>
-            <a:spLocks noGrp="1" noChangeArrowheads="1"/>
+          <p:cNvPr id="153" name="Shape 153"/>
+          <p:cNvSpPr txBox="1">
+            <a:spLocks noGrp="1"/>
           </p:cNvSpPr>
           <p:nvPr>
             <p:ph type="title"/>
           </p:nvPr>
         </p:nvSpPr>
-        <p:spPr/>
-        <p:txBody>
-          <a:bodyPr/>
-          <a:lstStyle/>
-          <a:p>
-            <a:r>
-              <a:rPr lang="en-US"/>
-              <a:t>Technology</a:t>
-            </a:r>
-          </a:p>
-        </p:txBody>
-      </p:sp>
-      <p:sp>
-        <p:nvSpPr>
-          <p:cNvPr id="25603" name="Rectangle 3"/>
-          <p:cNvSpPr>
-            <a:spLocks noGrp="1" noChangeArrowheads="1"/>
-          </p:cNvSpPr>
-          <p:nvPr>
-            <p:ph type="body" idx="1"/>
-          </p:nvPr>
-        </p:nvSpPr>
-        <p:spPr/>
-        <p:txBody>
-          <a:bodyPr/>
-          <a:lstStyle/>
-          <a:p>
-            <a:r>
-              <a:rPr lang="en-US" dirty="0" smtClean="0"/>
-              <a:t>SPARQL, Jena</a:t>
-            </a:r>
-            <a:endParaRPr lang="en-US" dirty="0"/>
-          </a:p>
-          <a:p>
-            <a:pPr lvl="1"/>
-            <a:r>
-              <a:rPr lang="en-US" dirty="0" smtClean="0"/>
-              <a:t>SPARQL allows to query Ontologies, Data Sets while Jena provides the Java Powered platform independency required.</a:t>
-            </a:r>
-            <a:endParaRPr lang="en-US" dirty="0"/>
-          </a:p>
-        </p:txBody>
-      </p:sp>
-      <p:pic>
-        <p:nvPicPr>
-          <p:cNvPr id="2" name="Picture 1"/>
-          <p:cNvPicPr>
-            <a:picLocks noChangeAspect="1"/>
-          </p:cNvPicPr>
-          <p:nvPr/>
-        </p:nvPicPr>
-        <p:blipFill>
-          <a:blip r:embed="rId2"/>
-          <a:stretch>
-            <a:fillRect/>
-          </a:stretch>
-        </p:blipFill>
         <p:spPr>
           <a:xfrm>
-            <a:off x="2738606" y="3773685"/>
-            <a:ext cx="4809788" cy="2398515"/>
+            <a:off x="2140800" y="2487750"/>
+            <a:ext cx="4862400" cy="1882500"/>
           </a:xfrm>
           <a:prstGeom prst="rect">
             <a:avLst/>
           </a:prstGeom>
         </p:spPr>
-      </p:pic>
+        <p:txBody>
+          <a:bodyPr vert="horz" wrap="square" lIns="91425" tIns="91425" rIns="91425" bIns="91425" numCol="1" anchor="ctr" anchorCtr="0" compatLnSpc="1">
+            <a:prstTxWarp prst="textNoShape">
+              <a:avLst/>
+            </a:prstTxWarp>
+            <a:noAutofit/>
+          </a:bodyPr>
+          <a:lstStyle/>
+          <a:p>
+            <a:r>
+              <a:rPr lang="en"/>
+              <a:t>SWApriori Algorithm</a:t>
+            </a:r>
+          </a:p>
+        </p:txBody>
+      </p:sp>
     </p:spTree>
+    <p:extLst>
+      <p:ext uri="{BB962C8B-B14F-4D97-AF65-F5344CB8AC3E}">
+        <p14:creationId xmlns:p14="http://schemas.microsoft.com/office/powerpoint/2010/main" val="2625777169"/>
+      </p:ext>
+    </p:extLst>
   </p:cSld>
   <p:clrMapOvr>
     <a:masterClrMapping/>
@@ -7250,32 +8070,767 @@
       </p:grpSpPr>
       <p:sp>
         <p:nvSpPr>
-          <p:cNvPr id="2" name="Title 1"/>
-          <p:cNvSpPr>
-            <a:spLocks noGrp="1"/>
-          </p:cNvSpPr>
-          <p:nvPr>
-            <p:ph type="title"/>
-          </p:nvPr>
-        </p:nvSpPr>
-        <p:spPr/>
-        <p:txBody>
-          <a:bodyPr/>
+          <p:cNvPr id="2" name="Rectangle 1"/>
+          <p:cNvSpPr/>
+          <p:nvPr/>
+        </p:nvSpPr>
+        <p:spPr>
+          <a:xfrm>
+            <a:off x="1547663" y="966266"/>
+            <a:ext cx="4658961" cy="769441"/>
+          </a:xfrm>
+          <a:prstGeom prst="rect">
+            <a:avLst/>
+          </a:prstGeom>
+        </p:spPr>
+        <p:txBody>
+          <a:bodyPr wrap="square">
+            <a:spAutoFit/>
+          </a:bodyPr>
           <a:lstStyle/>
           <a:p>
-            <a:pPr algn="ctr"/>
-            <a:r>
-              <a:rPr lang="en-IN" dirty="0" smtClean="0"/>
-              <a:t>THANK YOU!</a:t>
-            </a:r>
-            <a:endParaRPr lang="en-IN" dirty="0"/>
+            <a:r>
+              <a:rPr lang="en" sz="4400" dirty="0" smtClean="0"/>
+              <a:t>SWAPrior</a:t>
+            </a:r>
+            <a:endParaRPr lang="en-US" sz="4400" dirty="0"/>
+          </a:p>
+        </p:txBody>
+      </p:sp>
+      <p:sp>
+        <p:nvSpPr>
+          <p:cNvPr id="3" name="Shape 148"/>
+          <p:cNvSpPr txBox="1"/>
+          <p:nvPr/>
+        </p:nvSpPr>
+        <p:spPr>
+          <a:xfrm>
+            <a:off x="1331640" y="2060848"/>
+            <a:ext cx="6696744" cy="4320480"/>
+          </a:xfrm>
+          <a:prstGeom prst="rect">
+            <a:avLst/>
+          </a:prstGeom>
+          <a:noFill/>
+          <a:ln>
+            <a:noFill/>
+          </a:ln>
+        </p:spPr>
+        <p:txBody>
+          <a:bodyPr lIns="91425" tIns="91425" rIns="91425" bIns="91425" anchor="t" anchorCtr="0">
+            <a:noAutofit/>
+          </a:bodyPr>
+          <a:lstStyle/>
+          <a:p>
+            <a:pPr marL="457200" indent="-482600">
+              <a:spcBef>
+                <a:spcPts val="0"/>
+              </a:spcBef>
+              <a:buSzPct val="100000"/>
+              <a:buFont typeface="Arial" panose="020B0604020202020204" pitchFamily="34" charset="0"/>
+              <a:buChar char="•"/>
+            </a:pPr>
+            <a:r>
+              <a:rPr lang="en" sz="3200" dirty="0" smtClean="0">
+                <a:latin typeface="Corsiva"/>
+                <a:ea typeface="Corsiva"/>
+                <a:cs typeface="Corsiva"/>
+                <a:sym typeface="Corsiva"/>
+              </a:rPr>
+              <a:t>Inputs:</a:t>
+            </a:r>
+          </a:p>
+          <a:p>
+            <a:pPr marL="914400" lvl="1" indent="-482600">
+              <a:spcBef>
+                <a:spcPts val="0"/>
+              </a:spcBef>
+              <a:buSzPct val="100000"/>
+              <a:buFont typeface="Arial" panose="020B0604020202020204" pitchFamily="34" charset="0"/>
+              <a:buChar char="•"/>
+            </a:pPr>
+            <a:r>
+              <a:rPr lang="en" sz="3200" dirty="0" smtClean="0">
+                <a:latin typeface="Corsiva"/>
+                <a:ea typeface="Corsiva"/>
+                <a:cs typeface="Corsiva"/>
+                <a:sym typeface="Corsiva"/>
+              </a:rPr>
+              <a:t>Dataset</a:t>
+            </a:r>
+          </a:p>
+          <a:p>
+            <a:pPr marL="914400" lvl="1" indent="-482600">
+              <a:spcBef>
+                <a:spcPts val="0"/>
+              </a:spcBef>
+              <a:buSzPct val="100000"/>
+              <a:buFont typeface="Arial" panose="020B0604020202020204" pitchFamily="34" charset="0"/>
+              <a:buChar char="•"/>
+            </a:pPr>
+            <a:r>
+              <a:rPr lang="en" sz="3200" dirty="0" smtClean="0">
+                <a:latin typeface="Corsiva"/>
+                <a:ea typeface="Corsiva"/>
+                <a:cs typeface="Corsiva"/>
+                <a:sym typeface="Corsiva"/>
+              </a:rPr>
+              <a:t>Minimum Support</a:t>
+            </a:r>
+          </a:p>
+          <a:p>
+            <a:pPr marL="914400" lvl="1" indent="-482600">
+              <a:spcBef>
+                <a:spcPts val="0"/>
+              </a:spcBef>
+              <a:buSzPct val="100000"/>
+              <a:buFont typeface="Arial" panose="020B0604020202020204" pitchFamily="34" charset="0"/>
+              <a:buChar char="•"/>
+            </a:pPr>
+            <a:r>
+              <a:rPr lang="en" sz="3200" dirty="0" smtClean="0">
+                <a:latin typeface="Corsiva"/>
+                <a:ea typeface="Corsiva"/>
+                <a:cs typeface="Corsiva"/>
+                <a:sym typeface="Corsiva"/>
+              </a:rPr>
+              <a:t>Minimum Confidence</a:t>
+            </a:r>
+          </a:p>
+          <a:p>
+            <a:pPr>
+              <a:spcBef>
+                <a:spcPts val="0"/>
+              </a:spcBef>
+              <a:buSzPct val="100000"/>
+            </a:pPr>
+            <a:endParaRPr lang="en" sz="3200" dirty="0" smtClean="0">
+              <a:latin typeface="Corsiva"/>
+              <a:ea typeface="Corsiva"/>
+              <a:cs typeface="Corsiva"/>
+              <a:sym typeface="Corsiva"/>
+            </a:endParaRPr>
+          </a:p>
+          <a:p>
+            <a:pPr marL="457200" indent="-482600">
+              <a:spcBef>
+                <a:spcPts val="0"/>
+              </a:spcBef>
+              <a:buSzPct val="100000"/>
+              <a:buFont typeface="Arial" panose="020B0604020202020204" pitchFamily="34" charset="0"/>
+              <a:buChar char="•"/>
+            </a:pPr>
+            <a:r>
+              <a:rPr lang="en" sz="3200" dirty="0" smtClean="0">
+                <a:latin typeface="Corsiva"/>
+                <a:ea typeface="Corsiva"/>
+                <a:cs typeface="Corsiva"/>
+                <a:sym typeface="Corsiva"/>
+              </a:rPr>
+              <a:t>Outputs:</a:t>
+            </a:r>
+          </a:p>
+          <a:p>
+            <a:pPr marL="914400" lvl="1" indent="-482600">
+              <a:spcBef>
+                <a:spcPts val="0"/>
+              </a:spcBef>
+              <a:buSzPct val="100000"/>
+              <a:buFont typeface="Arial" panose="020B0604020202020204" pitchFamily="34" charset="0"/>
+              <a:buChar char="•"/>
+            </a:pPr>
+            <a:r>
+              <a:rPr lang="en" sz="3200" dirty="0" smtClean="0">
+                <a:latin typeface="Corsiva"/>
+                <a:ea typeface="Corsiva"/>
+                <a:cs typeface="Corsiva"/>
+                <a:sym typeface="Corsiva"/>
+              </a:rPr>
+              <a:t>Large Data-Item</a:t>
+            </a:r>
+          </a:p>
+          <a:p>
+            <a:pPr marL="914400" lvl="1" indent="-482600">
+              <a:spcBef>
+                <a:spcPts val="0"/>
+              </a:spcBef>
+              <a:buSzPct val="100000"/>
+              <a:buFont typeface="Arial" panose="020B0604020202020204" pitchFamily="34" charset="0"/>
+              <a:buChar char="•"/>
+            </a:pPr>
+            <a:r>
+              <a:rPr lang="en" sz="3200" dirty="0" smtClean="0">
+                <a:latin typeface="Corsiva"/>
+                <a:ea typeface="Corsiva"/>
+                <a:cs typeface="Corsiva"/>
+                <a:sym typeface="Corsiva"/>
+              </a:rPr>
+              <a:t>Association Rule</a:t>
+            </a:r>
           </a:p>
         </p:txBody>
       </p:sp>
     </p:spTree>
     <p:extLst>
       <p:ext uri="{BB962C8B-B14F-4D97-AF65-F5344CB8AC3E}">
-        <p14:creationId xmlns:p14="http://schemas.microsoft.com/office/powerpoint/2010/main" val="650515929"/>
+        <p14:creationId xmlns:p14="http://schemas.microsoft.com/office/powerpoint/2010/main" val="3432539339"/>
+      </p:ext>
+    </p:extLst>
+  </p:cSld>
+  <p:clrMapOvr>
+    <a:masterClrMapping/>
+  </p:clrMapOvr>
+  <p:timing>
+    <p:tnLst>
+      <p:par>
+        <p:cTn id="1" dur="indefinite" restart="never" nodeType="tmRoot"/>
+      </p:par>
+    </p:tnLst>
+  </p:timing>
+</p:sld>
+</file>
+
+<file path=ppt/slides/slide16.xml><?xml version="1.0" encoding="utf-8"?>
+<p:sld xmlns:a="http://schemas.openxmlformats.org/drawingml/2006/main" xmlns:r="http://schemas.openxmlformats.org/officeDocument/2006/relationships" xmlns:p="http://schemas.openxmlformats.org/presentationml/2006/main">
+  <p:cSld>
+    <p:spTree>
+      <p:nvGrpSpPr>
+        <p:cNvPr id="1" name="Shape 163"/>
+        <p:cNvGrpSpPr/>
+        <p:nvPr/>
+      </p:nvGrpSpPr>
+      <p:grpSpPr>
+        <a:xfrm>
+          <a:off x="0" y="0"/>
+          <a:ext cx="0" cy="0"/>
+          <a:chOff x="0" y="0"/>
+          <a:chExt cx="0" cy="0"/>
+        </a:xfrm>
+      </p:grpSpPr>
+      <p:pic>
+        <p:nvPicPr>
+          <p:cNvPr id="164" name="Shape 164" descr="Algo1.png"/>
+          <p:cNvPicPr preferRelativeResize="0"/>
+          <p:nvPr/>
+        </p:nvPicPr>
+        <p:blipFill rotWithShape="1">
+          <a:blip r:embed="rId3">
+            <a:alphaModFix/>
+          </a:blip>
+          <a:srcRect l="1739" t="966" r="2619" b="43700"/>
+          <a:stretch/>
+        </p:blipFill>
+        <p:spPr>
+          <a:xfrm>
+            <a:off x="251520" y="116632"/>
+            <a:ext cx="4104456" cy="6741368"/>
+          </a:xfrm>
+          <a:prstGeom prst="rect">
+            <a:avLst/>
+          </a:prstGeom>
+          <a:noFill/>
+          <a:ln>
+            <a:noFill/>
+          </a:ln>
+        </p:spPr>
+      </p:pic>
+      <p:pic>
+        <p:nvPicPr>
+          <p:cNvPr id="3" name="Shape 164" descr="Algo1.png"/>
+          <p:cNvPicPr preferRelativeResize="0"/>
+          <p:nvPr/>
+        </p:nvPicPr>
+        <p:blipFill rotWithShape="1">
+          <a:blip r:embed="rId3">
+            <a:alphaModFix/>
+          </a:blip>
+          <a:srcRect l="1532" t="48950"/>
+          <a:stretch/>
+        </p:blipFill>
+        <p:spPr>
+          <a:xfrm>
+            <a:off x="4930094" y="0"/>
+            <a:ext cx="4322426" cy="6957392"/>
+          </a:xfrm>
+          <a:prstGeom prst="rect">
+            <a:avLst/>
+          </a:prstGeom>
+          <a:noFill/>
+          <a:ln>
+            <a:noFill/>
+          </a:ln>
+        </p:spPr>
+      </p:pic>
+    </p:spTree>
+    <p:extLst>
+      <p:ext uri="{BB962C8B-B14F-4D97-AF65-F5344CB8AC3E}">
+        <p14:creationId xmlns:p14="http://schemas.microsoft.com/office/powerpoint/2010/main" val="168964940"/>
+      </p:ext>
+    </p:extLst>
+  </p:cSld>
+  <p:clrMapOvr>
+    <a:masterClrMapping/>
+  </p:clrMapOvr>
+  <p:timing>
+    <p:tnLst>
+      <p:par>
+        <p:cTn id="1" dur="indefinite" restart="never" nodeType="tmRoot"/>
+      </p:par>
+    </p:tnLst>
+  </p:timing>
+</p:sld>
+</file>
+
+<file path=ppt/slides/slide17.xml><?xml version="1.0" encoding="utf-8"?>
+<p:sld xmlns:a="http://schemas.openxmlformats.org/drawingml/2006/main" xmlns:r="http://schemas.openxmlformats.org/officeDocument/2006/relationships" xmlns:p="http://schemas.openxmlformats.org/presentationml/2006/main">
+  <p:cSld>
+    <p:spTree>
+      <p:nvGrpSpPr>
+        <p:cNvPr id="1" name=""/>
+        <p:cNvGrpSpPr/>
+        <p:nvPr/>
+      </p:nvGrpSpPr>
+      <p:grpSpPr>
+        <a:xfrm>
+          <a:off x="0" y="0"/>
+          <a:ext cx="0" cy="0"/>
+          <a:chOff x="0" y="0"/>
+          <a:chExt cx="0" cy="0"/>
+        </a:xfrm>
+      </p:grpSpPr>
+      <p:sp>
+        <p:nvSpPr>
+          <p:cNvPr id="2" name="Rectangle 1"/>
+          <p:cNvSpPr/>
+          <p:nvPr/>
+        </p:nvSpPr>
+        <p:spPr>
+          <a:xfrm>
+            <a:off x="1547663" y="966266"/>
+            <a:ext cx="6192689" cy="769441"/>
+          </a:xfrm>
+          <a:prstGeom prst="rect">
+            <a:avLst/>
+          </a:prstGeom>
+        </p:spPr>
+        <p:txBody>
+          <a:bodyPr wrap="square">
+            <a:spAutoFit/>
+          </a:bodyPr>
+          <a:lstStyle/>
+          <a:p>
+            <a:r>
+              <a:rPr lang="en" sz="4400" dirty="0" smtClean="0"/>
+              <a:t>Generate2 Large DataItem</a:t>
+            </a:r>
+            <a:endParaRPr lang="en-US" sz="4400" dirty="0"/>
+          </a:p>
+        </p:txBody>
+      </p:sp>
+      <p:sp>
+        <p:nvSpPr>
+          <p:cNvPr id="3" name="Shape 148"/>
+          <p:cNvSpPr txBox="1"/>
+          <p:nvPr/>
+        </p:nvSpPr>
+        <p:spPr>
+          <a:xfrm>
+            <a:off x="1331640" y="2060848"/>
+            <a:ext cx="6696744" cy="4320480"/>
+          </a:xfrm>
+          <a:prstGeom prst="rect">
+            <a:avLst/>
+          </a:prstGeom>
+          <a:noFill/>
+          <a:ln>
+            <a:noFill/>
+          </a:ln>
+        </p:spPr>
+        <p:txBody>
+          <a:bodyPr lIns="91425" tIns="91425" rIns="91425" bIns="91425" anchor="t" anchorCtr="0">
+            <a:noAutofit/>
+          </a:bodyPr>
+          <a:lstStyle/>
+          <a:p>
+            <a:pPr marL="457200" indent="-482600">
+              <a:spcBef>
+                <a:spcPts val="0"/>
+              </a:spcBef>
+              <a:buSzPct val="100000"/>
+              <a:buFont typeface="Arial" panose="020B0604020202020204" pitchFamily="34" charset="0"/>
+              <a:buChar char="•"/>
+            </a:pPr>
+            <a:r>
+              <a:rPr lang="en" sz="3200" dirty="0" smtClean="0">
+                <a:latin typeface="Corsiva"/>
+                <a:ea typeface="Corsiva"/>
+                <a:cs typeface="Corsiva"/>
+                <a:sym typeface="Corsiva"/>
+              </a:rPr>
+              <a:t>Inputs:</a:t>
+            </a:r>
+          </a:p>
+          <a:p>
+            <a:pPr marL="914400" lvl="1" indent="-482600">
+              <a:spcBef>
+                <a:spcPts val="0"/>
+              </a:spcBef>
+              <a:buSzPct val="100000"/>
+              <a:buFont typeface="Arial" panose="020B0604020202020204" pitchFamily="34" charset="0"/>
+              <a:buChar char="•"/>
+            </a:pPr>
+            <a:r>
+              <a:rPr lang="en" sz="3200" dirty="0" smtClean="0">
+                <a:latin typeface="Corsiva"/>
+                <a:ea typeface="Corsiva"/>
+                <a:cs typeface="Corsiva"/>
+                <a:sym typeface="Corsiva"/>
+              </a:rPr>
+              <a:t>List of object info instances</a:t>
+            </a:r>
+          </a:p>
+          <a:p>
+            <a:pPr marL="914400" lvl="1" indent="-482600">
+              <a:spcBef>
+                <a:spcPts val="0"/>
+              </a:spcBef>
+              <a:buSzPct val="100000"/>
+              <a:buFont typeface="Arial" panose="020B0604020202020204" pitchFamily="34" charset="0"/>
+              <a:buChar char="•"/>
+            </a:pPr>
+            <a:r>
+              <a:rPr lang="en" sz="3200" dirty="0" smtClean="0">
+                <a:latin typeface="Corsiva"/>
+                <a:ea typeface="Corsiva"/>
+                <a:cs typeface="Corsiva"/>
+                <a:sym typeface="Corsiva"/>
+              </a:rPr>
+              <a:t>Minimum Support</a:t>
+            </a:r>
+          </a:p>
+          <a:p>
+            <a:pPr>
+              <a:spcBef>
+                <a:spcPts val="0"/>
+              </a:spcBef>
+              <a:buSzPct val="100000"/>
+            </a:pPr>
+            <a:endParaRPr lang="en" sz="3200" dirty="0" smtClean="0">
+              <a:latin typeface="Corsiva"/>
+              <a:ea typeface="Corsiva"/>
+              <a:cs typeface="Corsiva"/>
+              <a:sym typeface="Corsiva"/>
+            </a:endParaRPr>
+          </a:p>
+          <a:p>
+            <a:pPr marL="457200" indent="-482600">
+              <a:spcBef>
+                <a:spcPts val="0"/>
+              </a:spcBef>
+              <a:buSzPct val="100000"/>
+              <a:buFont typeface="Arial" panose="020B0604020202020204" pitchFamily="34" charset="0"/>
+              <a:buChar char="•"/>
+            </a:pPr>
+            <a:r>
+              <a:rPr lang="en" sz="3200" dirty="0" smtClean="0">
+                <a:latin typeface="Corsiva"/>
+                <a:ea typeface="Corsiva"/>
+                <a:cs typeface="Corsiva"/>
+                <a:sym typeface="Corsiva"/>
+              </a:rPr>
+              <a:t>Outputs:</a:t>
+            </a:r>
+          </a:p>
+          <a:p>
+            <a:pPr marL="914400" lvl="1" indent="-482600">
+              <a:spcBef>
+                <a:spcPts val="0"/>
+              </a:spcBef>
+              <a:buSzPct val="100000"/>
+              <a:buFont typeface="Arial" panose="020B0604020202020204" pitchFamily="34" charset="0"/>
+              <a:buChar char="•"/>
+            </a:pPr>
+            <a:r>
+              <a:rPr lang="en" sz="3200" dirty="0" smtClean="0">
+                <a:latin typeface="Corsiva"/>
+                <a:ea typeface="Corsiva"/>
+                <a:cs typeface="Corsiva"/>
+                <a:sym typeface="Corsiva"/>
+              </a:rPr>
+              <a:t>List of large Itemset</a:t>
+            </a:r>
+          </a:p>
+        </p:txBody>
+      </p:sp>
+    </p:spTree>
+    <p:extLst>
+      <p:ext uri="{BB962C8B-B14F-4D97-AF65-F5344CB8AC3E}">
+        <p14:creationId xmlns:p14="http://schemas.microsoft.com/office/powerpoint/2010/main" val="1352713011"/>
+      </p:ext>
+    </p:extLst>
+  </p:cSld>
+  <p:clrMapOvr>
+    <a:masterClrMapping/>
+  </p:clrMapOvr>
+  <p:timing>
+    <p:tnLst>
+      <p:par>
+        <p:cTn id="1" dur="indefinite" restart="never" nodeType="tmRoot"/>
+      </p:par>
+    </p:tnLst>
+  </p:timing>
+</p:sld>
+</file>
+
+<file path=ppt/slides/slide18.xml><?xml version="1.0" encoding="utf-8"?>
+<p:sld xmlns:a="http://schemas.openxmlformats.org/drawingml/2006/main" xmlns:r="http://schemas.openxmlformats.org/officeDocument/2006/relationships" xmlns:p="http://schemas.openxmlformats.org/presentationml/2006/main">
+  <p:cSld>
+    <p:spTree>
+      <p:nvGrpSpPr>
+        <p:cNvPr id="1" name="Shape 173"/>
+        <p:cNvGrpSpPr/>
+        <p:nvPr/>
+      </p:nvGrpSpPr>
+      <p:grpSpPr>
+        <a:xfrm>
+          <a:off x="0" y="0"/>
+          <a:ext cx="0" cy="0"/>
+          <a:chOff x="0" y="0"/>
+          <a:chExt cx="0" cy="0"/>
+        </a:xfrm>
+      </p:grpSpPr>
+      <p:pic>
+        <p:nvPicPr>
+          <p:cNvPr id="174" name="Shape 174" descr="Untitled Diagram (2).png"/>
+          <p:cNvPicPr preferRelativeResize="0"/>
+          <p:nvPr/>
+        </p:nvPicPr>
+        <p:blipFill rotWithShape="1">
+          <a:blip r:embed="rId3">
+            <a:alphaModFix/>
+          </a:blip>
+          <a:srcRect l="3847" r="2565" b="2750"/>
+          <a:stretch/>
+        </p:blipFill>
+        <p:spPr>
+          <a:xfrm>
+            <a:off x="1907703" y="1"/>
+            <a:ext cx="5256585" cy="6669360"/>
+          </a:xfrm>
+          <a:prstGeom prst="rect">
+            <a:avLst/>
+          </a:prstGeom>
+          <a:noFill/>
+          <a:ln>
+            <a:noFill/>
+          </a:ln>
+        </p:spPr>
+      </p:pic>
+    </p:spTree>
+    <p:extLst>
+      <p:ext uri="{BB962C8B-B14F-4D97-AF65-F5344CB8AC3E}">
+        <p14:creationId xmlns:p14="http://schemas.microsoft.com/office/powerpoint/2010/main" val="4143982072"/>
+      </p:ext>
+    </p:extLst>
+  </p:cSld>
+  <p:clrMapOvr>
+    <a:masterClrMapping/>
+  </p:clrMapOvr>
+  <p:timing>
+    <p:tnLst>
+      <p:par>
+        <p:cTn id="1" dur="indefinite" restart="never" nodeType="tmRoot"/>
+      </p:par>
+    </p:tnLst>
+  </p:timing>
+</p:sld>
+</file>
+
+<file path=ppt/slides/slide19.xml><?xml version="1.0" encoding="utf-8"?>
+<p:sld xmlns:a="http://schemas.openxmlformats.org/drawingml/2006/main" xmlns:r="http://schemas.openxmlformats.org/officeDocument/2006/relationships" xmlns:p="http://schemas.openxmlformats.org/presentationml/2006/main">
+  <p:cSld>
+    <p:spTree>
+      <p:nvGrpSpPr>
+        <p:cNvPr id="1" name=""/>
+        <p:cNvGrpSpPr/>
+        <p:nvPr/>
+      </p:nvGrpSpPr>
+      <p:grpSpPr>
+        <a:xfrm>
+          <a:off x="0" y="0"/>
+          <a:ext cx="0" cy="0"/>
+          <a:chOff x="0" y="0"/>
+          <a:chExt cx="0" cy="0"/>
+        </a:xfrm>
+      </p:grpSpPr>
+      <p:sp>
+        <p:nvSpPr>
+          <p:cNvPr id="2" name="Rectangle 1"/>
+          <p:cNvSpPr/>
+          <p:nvPr/>
+        </p:nvSpPr>
+        <p:spPr>
+          <a:xfrm>
+            <a:off x="1547663" y="966266"/>
+            <a:ext cx="6192689" cy="769441"/>
+          </a:xfrm>
+          <a:prstGeom prst="rect">
+            <a:avLst/>
+          </a:prstGeom>
+        </p:spPr>
+        <p:txBody>
+          <a:bodyPr wrap="square">
+            <a:spAutoFit/>
+          </a:bodyPr>
+          <a:lstStyle/>
+          <a:p>
+            <a:r>
+              <a:rPr lang="en" sz="4400" dirty="0" smtClean="0"/>
+              <a:t>Generate2 Large DataItem</a:t>
+            </a:r>
+            <a:endParaRPr lang="en-US" sz="4400" dirty="0"/>
+          </a:p>
+        </p:txBody>
+      </p:sp>
+      <p:sp>
+        <p:nvSpPr>
+          <p:cNvPr id="3" name="Shape 148"/>
+          <p:cNvSpPr txBox="1"/>
+          <p:nvPr/>
+        </p:nvSpPr>
+        <p:spPr>
+          <a:xfrm>
+            <a:off x="1331640" y="2060848"/>
+            <a:ext cx="6696744" cy="4320480"/>
+          </a:xfrm>
+          <a:prstGeom prst="rect">
+            <a:avLst/>
+          </a:prstGeom>
+          <a:noFill/>
+          <a:ln>
+            <a:noFill/>
+          </a:ln>
+        </p:spPr>
+        <p:txBody>
+          <a:bodyPr lIns="91425" tIns="91425" rIns="91425" bIns="91425" anchor="t" anchorCtr="0">
+            <a:noAutofit/>
+          </a:bodyPr>
+          <a:lstStyle/>
+          <a:p>
+            <a:pPr marL="457200" indent="-482600">
+              <a:spcBef>
+                <a:spcPts val="0"/>
+              </a:spcBef>
+              <a:buSzPct val="100000"/>
+              <a:buFont typeface="Arial" panose="020B0604020202020204" pitchFamily="34" charset="0"/>
+              <a:buChar char="•"/>
+            </a:pPr>
+            <a:r>
+              <a:rPr lang="en" sz="3200" dirty="0" smtClean="0">
+                <a:latin typeface="Corsiva"/>
+                <a:ea typeface="Corsiva"/>
+                <a:cs typeface="Corsiva"/>
+                <a:sym typeface="Corsiva"/>
+              </a:rPr>
+              <a:t>Inputs:</a:t>
+            </a:r>
+          </a:p>
+          <a:p>
+            <a:pPr marL="914400" lvl="1" indent="-482600">
+              <a:spcBef>
+                <a:spcPts val="0"/>
+              </a:spcBef>
+              <a:buSzPct val="100000"/>
+              <a:buFont typeface="Arial" panose="020B0604020202020204" pitchFamily="34" charset="0"/>
+              <a:buChar char="•"/>
+            </a:pPr>
+            <a:r>
+              <a:rPr lang="en" sz="3200" dirty="0" smtClean="0">
+                <a:latin typeface="Corsiva"/>
+                <a:ea typeface="Corsiva"/>
+                <a:cs typeface="Corsiva"/>
+                <a:sym typeface="Corsiva"/>
+              </a:rPr>
+              <a:t>All large itemset</a:t>
+            </a:r>
+          </a:p>
+          <a:p>
+            <a:pPr marL="914400" lvl="1" indent="-482600">
+              <a:spcBef>
+                <a:spcPts val="0"/>
+              </a:spcBef>
+              <a:buSzPct val="100000"/>
+              <a:buFont typeface="Arial" panose="020B0604020202020204" pitchFamily="34" charset="0"/>
+              <a:buChar char="•"/>
+            </a:pPr>
+            <a:r>
+              <a:rPr lang="en" sz="3200" dirty="0" smtClean="0">
+                <a:latin typeface="Corsiva"/>
+                <a:ea typeface="Corsiva"/>
+                <a:cs typeface="Corsiva"/>
+                <a:sym typeface="Corsiva"/>
+              </a:rPr>
+              <a:t>Minimum Confidence</a:t>
+            </a:r>
+          </a:p>
+          <a:p>
+            <a:pPr>
+              <a:spcBef>
+                <a:spcPts val="0"/>
+              </a:spcBef>
+              <a:buSzPct val="100000"/>
+            </a:pPr>
+            <a:endParaRPr lang="en" sz="3200" dirty="0" smtClean="0">
+              <a:latin typeface="Corsiva"/>
+              <a:ea typeface="Corsiva"/>
+              <a:cs typeface="Corsiva"/>
+              <a:sym typeface="Corsiva"/>
+            </a:endParaRPr>
+          </a:p>
+          <a:p>
+            <a:pPr marL="457200" indent="-482600">
+              <a:spcBef>
+                <a:spcPts val="0"/>
+              </a:spcBef>
+              <a:buSzPct val="100000"/>
+              <a:buFont typeface="Arial" panose="020B0604020202020204" pitchFamily="34" charset="0"/>
+              <a:buChar char="•"/>
+            </a:pPr>
+            <a:r>
+              <a:rPr lang="en" sz="3200" dirty="0" smtClean="0">
+                <a:latin typeface="Corsiva"/>
+                <a:ea typeface="Corsiva"/>
+                <a:cs typeface="Corsiva"/>
+                <a:sym typeface="Corsiva"/>
+              </a:rPr>
+              <a:t>Outputs:</a:t>
+            </a:r>
+          </a:p>
+          <a:p>
+            <a:pPr marL="914400" lvl="1" indent="-482600">
+              <a:spcBef>
+                <a:spcPts val="0"/>
+              </a:spcBef>
+              <a:buSzPct val="100000"/>
+              <a:buFont typeface="Arial" panose="020B0604020202020204" pitchFamily="34" charset="0"/>
+              <a:buChar char="•"/>
+            </a:pPr>
+            <a:r>
+              <a:rPr lang="en" sz="3200" dirty="0" smtClean="0">
+                <a:latin typeface="Corsiva"/>
+                <a:ea typeface="Corsiva"/>
+                <a:cs typeface="Corsiva"/>
+                <a:sym typeface="Corsiva"/>
+              </a:rPr>
+              <a:t>Association Rules</a:t>
+            </a:r>
+          </a:p>
+        </p:txBody>
+      </p:sp>
+    </p:spTree>
+    <p:extLst>
+      <p:ext uri="{BB962C8B-B14F-4D97-AF65-F5344CB8AC3E}">
+        <p14:creationId xmlns:p14="http://schemas.microsoft.com/office/powerpoint/2010/main" val="4243895648"/>
       </p:ext>
     </p:extLst>
   </p:cSld>
@@ -7384,6 +8939,250 @@
     <p:extLst>
       <p:ext uri="{BB962C8B-B14F-4D97-AF65-F5344CB8AC3E}">
         <p14:creationId xmlns:p14="http://schemas.microsoft.com/office/powerpoint/2010/main" val="3431511462"/>
+      </p:ext>
+    </p:extLst>
+  </p:cSld>
+  <p:clrMapOvr>
+    <a:masterClrMapping/>
+  </p:clrMapOvr>
+  <p:timing>
+    <p:tnLst>
+      <p:par>
+        <p:cTn id="1" dur="indefinite" restart="never" nodeType="tmRoot"/>
+      </p:par>
+    </p:tnLst>
+  </p:timing>
+</p:sld>
+</file>
+
+<file path=ppt/slides/slide20.xml><?xml version="1.0" encoding="utf-8"?>
+<p:sld xmlns:a="http://schemas.openxmlformats.org/drawingml/2006/main" xmlns:r="http://schemas.openxmlformats.org/officeDocument/2006/relationships" xmlns:p="http://schemas.openxmlformats.org/presentationml/2006/main">
+  <p:cSld>
+    <p:spTree>
+      <p:nvGrpSpPr>
+        <p:cNvPr id="1" name="Shape 183"/>
+        <p:cNvGrpSpPr/>
+        <p:nvPr/>
+      </p:nvGrpSpPr>
+      <p:grpSpPr>
+        <a:xfrm>
+          <a:off x="0" y="0"/>
+          <a:ext cx="0" cy="0"/>
+          <a:chOff x="0" y="0"/>
+          <a:chExt cx="0" cy="0"/>
+        </a:xfrm>
+      </p:grpSpPr>
+      <p:pic>
+        <p:nvPicPr>
+          <p:cNvPr id="184" name="Shape 184" descr="Algorithm3.png"/>
+          <p:cNvPicPr preferRelativeResize="0"/>
+          <p:nvPr/>
+        </p:nvPicPr>
+        <p:blipFill rotWithShape="1">
+          <a:blip r:embed="rId3">
+            <a:alphaModFix/>
+          </a:blip>
+          <a:srcRect l="2565" r="2565" b="1701"/>
+          <a:stretch/>
+        </p:blipFill>
+        <p:spPr>
+          <a:xfrm>
+            <a:off x="1979712" y="0"/>
+            <a:ext cx="5328592" cy="6741368"/>
+          </a:xfrm>
+          <a:prstGeom prst="rect">
+            <a:avLst/>
+          </a:prstGeom>
+          <a:noFill/>
+          <a:ln>
+            <a:noFill/>
+          </a:ln>
+        </p:spPr>
+      </p:pic>
+    </p:spTree>
+    <p:extLst>
+      <p:ext uri="{BB962C8B-B14F-4D97-AF65-F5344CB8AC3E}">
+        <p14:creationId xmlns:p14="http://schemas.microsoft.com/office/powerpoint/2010/main" val="287719363"/>
+      </p:ext>
+    </p:extLst>
+  </p:cSld>
+  <p:clrMapOvr>
+    <a:masterClrMapping/>
+  </p:clrMapOvr>
+  <p:timing>
+    <p:tnLst>
+      <p:par>
+        <p:cTn id="1" dur="indefinite" restart="never" nodeType="tmRoot"/>
+      </p:par>
+    </p:tnLst>
+  </p:timing>
+</p:sld>
+</file>
+
+<file path=ppt/slides/slide21.xml><?xml version="1.0" encoding="utf-8"?>
+<p:sld xmlns:a="http://schemas.openxmlformats.org/drawingml/2006/main" xmlns:r="http://schemas.openxmlformats.org/officeDocument/2006/relationships" xmlns:p="http://schemas.openxmlformats.org/presentationml/2006/main">
+  <p:cSld>
+    <p:spTree>
+      <p:nvGrpSpPr>
+        <p:cNvPr id="1" name=""/>
+        <p:cNvGrpSpPr/>
+        <p:nvPr/>
+      </p:nvGrpSpPr>
+      <p:grpSpPr>
+        <a:xfrm>
+          <a:off x="0" y="0"/>
+          <a:ext cx="0" cy="0"/>
+          <a:chOff x="0" y="0"/>
+          <a:chExt cx="0" cy="0"/>
+        </a:xfrm>
+      </p:grpSpPr>
+      <p:sp>
+        <p:nvSpPr>
+          <p:cNvPr id="25602" name="Rectangle 2"/>
+          <p:cNvSpPr>
+            <a:spLocks noGrp="1" noChangeArrowheads="1"/>
+          </p:cNvSpPr>
+          <p:nvPr>
+            <p:ph type="title"/>
+          </p:nvPr>
+        </p:nvSpPr>
+        <p:spPr/>
+        <p:txBody>
+          <a:bodyPr/>
+          <a:lstStyle/>
+          <a:p>
+            <a:r>
+              <a:rPr lang="en-US"/>
+              <a:t>Technology</a:t>
+            </a:r>
+          </a:p>
+        </p:txBody>
+      </p:sp>
+      <p:sp>
+        <p:nvSpPr>
+          <p:cNvPr id="25603" name="Rectangle 3"/>
+          <p:cNvSpPr>
+            <a:spLocks noGrp="1" noChangeArrowheads="1"/>
+          </p:cNvSpPr>
+          <p:nvPr>
+            <p:ph type="body" idx="1"/>
+          </p:nvPr>
+        </p:nvSpPr>
+        <p:spPr/>
+        <p:txBody>
+          <a:bodyPr/>
+          <a:lstStyle/>
+          <a:p>
+            <a:r>
+              <a:rPr lang="en-US" dirty="0" smtClean="0"/>
+              <a:t>SPARQL, Jena, Turtle, RDF</a:t>
+            </a:r>
+            <a:endParaRPr lang="en-US" dirty="0"/>
+          </a:p>
+          <a:p>
+            <a:pPr lvl="1"/>
+            <a:r>
+              <a:rPr lang="en-US" dirty="0" smtClean="0"/>
+              <a:t>SPARQL allows to query Ontologies, Data Sets while Jena provides the Java Powered platform independency required.</a:t>
+            </a:r>
+          </a:p>
+          <a:p>
+            <a:pPr lvl="1"/>
+            <a:r>
+              <a:rPr lang="en-US" dirty="0" smtClean="0"/>
+              <a:t>Turtle and RDF are used to represent Ontologies</a:t>
+            </a:r>
+          </a:p>
+          <a:p>
+            <a:pPr lvl="1"/>
+            <a:endParaRPr lang="en-US" dirty="0"/>
+          </a:p>
+        </p:txBody>
+      </p:sp>
+      <p:pic>
+        <p:nvPicPr>
+          <p:cNvPr id="2" name="Picture 1"/>
+          <p:cNvPicPr>
+            <a:picLocks noChangeAspect="1"/>
+          </p:cNvPicPr>
+          <p:nvPr/>
+        </p:nvPicPr>
+        <p:blipFill>
+          <a:blip r:embed="rId2"/>
+          <a:stretch>
+            <a:fillRect/>
+          </a:stretch>
+        </p:blipFill>
+        <p:spPr>
+          <a:xfrm>
+            <a:off x="2738606" y="4293096"/>
+            <a:ext cx="4809788" cy="2398515"/>
+          </a:xfrm>
+          <a:prstGeom prst="rect">
+            <a:avLst/>
+          </a:prstGeom>
+        </p:spPr>
+      </p:pic>
+    </p:spTree>
+  </p:cSld>
+  <p:clrMapOvr>
+    <a:masterClrMapping/>
+  </p:clrMapOvr>
+  <p:timing>
+    <p:tnLst>
+      <p:par>
+        <p:cTn id="1" dur="indefinite" restart="never" nodeType="tmRoot"/>
+      </p:par>
+    </p:tnLst>
+  </p:timing>
+</p:sld>
+</file>
+
+<file path=ppt/slides/slide22.xml><?xml version="1.0" encoding="utf-8"?>
+<p:sld xmlns:a="http://schemas.openxmlformats.org/drawingml/2006/main" xmlns:r="http://schemas.openxmlformats.org/officeDocument/2006/relationships" xmlns:p="http://schemas.openxmlformats.org/presentationml/2006/main">
+  <p:cSld>
+    <p:spTree>
+      <p:nvGrpSpPr>
+        <p:cNvPr id="1" name=""/>
+        <p:cNvGrpSpPr/>
+        <p:nvPr/>
+      </p:nvGrpSpPr>
+      <p:grpSpPr>
+        <a:xfrm>
+          <a:off x="0" y="0"/>
+          <a:ext cx="0" cy="0"/>
+          <a:chOff x="0" y="0"/>
+          <a:chExt cx="0" cy="0"/>
+        </a:xfrm>
+      </p:grpSpPr>
+      <p:sp>
+        <p:nvSpPr>
+          <p:cNvPr id="2" name="Title 1"/>
+          <p:cNvSpPr>
+            <a:spLocks noGrp="1"/>
+          </p:cNvSpPr>
+          <p:nvPr>
+            <p:ph type="title"/>
+          </p:nvPr>
+        </p:nvSpPr>
+        <p:spPr/>
+        <p:txBody>
+          <a:bodyPr/>
+          <a:lstStyle/>
+          <a:p>
+            <a:pPr algn="ctr"/>
+            <a:r>
+              <a:rPr lang="en-IN" dirty="0" smtClean="0"/>
+              <a:t>THANK YOU!</a:t>
+            </a:r>
+            <a:endParaRPr lang="en-IN" dirty="0"/>
+          </a:p>
+        </p:txBody>
+      </p:sp>
+    </p:spTree>
+    <p:extLst>
+      <p:ext uri="{BB962C8B-B14F-4D97-AF65-F5344CB8AC3E}">
+        <p14:creationId xmlns:p14="http://schemas.microsoft.com/office/powerpoint/2010/main" val="650515929"/>
       </p:ext>
     </p:extLst>
   </p:cSld>

</xml_diff>